<commit_message>
Added a more general stenciloperatorarg to the diagram
</commit_message>
<xml_diff>
--- a/docs/diagrams/gridtoolsconcepts.pptx
+++ b/docs/diagrams/gridtoolsconcepts.pptx
@@ -3397,13 +3397,13 @@
       </p:grpSpPr>
       <p:sp>
         <p:nvSpPr>
-          <p:cNvPr id="4" name="Rounded Rectangle 3"/>
+          <p:cNvPr id="7" name="Rounded Rectangle 6"/>
           <p:cNvSpPr/>
           <p:nvPr/>
         </p:nvSpPr>
         <p:spPr>
           <a:xfrm>
-            <a:off x="4139952" y="994149"/>
+            <a:off x="1547664" y="4941168"/>
             <a:ext cx="2016224" cy="360040"/>
           </a:xfrm>
           <a:prstGeom prst="roundRect">
@@ -3439,20 +3439,12 @@
           <a:p>
             <a:pPr algn="ctr"/>
             <a:r>
-              <a:rPr lang="en-US" dirty="0" err="1" smtClean="0">
-                <a:solidFill>
-                  <a:schemeClr val="tx1"/>
-                </a:solidFill>
-              </a:rPr>
-              <a:t>DataField</a:t>
-            </a:r>
-            <a:r>
               <a:rPr lang="en-US" dirty="0" smtClean="0">
                 <a:solidFill>
                   <a:schemeClr val="tx1"/>
                 </a:solidFill>
               </a:rPr>
-              <a:t>/Grid</a:t>
+              <a:t>Icosahedral</a:t>
             </a:r>
             <a:endParaRPr lang="it-CH" dirty="0">
               <a:solidFill>
@@ -3464,13 +3456,13 @@
       </p:sp>
       <p:sp>
         <p:nvSpPr>
-          <p:cNvPr id="5" name="Rounded Rectangle 4"/>
+          <p:cNvPr id="8" name="Rounded Rectangle 7"/>
           <p:cNvSpPr/>
           <p:nvPr/>
         </p:nvSpPr>
         <p:spPr>
           <a:xfrm>
-            <a:off x="6155413" y="2780928"/>
+            <a:off x="3710215" y="4941168"/>
             <a:ext cx="2016224" cy="360040"/>
           </a:xfrm>
           <a:prstGeom prst="roundRect">
@@ -3506,183 +3498,6 @@
           <a:p>
             <a:pPr algn="ctr"/>
             <a:r>
-              <a:rPr lang="en-US" dirty="0" smtClean="0">
-                <a:solidFill>
-                  <a:schemeClr val="tx1"/>
-                </a:solidFill>
-              </a:rPr>
-              <a:t>Cartesian</a:t>
-            </a:r>
-            <a:endParaRPr lang="it-CH" dirty="0">
-              <a:solidFill>
-                <a:schemeClr val="tx1"/>
-              </a:solidFill>
-            </a:endParaRPr>
-          </a:p>
-        </p:txBody>
-      </p:sp>
-      <p:sp>
-        <p:nvSpPr>
-          <p:cNvPr id="6" name="Rounded Rectangle 5"/>
-          <p:cNvSpPr/>
-          <p:nvPr/>
-        </p:nvSpPr>
-        <p:spPr>
-          <a:xfrm>
-            <a:off x="2347082" y="2780928"/>
-            <a:ext cx="2016224" cy="360040"/>
-          </a:xfrm>
-          <a:prstGeom prst="roundRect">
-            <a:avLst/>
-          </a:prstGeom>
-          <a:noFill/>
-          <a:ln>
-            <a:solidFill>
-              <a:schemeClr val="tx1"/>
-            </a:solidFill>
-            <a:prstDash val="lgDash"/>
-          </a:ln>
-        </p:spPr>
-        <p:style>
-          <a:lnRef idx="2">
-            <a:schemeClr val="accent1">
-              <a:shade val="50000"/>
-            </a:schemeClr>
-          </a:lnRef>
-          <a:fillRef idx="1">
-            <a:schemeClr val="accent1"/>
-          </a:fillRef>
-          <a:effectRef idx="0">
-            <a:schemeClr val="accent1"/>
-          </a:effectRef>
-          <a:fontRef idx="minor">
-            <a:schemeClr val="lt1"/>
-          </a:fontRef>
-        </p:style>
-        <p:txBody>
-          <a:bodyPr rtlCol="0" anchor="ctr"/>
-          <a:lstStyle/>
-          <a:p>
-            <a:pPr algn="ctr"/>
-            <a:r>
-              <a:rPr lang="en-US" dirty="0" err="1" smtClean="0">
-                <a:solidFill>
-                  <a:schemeClr val="tx1"/>
-                </a:solidFill>
-              </a:rPr>
-              <a:t>NeighborList</a:t>
-            </a:r>
-            <a:endParaRPr lang="it-CH" dirty="0">
-              <a:solidFill>
-                <a:schemeClr val="tx1"/>
-              </a:solidFill>
-            </a:endParaRPr>
-          </a:p>
-        </p:txBody>
-      </p:sp>
-      <p:sp>
-        <p:nvSpPr>
-          <p:cNvPr id="7" name="Rounded Rectangle 6"/>
-          <p:cNvSpPr/>
-          <p:nvPr/>
-        </p:nvSpPr>
-        <p:spPr>
-          <a:xfrm>
-            <a:off x="827584" y="5301208"/>
-            <a:ext cx="2016224" cy="360040"/>
-          </a:xfrm>
-          <a:prstGeom prst="roundRect">
-            <a:avLst/>
-          </a:prstGeom>
-          <a:noFill/>
-          <a:ln>
-            <a:solidFill>
-              <a:schemeClr val="tx1"/>
-            </a:solidFill>
-            <a:prstDash val="lgDash"/>
-          </a:ln>
-        </p:spPr>
-        <p:style>
-          <a:lnRef idx="2">
-            <a:schemeClr val="accent1">
-              <a:shade val="50000"/>
-            </a:schemeClr>
-          </a:lnRef>
-          <a:fillRef idx="1">
-            <a:schemeClr val="accent1"/>
-          </a:fillRef>
-          <a:effectRef idx="0">
-            <a:schemeClr val="accent1"/>
-          </a:effectRef>
-          <a:fontRef idx="minor">
-            <a:schemeClr val="lt1"/>
-          </a:fontRef>
-        </p:style>
-        <p:txBody>
-          <a:bodyPr rtlCol="0" anchor="ctr"/>
-          <a:lstStyle/>
-          <a:p>
-            <a:pPr algn="ctr"/>
-            <a:r>
-              <a:rPr lang="en-US" dirty="0" smtClean="0">
-                <a:solidFill>
-                  <a:schemeClr val="tx1"/>
-                </a:solidFill>
-              </a:rPr>
-              <a:t>Icosahedral</a:t>
-            </a:r>
-            <a:endParaRPr lang="it-CH" dirty="0">
-              <a:solidFill>
-                <a:schemeClr val="tx1"/>
-              </a:solidFill>
-            </a:endParaRPr>
-          </a:p>
-        </p:txBody>
-      </p:sp>
-      <p:sp>
-        <p:nvSpPr>
-          <p:cNvPr id="8" name="Rounded Rectangle 7"/>
-          <p:cNvSpPr/>
-          <p:nvPr/>
-        </p:nvSpPr>
-        <p:spPr>
-          <a:xfrm>
-            <a:off x="4211960" y="5301208"/>
-            <a:ext cx="2016224" cy="360040"/>
-          </a:xfrm>
-          <a:prstGeom prst="roundRect">
-            <a:avLst/>
-          </a:prstGeom>
-          <a:noFill/>
-          <a:ln>
-            <a:solidFill>
-              <a:schemeClr val="tx1"/>
-            </a:solidFill>
-            <a:prstDash val="lgDash"/>
-          </a:ln>
-        </p:spPr>
-        <p:style>
-          <a:lnRef idx="2">
-            <a:schemeClr val="accent1">
-              <a:shade val="50000"/>
-            </a:schemeClr>
-          </a:lnRef>
-          <a:fillRef idx="1">
-            <a:schemeClr val="accent1"/>
-          </a:fillRef>
-          <a:effectRef idx="0">
-            <a:schemeClr val="accent1"/>
-          </a:effectRef>
-          <a:fontRef idx="minor">
-            <a:schemeClr val="lt1"/>
-          </a:fontRef>
-        </p:style>
-        <p:txBody>
-          <a:bodyPr rtlCol="0" anchor="ctr"/>
-          <a:lstStyle/>
-          <a:p>
-            <a:pPr algn="ctr"/>
-            <a:r>
               <a:rPr lang="en-US" dirty="0" err="1" smtClean="0">
                 <a:solidFill>
                   <a:schemeClr val="tx1"/>
@@ -3698,16 +3513,595 @@
           </a:p>
         </p:txBody>
       </p:sp>
-      <p:sp>
-        <p:nvSpPr>
-          <p:cNvPr id="9" name="TextBox 8"/>
+      <p:grpSp>
+        <p:nvGrpSpPr>
+          <p:cNvPr id="10" name="Group 9"/>
+          <p:cNvGrpSpPr/>
+          <p:nvPr/>
+        </p:nvGrpSpPr>
+        <p:grpSpPr>
+          <a:xfrm>
+            <a:off x="4359050" y="3402868"/>
+            <a:ext cx="3311605" cy="638200"/>
+            <a:chOff x="4860032" y="2502768"/>
+            <a:chExt cx="3311605" cy="638200"/>
+          </a:xfrm>
+        </p:grpSpPr>
+        <p:sp>
+          <p:nvSpPr>
+            <p:cNvPr id="5" name="Rounded Rectangle 4"/>
+            <p:cNvSpPr/>
+            <p:nvPr/>
+          </p:nvSpPr>
+          <p:spPr>
+            <a:xfrm>
+              <a:off x="6155413" y="2780928"/>
+              <a:ext cx="2016224" cy="360040"/>
+            </a:xfrm>
+            <a:prstGeom prst="roundRect">
+              <a:avLst/>
+            </a:prstGeom>
+            <a:noFill/>
+            <a:ln>
+              <a:solidFill>
+                <a:schemeClr val="tx1"/>
+              </a:solidFill>
+              <a:prstDash val="lgDash"/>
+            </a:ln>
+          </p:spPr>
+          <p:style>
+            <a:lnRef idx="2">
+              <a:schemeClr val="accent1">
+                <a:shade val="50000"/>
+              </a:schemeClr>
+            </a:lnRef>
+            <a:fillRef idx="1">
+              <a:schemeClr val="accent1"/>
+            </a:fillRef>
+            <a:effectRef idx="0">
+              <a:schemeClr val="accent1"/>
+            </a:effectRef>
+            <a:fontRef idx="minor">
+              <a:schemeClr val="lt1"/>
+            </a:fontRef>
+          </p:style>
+          <p:txBody>
+            <a:bodyPr rtlCol="0" anchor="ctr"/>
+            <a:lstStyle/>
+            <a:p>
+              <a:pPr algn="ctr"/>
+              <a:r>
+                <a:rPr lang="en-US" dirty="0" smtClean="0">
+                  <a:solidFill>
+                    <a:schemeClr val="tx1"/>
+                  </a:solidFill>
+                </a:rPr>
+                <a:t>Cartesian</a:t>
+              </a:r>
+              <a:endParaRPr lang="it-CH" dirty="0">
+                <a:solidFill>
+                  <a:schemeClr val="tx1"/>
+                </a:solidFill>
+              </a:endParaRPr>
+            </a:p>
+          </p:txBody>
+        </p:sp>
+        <p:sp>
+          <p:nvSpPr>
+            <p:cNvPr id="9" name="TextBox 8"/>
+            <p:cNvSpPr txBox="1"/>
+            <p:nvPr/>
+          </p:nvSpPr>
+          <p:spPr>
+            <a:xfrm>
+              <a:off x="4860032" y="2502768"/>
+              <a:ext cx="1836204" cy="400110"/>
+            </a:xfrm>
+            <a:prstGeom prst="rect">
+              <a:avLst/>
+            </a:prstGeom>
+            <a:solidFill>
+              <a:schemeClr val="accent3">
+                <a:lumMod val="20000"/>
+                <a:lumOff val="80000"/>
+                <a:alpha val="92000"/>
+              </a:schemeClr>
+            </a:solidFill>
+            <a:ln>
+              <a:solidFill>
+                <a:schemeClr val="accent3">
+                  <a:lumMod val="75000"/>
+                </a:schemeClr>
+              </a:solidFill>
+            </a:ln>
+          </p:spPr>
+          <p:txBody>
+            <a:bodyPr wrap="square" rtlCol="0">
+              <a:spAutoFit/>
+            </a:bodyPr>
+            <a:lstStyle/>
+            <a:p>
+              <a:r>
+                <a:rPr lang="en-US" sz="1000" dirty="0" smtClean="0">
+                  <a:solidFill>
+                    <a:srgbClr val="FF0000"/>
+                  </a:solidFill>
+                  <a:latin typeface="Consolas" panose="020B0609020204030204" pitchFamily="49" charset="0"/>
+                  <a:ea typeface="Tahoma" panose="020B0604030504040204" pitchFamily="34" charset="0"/>
+                  <a:cs typeface="Consolas" panose="020B0609020204030204" pitchFamily="49" charset="0"/>
+                </a:rPr>
+                <a:t>Cells are accessed with integer coordinates</a:t>
+              </a:r>
+              <a:endParaRPr lang="it-CH" sz="1000" dirty="0">
+                <a:solidFill>
+                  <a:srgbClr val="FF0000"/>
+                </a:solidFill>
+                <a:latin typeface="Consolas" panose="020B0609020204030204" pitchFamily="49" charset="0"/>
+                <a:ea typeface="Tahoma" panose="020B0604030504040204" pitchFamily="34" charset="0"/>
+                <a:cs typeface="Consolas" panose="020B0609020204030204" pitchFamily="49" charset="0"/>
+              </a:endParaRPr>
+            </a:p>
+          </p:txBody>
+        </p:sp>
+      </p:grpSp>
+      <p:cxnSp>
+        <p:nvCxnSpPr>
+          <p:cNvPr id="11" name="Straight Arrow Connector 10"/>
+          <p:cNvCxnSpPr>
+            <a:stCxn id="6" idx="0"/>
+            <a:endCxn id="4" idx="2"/>
+          </p:cNvCxnSpPr>
+          <p:nvPr/>
+        </p:nvCxnSpPr>
+        <p:spPr>
+          <a:xfrm flipV="1">
+            <a:off x="3568511" y="2924655"/>
+            <a:ext cx="1221824" cy="936393"/>
+          </a:xfrm>
+          <a:prstGeom prst="straightConnector1">
+            <a:avLst/>
+          </a:prstGeom>
+          <a:ln w="19050">
+            <a:solidFill>
+              <a:schemeClr val="tx1"/>
+            </a:solidFill>
+            <a:tailEnd type="arrow"/>
+          </a:ln>
+        </p:spPr>
+        <p:style>
+          <a:lnRef idx="1">
+            <a:schemeClr val="accent1"/>
+          </a:lnRef>
+          <a:fillRef idx="0">
+            <a:schemeClr val="accent1"/>
+          </a:fillRef>
+          <a:effectRef idx="0">
+            <a:schemeClr val="accent1"/>
+          </a:effectRef>
+          <a:fontRef idx="minor">
+            <a:schemeClr val="tx1"/>
+          </a:fontRef>
+        </p:style>
+      </p:cxnSp>
+      <p:cxnSp>
+        <p:nvCxnSpPr>
+          <p:cNvPr id="14" name="Straight Arrow Connector 13"/>
+          <p:cNvCxnSpPr>
+            <a:stCxn id="5" idx="0"/>
+            <a:endCxn id="4" idx="2"/>
+          </p:cNvCxnSpPr>
+          <p:nvPr/>
+        </p:nvCxnSpPr>
+        <p:spPr>
+          <a:xfrm flipH="1" flipV="1">
+            <a:off x="4790335" y="2924655"/>
+            <a:ext cx="1872208" cy="756373"/>
+          </a:xfrm>
+          <a:prstGeom prst="straightConnector1">
+            <a:avLst/>
+          </a:prstGeom>
+          <a:ln w="19050">
+            <a:solidFill>
+              <a:schemeClr val="tx1"/>
+            </a:solidFill>
+            <a:tailEnd type="arrow"/>
+          </a:ln>
+        </p:spPr>
+        <p:style>
+          <a:lnRef idx="1">
+            <a:schemeClr val="accent1"/>
+          </a:lnRef>
+          <a:fillRef idx="0">
+            <a:schemeClr val="accent1"/>
+          </a:fillRef>
+          <a:effectRef idx="0">
+            <a:schemeClr val="accent1"/>
+          </a:effectRef>
+          <a:fontRef idx="minor">
+            <a:schemeClr val="tx1"/>
+          </a:fontRef>
+        </p:style>
+      </p:cxnSp>
+      <p:cxnSp>
+        <p:nvCxnSpPr>
+          <p:cNvPr id="17" name="Straight Arrow Connector 16"/>
+          <p:cNvCxnSpPr>
+            <a:stCxn id="7" idx="0"/>
+            <a:endCxn id="6" idx="2"/>
+          </p:cNvCxnSpPr>
+          <p:nvPr/>
+        </p:nvCxnSpPr>
+        <p:spPr>
+          <a:xfrm flipV="1">
+            <a:off x="2555776" y="4221088"/>
+            <a:ext cx="1012735" cy="720080"/>
+          </a:xfrm>
+          <a:prstGeom prst="straightConnector1">
+            <a:avLst/>
+          </a:prstGeom>
+          <a:ln w="19050">
+            <a:solidFill>
+              <a:schemeClr val="tx1"/>
+            </a:solidFill>
+            <a:tailEnd type="arrow"/>
+          </a:ln>
+        </p:spPr>
+        <p:style>
+          <a:lnRef idx="1">
+            <a:schemeClr val="accent1"/>
+          </a:lnRef>
+          <a:fillRef idx="0">
+            <a:schemeClr val="accent1"/>
+          </a:fillRef>
+          <a:effectRef idx="0">
+            <a:schemeClr val="accent1"/>
+          </a:effectRef>
+          <a:fontRef idx="minor">
+            <a:schemeClr val="tx1"/>
+          </a:fontRef>
+        </p:style>
+      </p:cxnSp>
+      <p:cxnSp>
+        <p:nvCxnSpPr>
+          <p:cNvPr id="19" name="Straight Arrow Connector 18"/>
+          <p:cNvCxnSpPr>
+            <a:stCxn id="8" idx="0"/>
+            <a:endCxn id="6" idx="2"/>
+          </p:cNvCxnSpPr>
+          <p:nvPr/>
+        </p:nvCxnSpPr>
+        <p:spPr>
+          <a:xfrm flipH="1" flipV="1">
+            <a:off x="3568511" y="4221088"/>
+            <a:ext cx="1149816" cy="720080"/>
+          </a:xfrm>
+          <a:prstGeom prst="straightConnector1">
+            <a:avLst/>
+          </a:prstGeom>
+          <a:ln w="19050">
+            <a:solidFill>
+              <a:schemeClr val="tx1"/>
+            </a:solidFill>
+            <a:tailEnd type="arrow"/>
+          </a:ln>
+        </p:spPr>
+        <p:style>
+          <a:lnRef idx="1">
+            <a:schemeClr val="accent1"/>
+          </a:lnRef>
+          <a:fillRef idx="0">
+            <a:schemeClr val="accent1"/>
+          </a:fillRef>
+          <a:effectRef idx="0">
+            <a:schemeClr val="accent1"/>
+          </a:effectRef>
+          <a:fontRef idx="minor">
+            <a:schemeClr val="tx1"/>
+          </a:fontRef>
+        </p:style>
+      </p:cxnSp>
+      <p:grpSp>
+        <p:nvGrpSpPr>
+          <p:cNvPr id="3" name="Group 2"/>
+          <p:cNvGrpSpPr/>
+          <p:nvPr/>
+        </p:nvGrpSpPr>
+        <p:grpSpPr>
+          <a:xfrm>
+            <a:off x="1043608" y="3429000"/>
+            <a:ext cx="3533015" cy="792088"/>
+            <a:chOff x="830291" y="2348880"/>
+            <a:chExt cx="3533015" cy="792088"/>
+          </a:xfrm>
+        </p:grpSpPr>
+        <p:sp>
+          <p:nvSpPr>
+            <p:cNvPr id="6" name="Rounded Rectangle 5"/>
+            <p:cNvSpPr/>
+            <p:nvPr/>
+          </p:nvSpPr>
+          <p:spPr>
+            <a:xfrm>
+              <a:off x="2347082" y="2780928"/>
+              <a:ext cx="2016224" cy="360040"/>
+            </a:xfrm>
+            <a:prstGeom prst="roundRect">
+              <a:avLst/>
+            </a:prstGeom>
+            <a:noFill/>
+            <a:ln>
+              <a:solidFill>
+                <a:schemeClr val="tx1"/>
+              </a:solidFill>
+              <a:prstDash val="lgDash"/>
+            </a:ln>
+          </p:spPr>
+          <p:style>
+            <a:lnRef idx="2">
+              <a:schemeClr val="accent1">
+                <a:shade val="50000"/>
+              </a:schemeClr>
+            </a:lnRef>
+            <a:fillRef idx="1">
+              <a:schemeClr val="accent1"/>
+            </a:fillRef>
+            <a:effectRef idx="0">
+              <a:schemeClr val="accent1"/>
+            </a:effectRef>
+            <a:fontRef idx="minor">
+              <a:schemeClr val="lt1"/>
+            </a:fontRef>
+          </p:style>
+          <p:txBody>
+            <a:bodyPr rtlCol="0" anchor="ctr"/>
+            <a:lstStyle/>
+            <a:p>
+              <a:pPr algn="ctr"/>
+              <a:r>
+                <a:rPr lang="en-US" dirty="0" err="1" smtClean="0">
+                  <a:solidFill>
+                    <a:schemeClr val="tx1"/>
+                  </a:solidFill>
+                </a:rPr>
+                <a:t>NeighborList</a:t>
+              </a:r>
+              <a:endParaRPr lang="it-CH" dirty="0">
+                <a:solidFill>
+                  <a:schemeClr val="tx1"/>
+                </a:solidFill>
+              </a:endParaRPr>
+            </a:p>
+          </p:txBody>
+        </p:sp>
+        <p:sp>
+          <p:nvSpPr>
+            <p:cNvPr id="22" name="TextBox 21"/>
+            <p:cNvSpPr txBox="1"/>
+            <p:nvPr/>
+          </p:nvSpPr>
+          <p:spPr>
+            <a:xfrm>
+              <a:off x="830291" y="2348880"/>
+              <a:ext cx="1836204" cy="553998"/>
+            </a:xfrm>
+            <a:prstGeom prst="rect">
+              <a:avLst/>
+            </a:prstGeom>
+            <a:solidFill>
+              <a:schemeClr val="accent3">
+                <a:lumMod val="20000"/>
+                <a:lumOff val="80000"/>
+                <a:alpha val="92000"/>
+              </a:schemeClr>
+            </a:solidFill>
+            <a:ln>
+              <a:solidFill>
+                <a:schemeClr val="accent3">
+                  <a:lumMod val="75000"/>
+                </a:schemeClr>
+              </a:solidFill>
+            </a:ln>
+          </p:spPr>
+          <p:txBody>
+            <a:bodyPr wrap="square" rtlCol="0">
+              <a:spAutoFit/>
+            </a:bodyPr>
+            <a:lstStyle/>
+            <a:p>
+              <a:r>
+                <a:rPr lang="en-US" sz="1000" dirty="0" smtClean="0">
+                  <a:solidFill>
+                    <a:srgbClr val="FF0000"/>
+                  </a:solidFill>
+                  <a:latin typeface="Consolas" panose="020B0609020204030204" pitchFamily="49" charset="0"/>
+                  <a:ea typeface="Tahoma" panose="020B0604030504040204" pitchFamily="34" charset="0"/>
+                  <a:cs typeface="Consolas" panose="020B0609020204030204" pitchFamily="49" charset="0"/>
+                </a:rPr>
+                <a:t>Cells are accessed by a </a:t>
+              </a:r>
+              <a:r>
+                <a:rPr lang="en-US" sz="1000" dirty="0" err="1" smtClean="0">
+                  <a:solidFill>
+                    <a:srgbClr val="FF0000"/>
+                  </a:solidFill>
+                  <a:latin typeface="Consolas" panose="020B0609020204030204" pitchFamily="49" charset="0"/>
+                  <a:ea typeface="Tahoma" panose="020B0604030504040204" pitchFamily="34" charset="0"/>
+                  <a:cs typeface="Consolas" panose="020B0609020204030204" pitchFamily="49" charset="0"/>
+                </a:rPr>
+                <a:t>for_each</a:t>
+              </a:r>
+              <a:r>
+                <a:rPr lang="en-US" sz="1000" dirty="0" smtClean="0">
+                  <a:solidFill>
+                    <a:srgbClr val="FF0000"/>
+                  </a:solidFill>
+                  <a:latin typeface="Consolas" panose="020B0609020204030204" pitchFamily="49" charset="0"/>
+                  <a:ea typeface="Tahoma" panose="020B0604030504040204" pitchFamily="34" charset="0"/>
+                  <a:cs typeface="Consolas" panose="020B0609020204030204" pitchFamily="49" charset="0"/>
+                </a:rPr>
+                <a:t> and neighbors through neighbor lists</a:t>
+              </a:r>
+              <a:endParaRPr lang="it-CH" sz="1000" dirty="0">
+                <a:solidFill>
+                  <a:srgbClr val="FF0000"/>
+                </a:solidFill>
+                <a:latin typeface="Consolas" panose="020B0609020204030204" pitchFamily="49" charset="0"/>
+                <a:ea typeface="Tahoma" panose="020B0604030504040204" pitchFamily="34" charset="0"/>
+                <a:cs typeface="Consolas" panose="020B0609020204030204" pitchFamily="49" charset="0"/>
+              </a:endParaRPr>
+            </a:p>
+          </p:txBody>
+        </p:sp>
+      </p:grpSp>
+      <p:grpSp>
+        <p:nvGrpSpPr>
+          <p:cNvPr id="12" name="Group 11"/>
+          <p:cNvGrpSpPr/>
+          <p:nvPr/>
+        </p:nvGrpSpPr>
+        <p:grpSpPr>
+          <a:xfrm>
+            <a:off x="3782223" y="2036749"/>
+            <a:ext cx="3888432" cy="887906"/>
+            <a:chOff x="4139952" y="466283"/>
+            <a:chExt cx="3888432" cy="887906"/>
+          </a:xfrm>
+        </p:grpSpPr>
+        <p:sp>
+          <p:nvSpPr>
+            <p:cNvPr id="4" name="Rounded Rectangle 3"/>
+            <p:cNvSpPr/>
+            <p:nvPr/>
+          </p:nvSpPr>
+          <p:spPr>
+            <a:xfrm>
+              <a:off x="4139952" y="994149"/>
+              <a:ext cx="2016224" cy="360040"/>
+            </a:xfrm>
+            <a:prstGeom prst="roundRect">
+              <a:avLst/>
+            </a:prstGeom>
+            <a:noFill/>
+            <a:ln>
+              <a:solidFill>
+                <a:schemeClr val="tx1"/>
+              </a:solidFill>
+              <a:prstDash val="lgDash"/>
+            </a:ln>
+          </p:spPr>
+          <p:style>
+            <a:lnRef idx="2">
+              <a:schemeClr val="accent1">
+                <a:shade val="50000"/>
+              </a:schemeClr>
+            </a:lnRef>
+            <a:fillRef idx="1">
+              <a:schemeClr val="accent1"/>
+            </a:fillRef>
+            <a:effectRef idx="0">
+              <a:schemeClr val="accent1"/>
+            </a:effectRef>
+            <a:fontRef idx="minor">
+              <a:schemeClr val="lt1"/>
+            </a:fontRef>
+          </p:style>
+          <p:txBody>
+            <a:bodyPr rtlCol="0" anchor="ctr"/>
+            <a:lstStyle/>
+            <a:p>
+              <a:pPr algn="ctr"/>
+              <a:r>
+                <a:rPr lang="en-US" dirty="0" err="1" smtClean="0">
+                  <a:solidFill>
+                    <a:schemeClr val="tx1"/>
+                  </a:solidFill>
+                </a:rPr>
+                <a:t>DataField</a:t>
+              </a:r>
+              <a:r>
+                <a:rPr lang="en-US" dirty="0" smtClean="0">
+                  <a:solidFill>
+                    <a:schemeClr val="tx1"/>
+                  </a:solidFill>
+                </a:rPr>
+                <a:t>/Grid</a:t>
+              </a:r>
+              <a:endParaRPr lang="it-CH" dirty="0">
+                <a:solidFill>
+                  <a:schemeClr val="tx1"/>
+                </a:solidFill>
+              </a:endParaRPr>
+            </a:p>
+          </p:txBody>
+        </p:sp>
+        <p:sp>
+          <p:nvSpPr>
+            <p:cNvPr id="37" name="TextBox 36"/>
+            <p:cNvSpPr txBox="1"/>
+            <p:nvPr/>
+          </p:nvSpPr>
+          <p:spPr>
+            <a:xfrm>
+              <a:off x="5868144" y="466283"/>
+              <a:ext cx="2160240" cy="707886"/>
+            </a:xfrm>
+            <a:prstGeom prst="rect">
+              <a:avLst/>
+            </a:prstGeom>
+            <a:solidFill>
+              <a:schemeClr val="accent3">
+                <a:lumMod val="20000"/>
+                <a:lumOff val="80000"/>
+                <a:alpha val="92000"/>
+              </a:schemeClr>
+            </a:solidFill>
+            <a:ln>
+              <a:solidFill>
+                <a:schemeClr val="accent3">
+                  <a:lumMod val="75000"/>
+                </a:schemeClr>
+              </a:solidFill>
+            </a:ln>
+          </p:spPr>
+          <p:txBody>
+            <a:bodyPr wrap="square" rtlCol="0">
+              <a:spAutoFit/>
+            </a:bodyPr>
+            <a:lstStyle/>
+            <a:p>
+              <a:r>
+                <a:rPr lang="en-US" sz="1000" dirty="0" smtClean="0">
+                  <a:solidFill>
+                    <a:srgbClr val="FF0000"/>
+                  </a:solidFill>
+                  <a:latin typeface="Consolas" panose="020B0609020204030204" pitchFamily="49" charset="0"/>
+                  <a:ea typeface="Tahoma" panose="020B0604030504040204" pitchFamily="34" charset="0"/>
+                  <a:cs typeface="Consolas" panose="020B0609020204030204" pitchFamily="49" charset="0"/>
+                </a:rPr>
+                <a:t>Generic concept for a grid data structure. Interfaces to data depends on the lower level concept specifications</a:t>
+              </a:r>
+              <a:endParaRPr lang="it-CH" sz="1000" dirty="0">
+                <a:solidFill>
+                  <a:srgbClr val="FF0000"/>
+                </a:solidFill>
+                <a:latin typeface="Consolas" panose="020B0609020204030204" pitchFamily="49" charset="0"/>
+                <a:ea typeface="Tahoma" panose="020B0604030504040204" pitchFamily="34" charset="0"/>
+                <a:cs typeface="Consolas" panose="020B0609020204030204" pitchFamily="49" charset="0"/>
+              </a:endParaRPr>
+            </a:p>
+          </p:txBody>
+        </p:sp>
+      </p:grpSp>
+      <p:sp>
+        <p:nvSpPr>
+          <p:cNvPr id="38" name="TextBox 37"/>
           <p:cNvSpPr txBox="1"/>
           <p:nvPr/>
         </p:nvSpPr>
         <p:spPr>
           <a:xfrm>
-            <a:off x="4860032" y="2502768"/>
-            <a:ext cx="1836204" cy="400110"/>
+            <a:off x="2595482" y="5231522"/>
+            <a:ext cx="2097940" cy="861774"/>
           </a:xfrm>
           <a:prstGeom prst="rect">
             <a:avLst/>
@@ -3742,7 +4136,7 @@
                 <a:ea typeface="Tahoma" panose="020B0604030504040204" pitchFamily="34" charset="0"/>
                 <a:cs typeface="Consolas" panose="020B0609020204030204" pitchFamily="49" charset="0"/>
               </a:rPr>
-              <a:t>Cells are accessed with integer coordinates</a:t>
+              <a:t>These have basic interfaces as the parent concept, but maybe specific interfaces for “global” operations, e.g., managing layout.</a:t>
             </a:r>
             <a:endParaRPr lang="it-CH" sz="1000" dirty="0">
               <a:solidFill>
@@ -3755,19 +4149,78 @@
           </a:p>
         </p:txBody>
       </p:sp>
+      <p:sp>
+        <p:nvSpPr>
+          <p:cNvPr id="21" name="Rounded Rectangle 20"/>
+          <p:cNvSpPr/>
+          <p:nvPr/>
+        </p:nvSpPr>
+        <p:spPr>
+          <a:xfrm>
+            <a:off x="4932040" y="1005652"/>
+            <a:ext cx="2016224" cy="360040"/>
+          </a:xfrm>
+          <a:prstGeom prst="roundRect">
+            <a:avLst/>
+          </a:prstGeom>
+          <a:noFill/>
+          <a:ln>
+            <a:solidFill>
+              <a:schemeClr val="tx1"/>
+            </a:solidFill>
+            <a:prstDash val="lgDash"/>
+          </a:ln>
+        </p:spPr>
+        <p:style>
+          <a:lnRef idx="2">
+            <a:schemeClr val="accent1">
+              <a:shade val="50000"/>
+            </a:schemeClr>
+          </a:lnRef>
+          <a:fillRef idx="1">
+            <a:schemeClr val="accent1"/>
+          </a:fillRef>
+          <a:effectRef idx="0">
+            <a:schemeClr val="accent1"/>
+          </a:effectRef>
+          <a:fontRef idx="minor">
+            <a:schemeClr val="lt1"/>
+          </a:fontRef>
+        </p:style>
+        <p:txBody>
+          <a:bodyPr rtlCol="0" anchor="ctr"/>
+          <a:lstStyle/>
+          <a:p>
+            <a:pPr algn="ctr"/>
+            <a:r>
+              <a:rPr lang="en-US" dirty="0" err="1" smtClean="0">
+                <a:solidFill>
+                  <a:schemeClr val="tx1"/>
+                </a:solidFill>
+              </a:rPr>
+              <a:t>StencilOperatorArg</a:t>
+            </a:r>
+            <a:endParaRPr lang="it-CH" dirty="0">
+              <a:solidFill>
+                <a:schemeClr val="tx1"/>
+              </a:solidFill>
+            </a:endParaRPr>
+          </a:p>
+        </p:txBody>
+      </p:sp>
       <p:cxnSp>
         <p:nvCxnSpPr>
-          <p:cNvPr id="11" name="Straight Arrow Connector 10"/>
+          <p:cNvPr id="23" name="Straight Arrow Connector 22"/>
           <p:cNvCxnSpPr>
-            <a:stCxn id="6" idx="0"/>
-            <a:endCxn id="4" idx="2"/>
+            <a:stCxn id="4" idx="0"/>
+            <a:endCxn id="21" idx="2"/>
           </p:cNvCxnSpPr>
           <p:nvPr/>
         </p:nvCxnSpPr>
         <p:spPr>
           <a:xfrm flipV="1">
-            <a:off x="3355194" y="1354189"/>
-            <a:ext cx="1792870" cy="1426739"/>
+            <a:off x="4790335" y="1365692"/>
+            <a:ext cx="1149817" cy="1198923"/>
           </a:xfrm>
           <a:prstGeom prst="straightConnector1">
             <a:avLst/>
@@ -3794,316 +4247,6 @@
           </a:fontRef>
         </p:style>
       </p:cxnSp>
-      <p:cxnSp>
-        <p:nvCxnSpPr>
-          <p:cNvPr id="14" name="Straight Arrow Connector 13"/>
-          <p:cNvCxnSpPr>
-            <a:stCxn id="5" idx="0"/>
-            <a:endCxn id="4" idx="2"/>
-          </p:cNvCxnSpPr>
-          <p:nvPr/>
-        </p:nvCxnSpPr>
-        <p:spPr>
-          <a:xfrm flipH="1" flipV="1">
-            <a:off x="5148064" y="1354189"/>
-            <a:ext cx="2015461" cy="1426739"/>
-          </a:xfrm>
-          <a:prstGeom prst="straightConnector1">
-            <a:avLst/>
-          </a:prstGeom>
-          <a:ln w="19050">
-            <a:solidFill>
-              <a:schemeClr val="tx1"/>
-            </a:solidFill>
-            <a:tailEnd type="arrow"/>
-          </a:ln>
-        </p:spPr>
-        <p:style>
-          <a:lnRef idx="1">
-            <a:schemeClr val="accent1"/>
-          </a:lnRef>
-          <a:fillRef idx="0">
-            <a:schemeClr val="accent1"/>
-          </a:fillRef>
-          <a:effectRef idx="0">
-            <a:schemeClr val="accent1"/>
-          </a:effectRef>
-          <a:fontRef idx="minor">
-            <a:schemeClr val="tx1"/>
-          </a:fontRef>
-        </p:style>
-      </p:cxnSp>
-      <p:cxnSp>
-        <p:nvCxnSpPr>
-          <p:cNvPr id="17" name="Straight Arrow Connector 16"/>
-          <p:cNvCxnSpPr>
-            <a:stCxn id="7" idx="0"/>
-            <a:endCxn id="6" idx="2"/>
-          </p:cNvCxnSpPr>
-          <p:nvPr/>
-        </p:nvCxnSpPr>
-        <p:spPr>
-          <a:xfrm flipV="1">
-            <a:off x="1835696" y="3140968"/>
-            <a:ext cx="1519498" cy="2160240"/>
-          </a:xfrm>
-          <a:prstGeom prst="straightConnector1">
-            <a:avLst/>
-          </a:prstGeom>
-          <a:ln w="19050">
-            <a:solidFill>
-              <a:schemeClr val="tx1"/>
-            </a:solidFill>
-            <a:tailEnd type="arrow"/>
-          </a:ln>
-        </p:spPr>
-        <p:style>
-          <a:lnRef idx="1">
-            <a:schemeClr val="accent1"/>
-          </a:lnRef>
-          <a:fillRef idx="0">
-            <a:schemeClr val="accent1"/>
-          </a:fillRef>
-          <a:effectRef idx="0">
-            <a:schemeClr val="accent1"/>
-          </a:effectRef>
-          <a:fontRef idx="minor">
-            <a:schemeClr val="tx1"/>
-          </a:fontRef>
-        </p:style>
-      </p:cxnSp>
-      <p:cxnSp>
-        <p:nvCxnSpPr>
-          <p:cNvPr id="19" name="Straight Arrow Connector 18"/>
-          <p:cNvCxnSpPr>
-            <a:stCxn id="8" idx="0"/>
-            <a:endCxn id="6" idx="2"/>
-          </p:cNvCxnSpPr>
-          <p:nvPr/>
-        </p:nvCxnSpPr>
-        <p:spPr>
-          <a:xfrm flipH="1" flipV="1">
-            <a:off x="3355194" y="3140968"/>
-            <a:ext cx="1864878" cy="2160240"/>
-          </a:xfrm>
-          <a:prstGeom prst="straightConnector1">
-            <a:avLst/>
-          </a:prstGeom>
-          <a:ln w="19050">
-            <a:solidFill>
-              <a:schemeClr val="tx1"/>
-            </a:solidFill>
-            <a:tailEnd type="arrow"/>
-          </a:ln>
-        </p:spPr>
-        <p:style>
-          <a:lnRef idx="1">
-            <a:schemeClr val="accent1"/>
-          </a:lnRef>
-          <a:fillRef idx="0">
-            <a:schemeClr val="accent1"/>
-          </a:fillRef>
-          <a:effectRef idx="0">
-            <a:schemeClr val="accent1"/>
-          </a:effectRef>
-          <a:fontRef idx="minor">
-            <a:schemeClr val="tx1"/>
-          </a:fontRef>
-        </p:style>
-      </p:cxnSp>
-      <p:sp>
-        <p:nvSpPr>
-          <p:cNvPr id="22" name="TextBox 21"/>
-          <p:cNvSpPr txBox="1"/>
-          <p:nvPr/>
-        </p:nvSpPr>
-        <p:spPr>
-          <a:xfrm>
-            <a:off x="830291" y="2348880"/>
-            <a:ext cx="1836204" cy="553998"/>
-          </a:xfrm>
-          <a:prstGeom prst="rect">
-            <a:avLst/>
-          </a:prstGeom>
-          <a:solidFill>
-            <a:schemeClr val="accent3">
-              <a:lumMod val="20000"/>
-              <a:lumOff val="80000"/>
-              <a:alpha val="92000"/>
-            </a:schemeClr>
-          </a:solidFill>
-          <a:ln>
-            <a:solidFill>
-              <a:schemeClr val="accent3">
-                <a:lumMod val="75000"/>
-              </a:schemeClr>
-            </a:solidFill>
-          </a:ln>
-        </p:spPr>
-        <p:txBody>
-          <a:bodyPr wrap="square" rtlCol="0">
-            <a:spAutoFit/>
-          </a:bodyPr>
-          <a:lstStyle/>
-          <a:p>
-            <a:r>
-              <a:rPr lang="en-US" sz="1000" dirty="0" smtClean="0">
-                <a:solidFill>
-                  <a:srgbClr val="FF0000"/>
-                </a:solidFill>
-                <a:latin typeface="Consolas" panose="020B0609020204030204" pitchFamily="49" charset="0"/>
-                <a:ea typeface="Tahoma" panose="020B0604030504040204" pitchFamily="34" charset="0"/>
-                <a:cs typeface="Consolas" panose="020B0609020204030204" pitchFamily="49" charset="0"/>
-              </a:rPr>
-              <a:t>Cells are accessed by a </a:t>
-            </a:r>
-            <a:r>
-              <a:rPr lang="en-US" sz="1000" dirty="0" err="1" smtClean="0">
-                <a:solidFill>
-                  <a:srgbClr val="FF0000"/>
-                </a:solidFill>
-                <a:latin typeface="Consolas" panose="020B0609020204030204" pitchFamily="49" charset="0"/>
-                <a:ea typeface="Tahoma" panose="020B0604030504040204" pitchFamily="34" charset="0"/>
-                <a:cs typeface="Consolas" panose="020B0609020204030204" pitchFamily="49" charset="0"/>
-              </a:rPr>
-              <a:t>for_each</a:t>
-            </a:r>
-            <a:r>
-              <a:rPr lang="en-US" sz="1000" dirty="0" smtClean="0">
-                <a:solidFill>
-                  <a:srgbClr val="FF0000"/>
-                </a:solidFill>
-                <a:latin typeface="Consolas" panose="020B0609020204030204" pitchFamily="49" charset="0"/>
-                <a:ea typeface="Tahoma" panose="020B0604030504040204" pitchFamily="34" charset="0"/>
-                <a:cs typeface="Consolas" panose="020B0609020204030204" pitchFamily="49" charset="0"/>
-              </a:rPr>
-              <a:t> and neighbors through neighbor lists</a:t>
-            </a:r>
-            <a:endParaRPr lang="it-CH" sz="1000" dirty="0">
-              <a:solidFill>
-                <a:srgbClr val="FF0000"/>
-              </a:solidFill>
-              <a:latin typeface="Consolas" panose="020B0609020204030204" pitchFamily="49" charset="0"/>
-              <a:ea typeface="Tahoma" panose="020B0604030504040204" pitchFamily="34" charset="0"/>
-              <a:cs typeface="Consolas" panose="020B0609020204030204" pitchFamily="49" charset="0"/>
-            </a:endParaRPr>
-          </a:p>
-        </p:txBody>
-      </p:sp>
-      <p:sp>
-        <p:nvSpPr>
-          <p:cNvPr id="37" name="TextBox 36"/>
-          <p:cNvSpPr txBox="1"/>
-          <p:nvPr/>
-        </p:nvSpPr>
-        <p:spPr>
-          <a:xfrm>
-            <a:off x="5868144" y="466283"/>
-            <a:ext cx="2160240" cy="707886"/>
-          </a:xfrm>
-          <a:prstGeom prst="rect">
-            <a:avLst/>
-          </a:prstGeom>
-          <a:solidFill>
-            <a:schemeClr val="accent3">
-              <a:lumMod val="20000"/>
-              <a:lumOff val="80000"/>
-              <a:alpha val="92000"/>
-            </a:schemeClr>
-          </a:solidFill>
-          <a:ln>
-            <a:solidFill>
-              <a:schemeClr val="accent3">
-                <a:lumMod val="75000"/>
-              </a:schemeClr>
-            </a:solidFill>
-          </a:ln>
-        </p:spPr>
-        <p:txBody>
-          <a:bodyPr wrap="square" rtlCol="0">
-            <a:spAutoFit/>
-          </a:bodyPr>
-          <a:lstStyle/>
-          <a:p>
-            <a:r>
-              <a:rPr lang="en-US" sz="1000" dirty="0" smtClean="0">
-                <a:solidFill>
-                  <a:srgbClr val="FF0000"/>
-                </a:solidFill>
-                <a:latin typeface="Consolas" panose="020B0609020204030204" pitchFamily="49" charset="0"/>
-                <a:ea typeface="Tahoma" panose="020B0604030504040204" pitchFamily="34" charset="0"/>
-                <a:cs typeface="Consolas" panose="020B0609020204030204" pitchFamily="49" charset="0"/>
-              </a:rPr>
-              <a:t>Generic concept for a grid data structure. Interfaces to data depends on the lower level concept specifications</a:t>
-            </a:r>
-            <a:endParaRPr lang="it-CH" sz="1000" dirty="0">
-              <a:solidFill>
-                <a:srgbClr val="FF0000"/>
-              </a:solidFill>
-              <a:latin typeface="Consolas" panose="020B0609020204030204" pitchFamily="49" charset="0"/>
-              <a:ea typeface="Tahoma" panose="020B0604030504040204" pitchFamily="34" charset="0"/>
-              <a:cs typeface="Consolas" panose="020B0609020204030204" pitchFamily="49" charset="0"/>
-            </a:endParaRPr>
-          </a:p>
-        </p:txBody>
-      </p:sp>
-      <p:sp>
-        <p:nvSpPr>
-          <p:cNvPr id="38" name="TextBox 37"/>
-          <p:cNvSpPr txBox="1"/>
-          <p:nvPr/>
-        </p:nvSpPr>
-        <p:spPr>
-          <a:xfrm>
-            <a:off x="2483768" y="5506937"/>
-            <a:ext cx="2097940" cy="861774"/>
-          </a:xfrm>
-          <a:prstGeom prst="rect">
-            <a:avLst/>
-          </a:prstGeom>
-          <a:solidFill>
-            <a:schemeClr val="accent3">
-              <a:lumMod val="20000"/>
-              <a:lumOff val="80000"/>
-              <a:alpha val="92000"/>
-            </a:schemeClr>
-          </a:solidFill>
-          <a:ln>
-            <a:solidFill>
-              <a:schemeClr val="accent3">
-                <a:lumMod val="75000"/>
-              </a:schemeClr>
-            </a:solidFill>
-          </a:ln>
-        </p:spPr>
-        <p:txBody>
-          <a:bodyPr wrap="square" rtlCol="0">
-            <a:spAutoFit/>
-          </a:bodyPr>
-          <a:lstStyle/>
-          <a:p>
-            <a:r>
-              <a:rPr lang="en-US" sz="1000" dirty="0" smtClean="0">
-                <a:solidFill>
-                  <a:srgbClr val="FF0000"/>
-                </a:solidFill>
-                <a:latin typeface="Consolas" panose="020B0609020204030204" pitchFamily="49" charset="0"/>
-                <a:ea typeface="Tahoma" panose="020B0604030504040204" pitchFamily="34" charset="0"/>
-                <a:cs typeface="Consolas" panose="020B0609020204030204" pitchFamily="49" charset="0"/>
-              </a:rPr>
-              <a:t>These have basic interfaces as the parent concept, but maybe specific interfaces for “global” operations, e.g., managing layout.</a:t>
-            </a:r>
-            <a:endParaRPr lang="it-CH" sz="1000" dirty="0">
-              <a:solidFill>
-                <a:srgbClr val="FF0000"/>
-              </a:solidFill>
-              <a:latin typeface="Consolas" panose="020B0609020204030204" pitchFamily="49" charset="0"/>
-              <a:ea typeface="Tahoma" panose="020B0604030504040204" pitchFamily="34" charset="0"/>
-              <a:cs typeface="Consolas" panose="020B0609020204030204" pitchFamily="49" charset="0"/>
-            </a:endParaRPr>
-          </a:p>
-        </p:txBody>
-      </p:sp>
     </p:spTree>
     <p:extLst>
       <p:ext uri="{BB962C8B-B14F-4D97-AF65-F5344CB8AC3E}">

</xml_diff>

<commit_message>
added computation concept image
</commit_message>
<xml_diff>
--- a/docs/diagrams/gridtoolsconcepts.pptx
+++ b/docs/diagrams/gridtoolsconcepts.pptx
@@ -7,9 +7,10 @@
   <p:sldIdLst>
     <p:sldId id="261" r:id="rId2"/>
     <p:sldId id="257" r:id="rId3"/>
-    <p:sldId id="259" r:id="rId4"/>
-    <p:sldId id="262" r:id="rId5"/>
-    <p:sldId id="258" r:id="rId6"/>
+    <p:sldId id="263" r:id="rId4"/>
+    <p:sldId id="259" r:id="rId5"/>
+    <p:sldId id="262" r:id="rId6"/>
+    <p:sldId id="258" r:id="rId7"/>
   </p:sldIdLst>
   <p:sldSz cx="9144000" cy="6858000" type="screen4x3"/>
   <p:notesSz cx="6858000" cy="9144000"/>
@@ -292,7 +293,7 @@
           <a:p>
             <a:fld id="{ADE2F5C7-357B-4C57-BDC7-84B22E64388C}" type="datetimeFigureOut">
               <a:rPr lang="it-CH" smtClean="0"/>
-              <a:t>15.09.2014</a:t>
+              <a:t>19.09.2014</a:t>
             </a:fld>
             <a:endParaRPr lang="it-CH"/>
           </a:p>
@@ -462,7 +463,7 @@
           <a:p>
             <a:fld id="{ADE2F5C7-357B-4C57-BDC7-84B22E64388C}" type="datetimeFigureOut">
               <a:rPr lang="it-CH" smtClean="0"/>
-              <a:t>15.09.2014</a:t>
+              <a:t>19.09.2014</a:t>
             </a:fld>
             <a:endParaRPr lang="it-CH"/>
           </a:p>
@@ -642,7 +643,7 @@
           <a:p>
             <a:fld id="{ADE2F5C7-357B-4C57-BDC7-84B22E64388C}" type="datetimeFigureOut">
               <a:rPr lang="it-CH" smtClean="0"/>
-              <a:t>15.09.2014</a:t>
+              <a:t>19.09.2014</a:t>
             </a:fld>
             <a:endParaRPr lang="it-CH"/>
           </a:p>
@@ -812,7 +813,7 @@
           <a:p>
             <a:fld id="{ADE2F5C7-357B-4C57-BDC7-84B22E64388C}" type="datetimeFigureOut">
               <a:rPr lang="it-CH" smtClean="0"/>
-              <a:t>15.09.2014</a:t>
+              <a:t>19.09.2014</a:t>
             </a:fld>
             <a:endParaRPr lang="it-CH"/>
           </a:p>
@@ -1058,7 +1059,7 @@
           <a:p>
             <a:fld id="{ADE2F5C7-357B-4C57-BDC7-84B22E64388C}" type="datetimeFigureOut">
               <a:rPr lang="it-CH" smtClean="0"/>
-              <a:t>15.09.2014</a:t>
+              <a:t>19.09.2014</a:t>
             </a:fld>
             <a:endParaRPr lang="it-CH"/>
           </a:p>
@@ -1346,7 +1347,7 @@
           <a:p>
             <a:fld id="{ADE2F5C7-357B-4C57-BDC7-84B22E64388C}" type="datetimeFigureOut">
               <a:rPr lang="it-CH" smtClean="0"/>
-              <a:t>15.09.2014</a:t>
+              <a:t>19.09.2014</a:t>
             </a:fld>
             <a:endParaRPr lang="it-CH"/>
           </a:p>
@@ -1768,7 +1769,7 @@
           <a:p>
             <a:fld id="{ADE2F5C7-357B-4C57-BDC7-84B22E64388C}" type="datetimeFigureOut">
               <a:rPr lang="it-CH" smtClean="0"/>
-              <a:t>15.09.2014</a:t>
+              <a:t>19.09.2014</a:t>
             </a:fld>
             <a:endParaRPr lang="it-CH"/>
           </a:p>
@@ -1886,7 +1887,7 @@
           <a:p>
             <a:fld id="{ADE2F5C7-357B-4C57-BDC7-84B22E64388C}" type="datetimeFigureOut">
               <a:rPr lang="it-CH" smtClean="0"/>
-              <a:t>15.09.2014</a:t>
+              <a:t>19.09.2014</a:t>
             </a:fld>
             <a:endParaRPr lang="it-CH"/>
           </a:p>
@@ -1981,7 +1982,7 @@
           <a:p>
             <a:fld id="{ADE2F5C7-357B-4C57-BDC7-84B22E64388C}" type="datetimeFigureOut">
               <a:rPr lang="it-CH" smtClean="0"/>
-              <a:t>15.09.2014</a:t>
+              <a:t>19.09.2014</a:t>
             </a:fld>
             <a:endParaRPr lang="it-CH"/>
           </a:p>
@@ -2258,7 +2259,7 @@
           <a:p>
             <a:fld id="{ADE2F5C7-357B-4C57-BDC7-84B22E64388C}" type="datetimeFigureOut">
               <a:rPr lang="it-CH" smtClean="0"/>
-              <a:t>15.09.2014</a:t>
+              <a:t>19.09.2014</a:t>
             </a:fld>
             <a:endParaRPr lang="it-CH"/>
           </a:p>
@@ -2511,7 +2512,7 @@
           <a:p>
             <a:fld id="{ADE2F5C7-357B-4C57-BDC7-84B22E64388C}" type="datetimeFigureOut">
               <a:rPr lang="it-CH" smtClean="0"/>
-              <a:t>15.09.2014</a:t>
+              <a:t>19.09.2014</a:t>
             </a:fld>
             <a:endParaRPr lang="it-CH"/>
           </a:p>
@@ -2724,7 +2725,7 @@
           <a:p>
             <a:fld id="{ADE2F5C7-357B-4C57-BDC7-84B22E64388C}" type="datetimeFigureOut">
               <a:rPr lang="it-CH" smtClean="0"/>
-              <a:t>15.09.2014</a:t>
+              <a:t>19.09.2014</a:t>
             </a:fld>
             <a:endParaRPr lang="it-CH"/>
           </a:p>
@@ -4279,14 +4280,14 @@
       </p:grpSpPr>
       <p:sp>
         <p:nvSpPr>
-          <p:cNvPr id="2" name="Rounded Rectangle 1"/>
+          <p:cNvPr id="3" name="Rounded Rectangle 2"/>
           <p:cNvSpPr/>
           <p:nvPr/>
         </p:nvSpPr>
         <p:spPr>
           <a:xfrm>
-            <a:off x="940128" y="4379241"/>
-            <a:ext cx="2304256" cy="360040"/>
+            <a:off x="3716288" y="1421160"/>
+            <a:ext cx="2016224" cy="360040"/>
           </a:xfrm>
           <a:prstGeom prst="roundRect">
             <a:avLst/>
@@ -4326,7 +4327,7 @@
                   <a:schemeClr val="tx1"/>
                 </a:solidFill>
               </a:rPr>
-              <a:t>Coordinates</a:t>
+              <a:t>Computation</a:t>
             </a:r>
             <a:endParaRPr lang="it-CH" dirty="0">
               <a:solidFill>
@@ -4336,262 +4337,26 @@
           </a:p>
         </p:txBody>
       </p:sp>
-      <p:sp>
-        <p:nvSpPr>
-          <p:cNvPr id="3" name="Rounded Rectangle 2"/>
-          <p:cNvSpPr/>
-          <p:nvPr/>
-        </p:nvSpPr>
-        <p:spPr>
-          <a:xfrm>
-            <a:off x="1516192" y="3371129"/>
-            <a:ext cx="1152128" cy="360040"/>
-          </a:xfrm>
-          <a:prstGeom prst="roundRect">
-            <a:avLst/>
-          </a:prstGeom>
-          <a:noFill/>
-          <a:ln>
-            <a:solidFill>
-              <a:schemeClr val="tx1"/>
-            </a:solidFill>
-            <a:prstDash val="lgDash"/>
-          </a:ln>
-        </p:spPr>
-        <p:style>
-          <a:lnRef idx="2">
-            <a:schemeClr val="accent1">
-              <a:shade val="50000"/>
-            </a:schemeClr>
-          </a:lnRef>
-          <a:fillRef idx="1">
-            <a:schemeClr val="accent1"/>
-          </a:fillRef>
-          <a:effectRef idx="0">
-            <a:schemeClr val="accent1"/>
-          </a:effectRef>
-          <a:fontRef idx="minor">
-            <a:schemeClr val="lt1"/>
-          </a:fontRef>
-        </p:style>
-        <p:txBody>
-          <a:bodyPr rtlCol="0" anchor="ctr"/>
-          <a:lstStyle/>
-          <a:p>
-            <a:pPr algn="ctr"/>
-            <a:r>
-              <a:rPr lang="en-US" dirty="0" smtClean="0">
-                <a:solidFill>
-                  <a:schemeClr val="tx1"/>
-                </a:solidFill>
-              </a:rPr>
-              <a:t>Axis</a:t>
-            </a:r>
-            <a:endParaRPr lang="it-CH" dirty="0">
-              <a:solidFill>
-                <a:schemeClr val="tx1"/>
-              </a:solidFill>
-            </a:endParaRPr>
-          </a:p>
-        </p:txBody>
-      </p:sp>
-      <p:sp>
-        <p:nvSpPr>
-          <p:cNvPr id="4" name="Rounded Rectangle 3"/>
-          <p:cNvSpPr/>
-          <p:nvPr/>
-        </p:nvSpPr>
-        <p:spPr>
-          <a:xfrm>
-            <a:off x="1523731" y="2320009"/>
-            <a:ext cx="1152128" cy="360040"/>
-          </a:xfrm>
-          <a:prstGeom prst="roundRect">
-            <a:avLst/>
-          </a:prstGeom>
-          <a:noFill/>
-          <a:ln>
-            <a:solidFill>
-              <a:schemeClr val="tx1"/>
-            </a:solidFill>
-            <a:prstDash val="lgDash"/>
-          </a:ln>
-        </p:spPr>
-        <p:style>
-          <a:lnRef idx="2">
-            <a:schemeClr val="accent1">
-              <a:shade val="50000"/>
-            </a:schemeClr>
-          </a:lnRef>
-          <a:fillRef idx="1">
-            <a:schemeClr val="accent1"/>
-          </a:fillRef>
-          <a:effectRef idx="0">
-            <a:schemeClr val="accent1"/>
-          </a:effectRef>
-          <a:fontRef idx="minor">
-            <a:schemeClr val="lt1"/>
-          </a:fontRef>
-        </p:style>
-        <p:txBody>
-          <a:bodyPr rtlCol="0" anchor="ctr"/>
-          <a:lstStyle/>
-          <a:p>
-            <a:pPr algn="ctr"/>
-            <a:r>
-              <a:rPr lang="en-US" dirty="0" smtClean="0">
-                <a:solidFill>
-                  <a:schemeClr val="tx1"/>
-                </a:solidFill>
-              </a:rPr>
-              <a:t>Interval</a:t>
-            </a:r>
-            <a:endParaRPr lang="it-CH" dirty="0">
-              <a:solidFill>
-                <a:schemeClr val="tx1"/>
-              </a:solidFill>
-            </a:endParaRPr>
-          </a:p>
-        </p:txBody>
-      </p:sp>
-      <p:sp>
-        <p:nvSpPr>
-          <p:cNvPr id="5" name="Rounded Rectangle 4"/>
-          <p:cNvSpPr/>
-          <p:nvPr/>
-        </p:nvSpPr>
-        <p:spPr>
-          <a:xfrm>
-            <a:off x="587627" y="1389028"/>
-            <a:ext cx="1152128" cy="360040"/>
-          </a:xfrm>
-          <a:prstGeom prst="roundRect">
-            <a:avLst/>
-          </a:prstGeom>
-          <a:noFill/>
-          <a:ln>
-            <a:solidFill>
-              <a:schemeClr val="tx1"/>
-            </a:solidFill>
-            <a:prstDash val="lgDash"/>
-          </a:ln>
-        </p:spPr>
-        <p:style>
-          <a:lnRef idx="2">
-            <a:schemeClr val="accent1">
-              <a:shade val="50000"/>
-            </a:schemeClr>
-          </a:lnRef>
-          <a:fillRef idx="1">
-            <a:schemeClr val="accent1"/>
-          </a:fillRef>
-          <a:effectRef idx="0">
-            <a:schemeClr val="accent1"/>
-          </a:effectRef>
-          <a:fontRef idx="minor">
-            <a:schemeClr val="lt1"/>
-          </a:fontRef>
-        </p:style>
-        <p:txBody>
-          <a:bodyPr rtlCol="0" anchor="ctr"/>
-          <a:lstStyle/>
-          <a:p>
-            <a:pPr algn="ctr"/>
-            <a:r>
-              <a:rPr lang="en-US" dirty="0" smtClean="0">
-                <a:solidFill>
-                  <a:schemeClr val="tx1"/>
-                </a:solidFill>
-              </a:rPr>
-              <a:t>Splitter</a:t>
-            </a:r>
-            <a:endParaRPr lang="it-CH" dirty="0">
-              <a:solidFill>
-                <a:schemeClr val="tx1"/>
-              </a:solidFill>
-            </a:endParaRPr>
-          </a:p>
-        </p:txBody>
-      </p:sp>
-      <p:sp>
-        <p:nvSpPr>
-          <p:cNvPr id="6" name="Rounded Rectangle 5"/>
-          <p:cNvSpPr/>
-          <p:nvPr/>
-        </p:nvSpPr>
-        <p:spPr>
-          <a:xfrm>
-            <a:off x="2411760" y="1389028"/>
-            <a:ext cx="1152128" cy="360040"/>
-          </a:xfrm>
-          <a:prstGeom prst="roundRect">
-            <a:avLst/>
-          </a:prstGeom>
-          <a:noFill/>
-          <a:ln>
-            <a:solidFill>
-              <a:schemeClr val="tx1"/>
-            </a:solidFill>
-            <a:prstDash val="lgDash"/>
-          </a:ln>
-        </p:spPr>
-        <p:style>
-          <a:lnRef idx="2">
-            <a:schemeClr val="accent1">
-              <a:shade val="50000"/>
-            </a:schemeClr>
-          </a:lnRef>
-          <a:fillRef idx="1">
-            <a:schemeClr val="accent1"/>
-          </a:fillRef>
-          <a:effectRef idx="0">
-            <a:schemeClr val="accent1"/>
-          </a:effectRef>
-          <a:fontRef idx="minor">
-            <a:schemeClr val="lt1"/>
-          </a:fontRef>
-        </p:style>
-        <p:txBody>
-          <a:bodyPr rtlCol="0" anchor="ctr"/>
-          <a:lstStyle/>
-          <a:p>
-            <a:pPr algn="ctr"/>
-            <a:r>
-              <a:rPr lang="en-US" dirty="0" smtClean="0">
-                <a:solidFill>
-                  <a:schemeClr val="tx1"/>
-                </a:solidFill>
-              </a:rPr>
-              <a:t>Level</a:t>
-            </a:r>
-            <a:endParaRPr lang="it-CH" dirty="0">
-              <a:solidFill>
-                <a:schemeClr val="tx1"/>
-              </a:solidFill>
-            </a:endParaRPr>
-          </a:p>
-        </p:txBody>
-      </p:sp>
       <p:cxnSp>
         <p:nvCxnSpPr>
-          <p:cNvPr id="8" name="Straight Arrow Connector 7"/>
+          <p:cNvPr id="5" name="Straight Arrow Connector 4"/>
           <p:cNvCxnSpPr>
-            <a:stCxn id="4" idx="0"/>
-            <a:endCxn id="6" idx="2"/>
+            <a:stCxn id="2" idx="0"/>
+            <a:endCxn id="3" idx="2"/>
           </p:cNvCxnSpPr>
           <p:nvPr/>
         </p:nvCxnSpPr>
         <p:spPr>
           <a:xfrm flipV="1">
-            <a:off x="2099795" y="1749068"/>
-            <a:ext cx="888029" cy="570941"/>
+            <a:off x="1619672" y="1781200"/>
+            <a:ext cx="3104728" cy="1354760"/>
           </a:xfrm>
           <a:prstGeom prst="straightConnector1">
             <a:avLst/>
           </a:prstGeom>
           <a:ln w="19050">
             <a:solidFill>
-              <a:srgbClr val="00B050"/>
+              <a:schemeClr val="tx1"/>
             </a:solidFill>
             <a:tailEnd type="arrow"/>
           </a:ln>
@@ -4613,24 +4378,24 @@
       </p:cxnSp>
       <p:cxnSp>
         <p:nvCxnSpPr>
-          <p:cNvPr id="9" name="Straight Arrow Connector 8"/>
+          <p:cNvPr id="8" name="Straight Arrow Connector 7"/>
           <p:cNvCxnSpPr>
             <a:stCxn id="4" idx="0"/>
-            <a:endCxn id="5" idx="2"/>
+            <a:endCxn id="21" idx="2"/>
           </p:cNvCxnSpPr>
           <p:nvPr/>
         </p:nvCxnSpPr>
         <p:spPr>
-          <a:xfrm flipH="1" flipV="1">
-            <a:off x="1163691" y="1749068"/>
-            <a:ext cx="936104" cy="570941"/>
+          <a:xfrm flipV="1">
+            <a:off x="6741473" y="2787025"/>
+            <a:ext cx="134783" cy="1273338"/>
           </a:xfrm>
           <a:prstGeom prst="straightConnector1">
             <a:avLst/>
           </a:prstGeom>
           <a:ln w="19050">
             <a:solidFill>
-              <a:srgbClr val="00B050"/>
+              <a:schemeClr val="tx1"/>
             </a:solidFill>
             <a:tailEnd type="arrow"/>
           </a:ln>
@@ -4650,26 +4415,553 @@
           </a:fontRef>
         </p:style>
       </p:cxnSp>
+      <p:sp>
+        <p:nvSpPr>
+          <p:cNvPr id="11" name="TextBox 10"/>
+          <p:cNvSpPr txBox="1"/>
+          <p:nvPr/>
+        </p:nvSpPr>
+        <p:spPr>
+          <a:xfrm>
+            <a:off x="5148064" y="620688"/>
+            <a:ext cx="2535208" cy="861774"/>
+          </a:xfrm>
+          <a:prstGeom prst="rect">
+            <a:avLst/>
+          </a:prstGeom>
+          <a:solidFill>
+            <a:schemeClr val="accent3">
+              <a:lumMod val="20000"/>
+              <a:lumOff val="80000"/>
+              <a:alpha val="92000"/>
+            </a:schemeClr>
+          </a:solidFill>
+          <a:ln>
+            <a:solidFill>
+              <a:schemeClr val="accent3">
+                <a:lumMod val="75000"/>
+              </a:schemeClr>
+            </a:solidFill>
+          </a:ln>
+        </p:spPr>
+        <p:txBody>
+          <a:bodyPr wrap="square" rtlCol="0">
+            <a:spAutoFit/>
+          </a:bodyPr>
+          <a:lstStyle/>
+          <a:p>
+            <a:r>
+              <a:rPr lang="en-US" sz="1000" dirty="0" smtClean="0">
+                <a:solidFill>
+                  <a:srgbClr val="FF0000"/>
+                </a:solidFill>
+                <a:latin typeface="Consolas" panose="020B0609020204030204" pitchFamily="49" charset="0"/>
+                <a:ea typeface="Tahoma" panose="020B0604030504040204" pitchFamily="34" charset="0"/>
+                <a:cs typeface="Consolas" panose="020B0609020204030204" pitchFamily="49" charset="0"/>
+              </a:rPr>
+              <a:t>A </a:t>
+            </a:r>
+            <a:r>
+              <a:rPr lang="en-US" sz="1000" b="1" dirty="0" smtClean="0">
+                <a:solidFill>
+                  <a:srgbClr val="FF0000"/>
+                </a:solidFill>
+                <a:latin typeface="Consolas" panose="020B0609020204030204" pitchFamily="49" charset="0"/>
+                <a:ea typeface="Tahoma" panose="020B0604030504040204" pitchFamily="34" charset="0"/>
+                <a:cs typeface="Consolas" panose="020B0609020204030204" pitchFamily="49" charset="0"/>
+              </a:rPr>
+              <a:t>computation</a:t>
+            </a:r>
+            <a:r>
+              <a:rPr lang="en-US" sz="1000" dirty="0" smtClean="0">
+                <a:solidFill>
+                  <a:srgbClr val="FF0000"/>
+                </a:solidFill>
+                <a:latin typeface="Consolas" panose="020B0609020204030204" pitchFamily="49" charset="0"/>
+                <a:ea typeface="Tahoma" panose="020B0604030504040204" pitchFamily="34" charset="0"/>
+                <a:cs typeface="Consolas" panose="020B0609020204030204" pitchFamily="49" charset="0"/>
+              </a:rPr>
+              <a:t> is the application of a (multi-stage) stencil to a domain according to some </a:t>
+            </a:r>
+            <a:r>
+              <a:rPr lang="en-US" sz="1000" b="1" dirty="0" smtClean="0">
+                <a:solidFill>
+                  <a:srgbClr val="FF0000"/>
+                </a:solidFill>
+                <a:latin typeface="Consolas" panose="020B0609020204030204" pitchFamily="49" charset="0"/>
+                <a:ea typeface="Tahoma" panose="020B0604030504040204" pitchFamily="34" charset="0"/>
+                <a:cs typeface="Consolas" panose="020B0609020204030204" pitchFamily="49" charset="0"/>
+              </a:rPr>
+              <a:t>iteration space</a:t>
+            </a:r>
+            <a:r>
+              <a:rPr lang="en-US" sz="1000" dirty="0" smtClean="0">
+                <a:solidFill>
+                  <a:srgbClr val="FF0000"/>
+                </a:solidFill>
+                <a:latin typeface="Consolas" panose="020B0609020204030204" pitchFamily="49" charset="0"/>
+                <a:ea typeface="Tahoma" panose="020B0604030504040204" pitchFamily="34" charset="0"/>
+                <a:cs typeface="Consolas" panose="020B0609020204030204" pitchFamily="49" charset="0"/>
+              </a:rPr>
+              <a:t>, which is constrained by an </a:t>
+            </a:r>
+            <a:r>
+              <a:rPr lang="en-US" sz="1000" b="1" dirty="0" smtClean="0">
+                <a:solidFill>
+                  <a:srgbClr val="FF0000"/>
+                </a:solidFill>
+                <a:latin typeface="Consolas" panose="020B0609020204030204" pitchFamily="49" charset="0"/>
+                <a:ea typeface="Tahoma" panose="020B0604030504040204" pitchFamily="34" charset="0"/>
+                <a:cs typeface="Consolas" panose="020B0609020204030204" pitchFamily="49" charset="0"/>
+              </a:rPr>
+              <a:t>execution model</a:t>
+            </a:r>
+            <a:endParaRPr lang="en-US" sz="1000" dirty="0" smtClean="0">
+              <a:solidFill>
+                <a:srgbClr val="FF0000"/>
+              </a:solidFill>
+              <a:latin typeface="Consolas" panose="020B0609020204030204" pitchFamily="49" charset="0"/>
+              <a:ea typeface="Tahoma" panose="020B0604030504040204" pitchFamily="34" charset="0"/>
+              <a:cs typeface="Consolas" panose="020B0609020204030204" pitchFamily="49" charset="0"/>
+            </a:endParaRPr>
+          </a:p>
+        </p:txBody>
+      </p:sp>
+      <p:grpSp>
+        <p:nvGrpSpPr>
+          <p:cNvPr id="18" name="Group 17"/>
+          <p:cNvGrpSpPr/>
+          <p:nvPr/>
+        </p:nvGrpSpPr>
+        <p:grpSpPr>
+          <a:xfrm>
+            <a:off x="179512" y="3135960"/>
+            <a:ext cx="2808312" cy="1162143"/>
+            <a:chOff x="1619672" y="3356992"/>
+            <a:chExt cx="2808312" cy="1162143"/>
+          </a:xfrm>
+        </p:grpSpPr>
+        <p:sp>
+          <p:nvSpPr>
+            <p:cNvPr id="2" name="Rounded Rectangle 1"/>
+            <p:cNvSpPr/>
+            <p:nvPr/>
+          </p:nvSpPr>
+          <p:spPr>
+            <a:xfrm>
+              <a:off x="1835696" y="3356992"/>
+              <a:ext cx="2448272" cy="360040"/>
+            </a:xfrm>
+            <a:prstGeom prst="roundRect">
+              <a:avLst/>
+            </a:prstGeom>
+            <a:noFill/>
+            <a:ln>
+              <a:solidFill>
+                <a:schemeClr val="tx1"/>
+              </a:solidFill>
+              <a:prstDash val="lgDash"/>
+            </a:ln>
+          </p:spPr>
+          <p:style>
+            <a:lnRef idx="2">
+              <a:schemeClr val="accent1">
+                <a:shade val="50000"/>
+              </a:schemeClr>
+            </a:lnRef>
+            <a:fillRef idx="1">
+              <a:schemeClr val="accent1"/>
+            </a:fillRef>
+            <a:effectRef idx="0">
+              <a:schemeClr val="accent1"/>
+            </a:effectRef>
+            <a:fontRef idx="minor">
+              <a:schemeClr val="lt1"/>
+            </a:fontRef>
+          </p:style>
+          <p:txBody>
+            <a:bodyPr rtlCol="0" anchor="ctr"/>
+            <a:lstStyle/>
+            <a:p>
+              <a:pPr algn="ctr"/>
+              <a:r>
+                <a:rPr lang="en-US" dirty="0" err="1" smtClean="0">
+                  <a:solidFill>
+                    <a:schemeClr val="tx1"/>
+                  </a:solidFill>
+                </a:rPr>
+                <a:t>CartesianTraversal</a:t>
+              </a:r>
+              <a:endParaRPr lang="it-CH" dirty="0">
+                <a:solidFill>
+                  <a:schemeClr val="tx1"/>
+                </a:solidFill>
+              </a:endParaRPr>
+            </a:p>
+          </p:txBody>
+        </p:sp>
+        <p:sp>
+          <p:nvSpPr>
+            <p:cNvPr id="15" name="TextBox 14"/>
+            <p:cNvSpPr txBox="1"/>
+            <p:nvPr/>
+          </p:nvSpPr>
+          <p:spPr>
+            <a:xfrm>
+              <a:off x="1619672" y="3657361"/>
+              <a:ext cx="2808312" cy="861774"/>
+            </a:xfrm>
+            <a:prstGeom prst="rect">
+              <a:avLst/>
+            </a:prstGeom>
+            <a:solidFill>
+              <a:schemeClr val="accent3">
+                <a:lumMod val="20000"/>
+                <a:lumOff val="80000"/>
+                <a:alpha val="92000"/>
+              </a:schemeClr>
+            </a:solidFill>
+            <a:ln>
+              <a:solidFill>
+                <a:schemeClr val="accent3">
+                  <a:lumMod val="75000"/>
+                </a:schemeClr>
+              </a:solidFill>
+            </a:ln>
+          </p:spPr>
+          <p:txBody>
+            <a:bodyPr wrap="square" rtlCol="0">
+              <a:spAutoFit/>
+            </a:bodyPr>
+            <a:lstStyle/>
+            <a:p>
+              <a:r>
+                <a:rPr lang="en-US" sz="1000" dirty="0" smtClean="0">
+                  <a:solidFill>
+                    <a:srgbClr val="FF0000"/>
+                  </a:solidFill>
+                  <a:latin typeface="Consolas" panose="020B0609020204030204" pitchFamily="49" charset="0"/>
+                  <a:ea typeface="Tahoma" panose="020B0604030504040204" pitchFamily="34" charset="0"/>
+                  <a:cs typeface="Consolas" panose="020B0609020204030204" pitchFamily="49" charset="0"/>
+                </a:rPr>
+                <a:t>Traversal based on integral coordinates (the universal </a:t>
+              </a:r>
+              <a:r>
+                <a:rPr lang="en-US" sz="1000" dirty="0" err="1" smtClean="0">
+                  <a:solidFill>
+                    <a:srgbClr val="FF0000"/>
+                  </a:solidFill>
+                  <a:latin typeface="Consolas" panose="020B0609020204030204" pitchFamily="49" charset="0"/>
+                  <a:ea typeface="Tahoma" panose="020B0604030504040204" pitchFamily="34" charset="0"/>
+                  <a:cs typeface="Consolas" panose="020B0609020204030204" pitchFamily="49" charset="0"/>
+                </a:rPr>
+                <a:t>i</a:t>
+              </a:r>
+              <a:r>
+                <a:rPr lang="en-US" sz="1000" dirty="0" smtClean="0">
+                  <a:solidFill>
+                    <a:srgbClr val="FF0000"/>
+                  </a:solidFill>
+                  <a:latin typeface="Consolas" panose="020B0609020204030204" pitchFamily="49" charset="0"/>
+                  <a:ea typeface="Tahoma" panose="020B0604030504040204" pitchFamily="34" charset="0"/>
+                  <a:cs typeface="Consolas" panose="020B0609020204030204" pitchFamily="49" charset="0"/>
+                </a:rPr>
+                <a:t>, j, and k) which identifies either the nodes, the edges, or the surfaces of a regular grid of brick-like elements</a:t>
+              </a:r>
+              <a:endParaRPr lang="it-CH" sz="1000" b="1" dirty="0">
+                <a:solidFill>
+                  <a:srgbClr val="FF0000"/>
+                </a:solidFill>
+                <a:latin typeface="Consolas" panose="020B0609020204030204" pitchFamily="49" charset="0"/>
+                <a:ea typeface="Tahoma" panose="020B0604030504040204" pitchFamily="34" charset="0"/>
+                <a:cs typeface="Consolas" panose="020B0609020204030204" pitchFamily="49" charset="0"/>
+              </a:endParaRPr>
+            </a:p>
+          </p:txBody>
+        </p:sp>
+      </p:grpSp>
+      <p:grpSp>
+        <p:nvGrpSpPr>
+          <p:cNvPr id="19" name="Group 18"/>
+          <p:cNvGrpSpPr/>
+          <p:nvPr/>
+        </p:nvGrpSpPr>
+        <p:grpSpPr>
+          <a:xfrm>
+            <a:off x="5517337" y="4060363"/>
+            <a:ext cx="2535208" cy="1303695"/>
+            <a:chOff x="5004048" y="3356992"/>
+            <a:chExt cx="2535208" cy="1303695"/>
+          </a:xfrm>
+        </p:grpSpPr>
+        <p:sp>
+          <p:nvSpPr>
+            <p:cNvPr id="4" name="Rounded Rectangle 3"/>
+            <p:cNvSpPr/>
+            <p:nvPr/>
+          </p:nvSpPr>
+          <p:spPr>
+            <a:xfrm>
+              <a:off x="5148064" y="3356992"/>
+              <a:ext cx="2160240" cy="360040"/>
+            </a:xfrm>
+            <a:prstGeom prst="roundRect">
+              <a:avLst/>
+            </a:prstGeom>
+            <a:noFill/>
+            <a:ln>
+              <a:solidFill>
+                <a:schemeClr val="tx1"/>
+              </a:solidFill>
+              <a:prstDash val="lgDash"/>
+            </a:ln>
+          </p:spPr>
+          <p:style>
+            <a:lnRef idx="2">
+              <a:schemeClr val="accent1">
+                <a:shade val="50000"/>
+              </a:schemeClr>
+            </a:lnRef>
+            <a:fillRef idx="1">
+              <a:schemeClr val="accent1"/>
+            </a:fillRef>
+            <a:effectRef idx="0">
+              <a:schemeClr val="accent1"/>
+            </a:effectRef>
+            <a:fontRef idx="minor">
+              <a:schemeClr val="lt1"/>
+            </a:fontRef>
+          </p:style>
+          <p:txBody>
+            <a:bodyPr rtlCol="0" anchor="ctr"/>
+            <a:lstStyle/>
+            <a:p>
+              <a:pPr algn="ctr"/>
+              <a:r>
+                <a:rPr lang="en-US" dirty="0" smtClean="0">
+                  <a:solidFill>
+                    <a:schemeClr val="tx1"/>
+                  </a:solidFill>
+                </a:rPr>
+                <a:t>2DNodeListTraversal</a:t>
+              </a:r>
+              <a:endParaRPr lang="it-CH" dirty="0">
+                <a:solidFill>
+                  <a:schemeClr val="tx1"/>
+                </a:solidFill>
+              </a:endParaRPr>
+            </a:p>
+          </p:txBody>
+        </p:sp>
+        <p:sp>
+          <p:nvSpPr>
+            <p:cNvPr id="16" name="TextBox 15"/>
+            <p:cNvSpPr txBox="1"/>
+            <p:nvPr/>
+          </p:nvSpPr>
+          <p:spPr>
+            <a:xfrm>
+              <a:off x="5004048" y="3645024"/>
+              <a:ext cx="2535208" cy="1015663"/>
+            </a:xfrm>
+            <a:prstGeom prst="rect">
+              <a:avLst/>
+            </a:prstGeom>
+            <a:solidFill>
+              <a:schemeClr val="accent3">
+                <a:lumMod val="20000"/>
+                <a:lumOff val="80000"/>
+                <a:alpha val="92000"/>
+              </a:schemeClr>
+            </a:solidFill>
+            <a:ln>
+              <a:solidFill>
+                <a:schemeClr val="accent3">
+                  <a:lumMod val="75000"/>
+                </a:schemeClr>
+              </a:solidFill>
+            </a:ln>
+          </p:spPr>
+          <p:txBody>
+            <a:bodyPr wrap="square" rtlCol="0">
+              <a:spAutoFit/>
+            </a:bodyPr>
+            <a:lstStyle/>
+            <a:p>
+              <a:r>
+                <a:rPr lang="en-US" sz="1000" dirty="0" smtClean="0">
+                  <a:solidFill>
+                    <a:srgbClr val="FF0000"/>
+                  </a:solidFill>
+                  <a:latin typeface="Consolas" panose="020B0609020204030204" pitchFamily="49" charset="0"/>
+                  <a:ea typeface="Tahoma" panose="020B0604030504040204" pitchFamily="34" charset="0"/>
+                  <a:cs typeface="Consolas" panose="020B0609020204030204" pitchFamily="49" charset="0"/>
+                </a:rPr>
+                <a:t>Traversal of nodes of a graph in a parallel collection. Accessing of edges and surfaces are explicit. Each node is a column of cells accessed from the actual graph node</a:t>
+              </a:r>
+              <a:endParaRPr lang="it-CH" sz="1000" b="1" dirty="0">
+                <a:solidFill>
+                  <a:srgbClr val="FF0000"/>
+                </a:solidFill>
+                <a:latin typeface="Consolas" panose="020B0609020204030204" pitchFamily="49" charset="0"/>
+                <a:ea typeface="Tahoma" panose="020B0604030504040204" pitchFamily="34" charset="0"/>
+                <a:cs typeface="Consolas" panose="020B0609020204030204" pitchFamily="49" charset="0"/>
+              </a:endParaRPr>
+            </a:p>
+          </p:txBody>
+        </p:sp>
+      </p:grpSp>
+      <p:grpSp>
+        <p:nvGrpSpPr>
+          <p:cNvPr id="20" name="Group 19"/>
+          <p:cNvGrpSpPr/>
+          <p:nvPr/>
+        </p:nvGrpSpPr>
+        <p:grpSpPr>
+          <a:xfrm>
+            <a:off x="3628432" y="2426985"/>
+            <a:ext cx="4327944" cy="1009344"/>
+            <a:chOff x="2980360" y="3356992"/>
+            <a:chExt cx="4327944" cy="1009344"/>
+          </a:xfrm>
+        </p:grpSpPr>
+        <p:sp>
+          <p:nvSpPr>
+            <p:cNvPr id="21" name="Rounded Rectangle 20"/>
+            <p:cNvSpPr/>
+            <p:nvPr/>
+          </p:nvSpPr>
+          <p:spPr>
+            <a:xfrm>
+              <a:off x="5148064" y="3356992"/>
+              <a:ext cx="2160240" cy="360040"/>
+            </a:xfrm>
+            <a:prstGeom prst="roundRect">
+              <a:avLst/>
+            </a:prstGeom>
+            <a:noFill/>
+            <a:ln>
+              <a:solidFill>
+                <a:schemeClr val="tx1"/>
+              </a:solidFill>
+              <a:prstDash val="lgDash"/>
+            </a:ln>
+          </p:spPr>
+          <p:style>
+            <a:lnRef idx="2">
+              <a:schemeClr val="accent1">
+                <a:shade val="50000"/>
+              </a:schemeClr>
+            </a:lnRef>
+            <a:fillRef idx="1">
+              <a:schemeClr val="accent1"/>
+            </a:fillRef>
+            <a:effectRef idx="0">
+              <a:schemeClr val="accent1"/>
+            </a:effectRef>
+            <a:fontRef idx="minor">
+              <a:schemeClr val="lt1"/>
+            </a:fontRef>
+          </p:style>
+          <p:txBody>
+            <a:bodyPr rtlCol="0" anchor="ctr"/>
+            <a:lstStyle/>
+            <a:p>
+              <a:pPr algn="ctr"/>
+              <a:r>
+                <a:rPr lang="en-US" dirty="0" err="1" smtClean="0">
+                  <a:solidFill>
+                    <a:schemeClr val="tx1"/>
+                  </a:solidFill>
+                </a:rPr>
+                <a:t>NodeListTraversal</a:t>
+              </a:r>
+              <a:endParaRPr lang="it-CH" dirty="0">
+                <a:solidFill>
+                  <a:schemeClr val="tx1"/>
+                </a:solidFill>
+              </a:endParaRPr>
+            </a:p>
+          </p:txBody>
+        </p:sp>
+        <p:sp>
+          <p:nvSpPr>
+            <p:cNvPr id="22" name="TextBox 21"/>
+            <p:cNvSpPr txBox="1"/>
+            <p:nvPr/>
+          </p:nvSpPr>
+          <p:spPr>
+            <a:xfrm>
+              <a:off x="2980360" y="3658450"/>
+              <a:ext cx="2535208" cy="707886"/>
+            </a:xfrm>
+            <a:prstGeom prst="rect">
+              <a:avLst/>
+            </a:prstGeom>
+            <a:solidFill>
+              <a:schemeClr val="accent3">
+                <a:lumMod val="20000"/>
+                <a:lumOff val="80000"/>
+                <a:alpha val="92000"/>
+              </a:schemeClr>
+            </a:solidFill>
+            <a:ln>
+              <a:solidFill>
+                <a:schemeClr val="accent3">
+                  <a:lumMod val="75000"/>
+                </a:schemeClr>
+              </a:solidFill>
+            </a:ln>
+          </p:spPr>
+          <p:txBody>
+            <a:bodyPr wrap="square" rtlCol="0">
+              <a:spAutoFit/>
+            </a:bodyPr>
+            <a:lstStyle/>
+            <a:p>
+              <a:r>
+                <a:rPr lang="en-US" sz="1000" dirty="0" smtClean="0">
+                  <a:solidFill>
+                    <a:srgbClr val="FF0000"/>
+                  </a:solidFill>
+                  <a:latin typeface="Consolas" panose="020B0609020204030204" pitchFamily="49" charset="0"/>
+                  <a:ea typeface="Tahoma" panose="020B0604030504040204" pitchFamily="34" charset="0"/>
+                  <a:cs typeface="Consolas" panose="020B0609020204030204" pitchFamily="49" charset="0"/>
+                </a:rPr>
+                <a:t>Traversal of nodes of a graph in a parallel collection. Accessing of edges and surfaces are explicit. </a:t>
+              </a:r>
+              <a:endParaRPr lang="it-CH" sz="1000" b="1" dirty="0">
+                <a:solidFill>
+                  <a:srgbClr val="FF0000"/>
+                </a:solidFill>
+                <a:latin typeface="Consolas" panose="020B0609020204030204" pitchFamily="49" charset="0"/>
+                <a:ea typeface="Tahoma" panose="020B0604030504040204" pitchFamily="34" charset="0"/>
+                <a:cs typeface="Consolas" panose="020B0609020204030204" pitchFamily="49" charset="0"/>
+              </a:endParaRPr>
+            </a:p>
+          </p:txBody>
+        </p:sp>
+      </p:grpSp>
       <p:cxnSp>
         <p:nvCxnSpPr>
-          <p:cNvPr id="12" name="Straight Arrow Connector 11"/>
+          <p:cNvPr id="23" name="Straight Arrow Connector 22"/>
           <p:cNvCxnSpPr>
-            <a:stCxn id="3" idx="0"/>
-            <a:endCxn id="4" idx="2"/>
+            <a:stCxn id="21" idx="0"/>
+            <a:endCxn id="3" idx="2"/>
           </p:cNvCxnSpPr>
           <p:nvPr/>
         </p:nvCxnSpPr>
         <p:spPr>
-          <a:xfrm flipV="1">
-            <a:off x="2092256" y="2680049"/>
-            <a:ext cx="7539" cy="691080"/>
+          <a:xfrm flipH="1" flipV="1">
+            <a:off x="4724400" y="1781200"/>
+            <a:ext cx="2151856" cy="645785"/>
           </a:xfrm>
           <a:prstGeom prst="straightConnector1">
             <a:avLst/>
           </a:prstGeom>
           <a:ln w="19050">
             <a:solidFill>
-              <a:srgbClr val="00B050"/>
+              <a:schemeClr val="tx1"/>
             </a:solidFill>
             <a:tailEnd type="arrow"/>
           </a:ln>
@@ -4689,402 +4981,103 @@
           </a:fontRef>
         </p:style>
       </p:cxnSp>
-      <p:cxnSp>
-        <p:nvCxnSpPr>
-          <p:cNvPr id="15" name="Straight Arrow Connector 14"/>
-          <p:cNvCxnSpPr>
-            <a:stCxn id="2" idx="0"/>
-            <a:endCxn id="3" idx="2"/>
-          </p:cNvCxnSpPr>
+      <p:sp>
+        <p:nvSpPr>
+          <p:cNvPr id="26" name="TextBox 25"/>
+          <p:cNvSpPr txBox="1"/>
           <p:nvPr/>
-        </p:nvCxnSpPr>
-        <p:spPr>
-          <a:xfrm flipV="1">
-            <a:off x="2092256" y="3731169"/>
-            <a:ext cx="0" cy="648072"/>
-          </a:xfrm>
-          <a:prstGeom prst="straightConnector1">
+        </p:nvSpPr>
+        <p:spPr>
+          <a:xfrm>
+            <a:off x="1904432" y="5013176"/>
+            <a:ext cx="2535208" cy="861774"/>
+          </a:xfrm>
+          <a:prstGeom prst="rect">
             <a:avLst/>
           </a:prstGeom>
-          <a:ln w="19050">
-            <a:solidFill>
-              <a:srgbClr val="00B050"/>
-            </a:solidFill>
-            <a:tailEnd type="arrow"/>
-          </a:ln>
-        </p:spPr>
-        <p:style>
-          <a:lnRef idx="1">
-            <a:schemeClr val="accent1"/>
-          </a:lnRef>
-          <a:fillRef idx="0">
-            <a:schemeClr val="accent1"/>
-          </a:fillRef>
-          <a:effectRef idx="0">
-            <a:schemeClr val="accent1"/>
-          </a:effectRef>
-          <a:fontRef idx="minor">
-            <a:schemeClr val="tx1"/>
-          </a:fontRef>
-        </p:style>
-      </p:cxnSp>
-      <p:cxnSp>
-        <p:nvCxnSpPr>
-          <p:cNvPr id="19" name="Straight Arrow Connector 18"/>
-          <p:cNvCxnSpPr>
-            <a:stCxn id="21" idx="2"/>
-            <a:endCxn id="20" idx="0"/>
-          </p:cNvCxnSpPr>
-          <p:nvPr/>
-        </p:nvCxnSpPr>
-        <p:spPr>
-          <a:xfrm>
-            <a:off x="4716016" y="2500029"/>
-            <a:ext cx="1658189" cy="1879212"/>
-          </a:xfrm>
-          <a:prstGeom prst="straightConnector1">
-            <a:avLst/>
-          </a:prstGeom>
-          <a:ln w="19050">
-            <a:solidFill>
-              <a:srgbClr val="C00000"/>
-            </a:solidFill>
-            <a:tailEnd type="arrow"/>
-          </a:ln>
-        </p:spPr>
-        <p:style>
-          <a:lnRef idx="1">
-            <a:schemeClr val="accent1"/>
-          </a:lnRef>
-          <a:fillRef idx="0">
-            <a:schemeClr val="accent1"/>
-          </a:fillRef>
-          <a:effectRef idx="0">
-            <a:schemeClr val="accent1"/>
-          </a:effectRef>
-          <a:fontRef idx="minor">
-            <a:schemeClr val="tx1"/>
-          </a:fontRef>
-        </p:style>
-      </p:cxnSp>
-      <p:sp>
-        <p:nvSpPr>
-          <p:cNvPr id="20" name="Rounded Rectangle 19"/>
-          <p:cNvSpPr/>
-          <p:nvPr/>
-        </p:nvSpPr>
-        <p:spPr>
-          <a:xfrm>
-            <a:off x="5798141" y="4379241"/>
-            <a:ext cx="1152128" cy="360040"/>
-          </a:xfrm>
-          <a:prstGeom prst="roundRect">
-            <a:avLst/>
-          </a:prstGeom>
-          <a:noFill/>
+          <a:solidFill>
+            <a:schemeClr val="accent3">
+              <a:lumMod val="20000"/>
+              <a:lumOff val="80000"/>
+              <a:alpha val="92000"/>
+            </a:schemeClr>
+          </a:solidFill>
           <a:ln>
             <a:solidFill>
-              <a:schemeClr val="tx1"/>
+              <a:schemeClr val="accent3">
+                <a:lumMod val="75000"/>
+              </a:schemeClr>
             </a:solidFill>
-            <a:prstDash val="lgDash"/>
           </a:ln>
         </p:spPr>
-        <p:style>
-          <a:lnRef idx="2">
-            <a:schemeClr val="accent1">
-              <a:shade val="50000"/>
-            </a:schemeClr>
-          </a:lnRef>
-          <a:fillRef idx="1">
-            <a:schemeClr val="accent1"/>
-          </a:fillRef>
-          <a:effectRef idx="0">
-            <a:schemeClr val="accent1"/>
-          </a:effectRef>
-          <a:fontRef idx="minor">
-            <a:schemeClr val="lt1"/>
-          </a:fontRef>
-        </p:style>
-        <p:txBody>
-          <a:bodyPr rtlCol="0" anchor="ctr"/>
+        <p:txBody>
+          <a:bodyPr wrap="square" rtlCol="0">
+            <a:spAutoFit/>
+          </a:bodyPr>
           <a:lstStyle/>
           <a:p>
-            <a:pPr algn="ctr"/>
-            <a:r>
-              <a:rPr lang="en-US" dirty="0" smtClean="0">
+            <a:r>
+              <a:rPr lang="en-US" sz="1000" dirty="0" smtClean="0">
                 <a:solidFill>
-                  <a:schemeClr val="tx1"/>
+                  <a:srgbClr val="FF0000"/>
                 </a:solidFill>
+                <a:latin typeface="Consolas" panose="020B0609020204030204" pitchFamily="49" charset="0"/>
+                <a:ea typeface="Tahoma" panose="020B0604030504040204" pitchFamily="34" charset="0"/>
+                <a:cs typeface="Consolas" panose="020B0609020204030204" pitchFamily="49" charset="0"/>
               </a:rPr>
-              <a:t>Execution</a:t>
-            </a:r>
-            <a:endParaRPr lang="it-CH" dirty="0">
-              <a:solidFill>
-                <a:schemeClr val="tx1"/>
-              </a:solidFill>
-            </a:endParaRPr>
-          </a:p>
-        </p:txBody>
-      </p:sp>
-      <p:sp>
-        <p:nvSpPr>
-          <p:cNvPr id="21" name="Rounded Rectangle 20"/>
-          <p:cNvSpPr/>
-          <p:nvPr/>
-        </p:nvSpPr>
-        <p:spPr>
-          <a:xfrm>
-            <a:off x="4139952" y="2139989"/>
-            <a:ext cx="1152128" cy="360040"/>
-          </a:xfrm>
-          <a:prstGeom prst="roundRect">
-            <a:avLst/>
-          </a:prstGeom>
-          <a:noFill/>
-          <a:ln>
-            <a:solidFill>
-              <a:schemeClr val="tx1"/>
-            </a:solidFill>
-            <a:prstDash val="lgDash"/>
-          </a:ln>
-        </p:spPr>
-        <p:style>
-          <a:lnRef idx="2">
-            <a:schemeClr val="accent1">
-              <a:shade val="50000"/>
-            </a:schemeClr>
-          </a:lnRef>
-          <a:fillRef idx="1">
-            <a:schemeClr val="accent1"/>
-          </a:fillRef>
-          <a:effectRef idx="0">
-            <a:schemeClr val="accent1"/>
-          </a:effectRef>
-          <a:fontRef idx="minor">
-            <a:schemeClr val="lt1"/>
-          </a:fontRef>
-        </p:style>
-        <p:txBody>
-          <a:bodyPr rtlCol="0" anchor="ctr"/>
-          <a:lstStyle/>
-          <a:p>
-            <a:pPr algn="ctr"/>
-            <a:r>
-              <a:rPr lang="en-US" dirty="0" smtClean="0">
+              <a:t>Other concepts can be introduced, as for instance a </a:t>
+            </a:r>
+            <a:r>
+              <a:rPr lang="en-US" sz="1000" dirty="0">
                 <a:solidFill>
-                  <a:schemeClr val="tx1"/>
+                  <a:srgbClr val="FF0000"/>
                 </a:solidFill>
+                <a:latin typeface="Consolas" panose="020B0609020204030204" pitchFamily="49" charset="0"/>
+                <a:ea typeface="Tahoma" panose="020B0604030504040204" pitchFamily="34" charset="0"/>
+                <a:cs typeface="Consolas" panose="020B0609020204030204" pitchFamily="49" charset="0"/>
               </a:rPr>
-              <a:t>Upward</a:t>
-            </a:r>
-            <a:endParaRPr lang="it-CH" dirty="0">
-              <a:solidFill>
-                <a:schemeClr val="tx1"/>
-              </a:solidFill>
-            </a:endParaRPr>
-          </a:p>
-        </p:txBody>
-      </p:sp>
-      <p:sp>
-        <p:nvSpPr>
-          <p:cNvPr id="22" name="Rounded Rectangle 21"/>
-          <p:cNvSpPr/>
-          <p:nvPr/>
-        </p:nvSpPr>
-        <p:spPr>
-          <a:xfrm>
-            <a:off x="5726133" y="2139989"/>
-            <a:ext cx="1296144" cy="360040"/>
-          </a:xfrm>
-          <a:prstGeom prst="roundRect">
-            <a:avLst/>
-          </a:prstGeom>
-          <a:noFill/>
-          <a:ln>
-            <a:solidFill>
-              <a:schemeClr val="tx1"/>
-            </a:solidFill>
-            <a:prstDash val="lgDash"/>
-          </a:ln>
-        </p:spPr>
-        <p:style>
-          <a:lnRef idx="2">
-            <a:schemeClr val="accent1">
-              <a:shade val="50000"/>
-            </a:schemeClr>
-          </a:lnRef>
-          <a:fillRef idx="1">
-            <a:schemeClr val="accent1"/>
-          </a:fillRef>
-          <a:effectRef idx="0">
-            <a:schemeClr val="accent1"/>
-          </a:effectRef>
-          <a:fontRef idx="minor">
-            <a:schemeClr val="lt1"/>
-          </a:fontRef>
-        </p:style>
-        <p:txBody>
-          <a:bodyPr rtlCol="0" anchor="ctr"/>
-          <a:lstStyle/>
-          <a:p>
-            <a:pPr algn="ctr"/>
-            <a:r>
-              <a:rPr lang="en-US" dirty="0" smtClean="0">
+              <a:t>C</a:t>
+            </a:r>
+            <a:r>
+              <a:rPr lang="en-US" sz="1000" dirty="0" smtClean="0">
                 <a:solidFill>
-                  <a:schemeClr val="tx1"/>
+                  <a:srgbClr val="FF0000"/>
                 </a:solidFill>
+                <a:latin typeface="Consolas" panose="020B0609020204030204" pitchFamily="49" charset="0"/>
+                <a:ea typeface="Tahoma" panose="020B0604030504040204" pitchFamily="34" charset="0"/>
+                <a:cs typeface="Consolas" panose="020B0609020204030204" pitchFamily="49" charset="0"/>
               </a:rPr>
-              <a:t>Downward</a:t>
-            </a:r>
-            <a:endParaRPr lang="it-CH" dirty="0">
-              <a:solidFill>
-                <a:schemeClr val="tx1"/>
-              </a:solidFill>
-            </a:endParaRPr>
-          </a:p>
-        </p:txBody>
-      </p:sp>
-      <p:sp>
-        <p:nvSpPr>
-          <p:cNvPr id="23" name="Rounded Rectangle 22"/>
-          <p:cNvSpPr/>
-          <p:nvPr/>
-        </p:nvSpPr>
-        <p:spPr>
-          <a:xfrm>
-            <a:off x="7473591" y="2139989"/>
-            <a:ext cx="1152128" cy="360040"/>
-          </a:xfrm>
-          <a:prstGeom prst="roundRect">
-            <a:avLst/>
-          </a:prstGeom>
-          <a:noFill/>
-          <a:ln>
-            <a:solidFill>
-              <a:schemeClr val="tx1"/>
-            </a:solidFill>
-            <a:prstDash val="lgDash"/>
-          </a:ln>
-        </p:spPr>
-        <p:style>
-          <a:lnRef idx="2">
-            <a:schemeClr val="accent1">
-              <a:shade val="50000"/>
-            </a:schemeClr>
-          </a:lnRef>
-          <a:fillRef idx="1">
-            <a:schemeClr val="accent1"/>
-          </a:fillRef>
-          <a:effectRef idx="0">
-            <a:schemeClr val="accent1"/>
-          </a:effectRef>
-          <a:fontRef idx="minor">
-            <a:schemeClr val="lt1"/>
-          </a:fontRef>
-        </p:style>
-        <p:txBody>
-          <a:bodyPr rtlCol="0" anchor="ctr"/>
-          <a:lstStyle/>
-          <a:p>
-            <a:pPr algn="ctr"/>
-            <a:r>
-              <a:rPr lang="en-US" dirty="0" smtClean="0">
+              <a:t>artesian traversal in which we iterate over the nodes only and edges and surfaces are </a:t>
+            </a:r>
+            <a:r>
+              <a:rPr lang="en-US" sz="1000" dirty="0" err="1" smtClean="0">
                 <a:solidFill>
-                  <a:schemeClr val="tx1"/>
+                  <a:srgbClr val="FF0000"/>
                 </a:solidFill>
+                <a:latin typeface="Consolas" panose="020B0609020204030204" pitchFamily="49" charset="0"/>
+                <a:ea typeface="Tahoma" panose="020B0604030504040204" pitchFamily="34" charset="0"/>
+                <a:cs typeface="Consolas" panose="020B0609020204030204" pitchFamily="49" charset="0"/>
               </a:rPr>
-              <a:t>Parallel</a:t>
-            </a:r>
-            <a:endParaRPr lang="it-CH" dirty="0">
-              <a:solidFill>
-                <a:schemeClr val="tx1"/>
-              </a:solidFill>
-            </a:endParaRPr>
-          </a:p>
-        </p:txBody>
-      </p:sp>
-      <p:cxnSp>
-        <p:nvCxnSpPr>
-          <p:cNvPr id="24" name="Straight Arrow Connector 23"/>
-          <p:cNvCxnSpPr>
-            <a:stCxn id="22" idx="2"/>
-            <a:endCxn id="20" idx="0"/>
-          </p:cNvCxnSpPr>
-          <p:nvPr/>
-        </p:nvCxnSpPr>
-        <p:spPr>
-          <a:xfrm>
-            <a:off x="6374205" y="2500029"/>
-            <a:ext cx="0" cy="1879212"/>
-          </a:xfrm>
-          <a:prstGeom prst="straightConnector1">
-            <a:avLst/>
-          </a:prstGeom>
-          <a:ln w="19050">
-            <a:solidFill>
-              <a:srgbClr val="C00000"/>
-            </a:solidFill>
-            <a:tailEnd type="arrow"/>
-          </a:ln>
-        </p:spPr>
-        <p:style>
-          <a:lnRef idx="1">
-            <a:schemeClr val="accent1"/>
-          </a:lnRef>
-          <a:fillRef idx="0">
-            <a:schemeClr val="accent1"/>
-          </a:fillRef>
-          <a:effectRef idx="0">
-            <a:schemeClr val="accent1"/>
-          </a:effectRef>
-          <a:fontRef idx="minor">
-            <a:schemeClr val="tx1"/>
-          </a:fontRef>
-        </p:style>
-      </p:cxnSp>
-      <p:cxnSp>
-        <p:nvCxnSpPr>
-          <p:cNvPr id="25" name="Straight Arrow Connector 24"/>
-          <p:cNvCxnSpPr>
-            <a:stCxn id="23" idx="2"/>
-            <a:endCxn id="20" idx="0"/>
-          </p:cNvCxnSpPr>
-          <p:nvPr/>
-        </p:nvCxnSpPr>
-        <p:spPr>
-          <a:xfrm flipH="1">
-            <a:off x="6374205" y="2500029"/>
-            <a:ext cx="1675450" cy="1879212"/>
-          </a:xfrm>
-          <a:prstGeom prst="straightConnector1">
-            <a:avLst/>
-          </a:prstGeom>
-          <a:ln w="19050">
-            <a:solidFill>
-              <a:srgbClr val="C00000"/>
-            </a:solidFill>
-            <a:tailEnd type="arrow"/>
-          </a:ln>
-        </p:spPr>
-        <p:style>
-          <a:lnRef idx="1">
-            <a:schemeClr val="accent1"/>
-          </a:lnRef>
-          <a:fillRef idx="0">
-            <a:schemeClr val="accent1"/>
-          </a:fillRef>
-          <a:effectRef idx="0">
-            <a:schemeClr val="accent1"/>
-          </a:effectRef>
-          <a:fontRef idx="minor">
-            <a:schemeClr val="tx1"/>
-          </a:fontRef>
-        </p:style>
-      </p:cxnSp>
+              <a:t>accesed</a:t>
+            </a:r>
+            <a:r>
+              <a:rPr lang="en-US" sz="1000" dirty="0" smtClean="0">
+                <a:solidFill>
+                  <a:srgbClr val="FF0000"/>
+                </a:solidFill>
+                <a:latin typeface="Consolas" panose="020B0609020204030204" pitchFamily="49" charset="0"/>
+                <a:ea typeface="Tahoma" panose="020B0604030504040204" pitchFamily="34" charset="0"/>
+                <a:cs typeface="Consolas" panose="020B0609020204030204" pitchFamily="49" charset="0"/>
+              </a:rPr>
+              <a:t> explicitly</a:t>
+            </a:r>
+          </a:p>
+        </p:txBody>
+      </p:sp>
     </p:spTree>
     <p:extLst>
       <p:ext uri="{BB962C8B-B14F-4D97-AF65-F5344CB8AC3E}">
-        <p14:creationId xmlns:p14="http://schemas.microsoft.com/office/powerpoint/2010/main" val="1859482016"/>
+        <p14:creationId xmlns:p14="http://schemas.microsoft.com/office/powerpoint/2010/main" val="240730098"/>
       </p:ext>
     </p:extLst>
   </p:cSld>
@@ -5119,8 +5112,8 @@
         </p:nvSpPr>
         <p:spPr>
           <a:xfrm>
-            <a:off x="5508104" y="5671721"/>
-            <a:ext cx="2448272" cy="360040"/>
+            <a:off x="940128" y="4379241"/>
+            <a:ext cx="2304256" cy="360040"/>
           </a:xfrm>
           <a:prstGeom prst="roundRect">
             <a:avLst/>
@@ -5155,20 +5148,12 @@
           <a:p>
             <a:pPr algn="ctr"/>
             <a:r>
-              <a:rPr lang="en-US" dirty="0" err="1" smtClean="0">
-                <a:solidFill>
-                  <a:schemeClr val="tx1"/>
-                </a:solidFill>
-              </a:rPr>
-              <a:t>MultiStageStencil</a:t>
-            </a:r>
-            <a:r>
               <a:rPr lang="en-US" dirty="0" smtClean="0">
                 <a:solidFill>
                   <a:schemeClr val="tx1"/>
                 </a:solidFill>
               </a:rPr>
-              <a:t> (MSS)</a:t>
+              <a:t>Coordinates</a:t>
             </a:r>
             <a:endParaRPr lang="it-CH" dirty="0">
               <a:solidFill>
@@ -5186,8 +5171,8 @@
         </p:nvSpPr>
         <p:spPr>
           <a:xfrm>
-            <a:off x="1367644" y="5671721"/>
-            <a:ext cx="2448272" cy="360040"/>
+            <a:off x="1516192" y="3371129"/>
+            <a:ext cx="1152128" cy="360040"/>
           </a:xfrm>
           <a:prstGeom prst="roundRect">
             <a:avLst/>
@@ -5222,20 +5207,12 @@
           <a:p>
             <a:pPr algn="ctr"/>
             <a:r>
-              <a:rPr lang="en-US" dirty="0" err="1" smtClean="0">
-                <a:solidFill>
-                  <a:schemeClr val="tx1"/>
-                </a:solidFill>
-              </a:rPr>
-              <a:t>ElementaryStencil</a:t>
-            </a:r>
-            <a:r>
               <a:rPr lang="en-US" dirty="0" smtClean="0">
                 <a:solidFill>
                   <a:schemeClr val="tx1"/>
                 </a:solidFill>
               </a:rPr>
-              <a:t> (ES)</a:t>
+              <a:t>Axis</a:t>
             </a:r>
             <a:endParaRPr lang="it-CH" dirty="0">
               <a:solidFill>
@@ -5253,8 +5230,8 @@
         </p:nvSpPr>
         <p:spPr>
           <a:xfrm>
-            <a:off x="971600" y="1916832"/>
-            <a:ext cx="3240360" cy="360040"/>
+            <a:off x="1523731" y="2320009"/>
+            <a:ext cx="1152128" cy="360040"/>
           </a:xfrm>
           <a:prstGeom prst="roundRect">
             <a:avLst/>
@@ -5289,20 +5266,12 @@
           <a:p>
             <a:pPr algn="ctr"/>
             <a:r>
-              <a:rPr lang="en-US" dirty="0" err="1" smtClean="0">
-                <a:solidFill>
-                  <a:schemeClr val="tx1"/>
-                </a:solidFill>
-              </a:rPr>
-              <a:t>ElementaryStencilFunction</a:t>
-            </a:r>
-            <a:r>
               <a:rPr lang="en-US" dirty="0" smtClean="0">
                 <a:solidFill>
                   <a:schemeClr val="tx1"/>
                 </a:solidFill>
               </a:rPr>
-              <a:t> (ESF)</a:t>
+              <a:t>Interval</a:t>
             </a:r>
             <a:endParaRPr lang="it-CH" dirty="0">
               <a:solidFill>
@@ -5320,7 +5289,7 @@
         </p:nvSpPr>
         <p:spPr>
           <a:xfrm>
-            <a:off x="6156176" y="1914806"/>
+            <a:off x="587627" y="1389028"/>
             <a:ext cx="1152128" cy="360040"/>
           </a:xfrm>
           <a:prstGeom prst="roundRect">
@@ -5361,7 +5330,7 @@
                   <a:schemeClr val="tx1"/>
                 </a:solidFill>
               </a:rPr>
-              <a:t>Execution</a:t>
+              <a:t>Splitter</a:t>
             </a:r>
             <a:endParaRPr lang="it-CH" dirty="0">
               <a:solidFill>
@@ -5379,7 +5348,7 @@
         </p:nvSpPr>
         <p:spPr>
           <a:xfrm>
-            <a:off x="2015716" y="1050710"/>
+            <a:off x="2411760" y="1389028"/>
             <a:ext cx="1152128" cy="360040"/>
           </a:xfrm>
           <a:prstGeom prst="roundRect">
@@ -5420,6 +5389,864 @@
                   <a:schemeClr val="tx1"/>
                 </a:solidFill>
               </a:rPr>
+              <a:t>Level</a:t>
+            </a:r>
+            <a:endParaRPr lang="it-CH" dirty="0">
+              <a:solidFill>
+                <a:schemeClr val="tx1"/>
+              </a:solidFill>
+            </a:endParaRPr>
+          </a:p>
+        </p:txBody>
+      </p:sp>
+      <p:cxnSp>
+        <p:nvCxnSpPr>
+          <p:cNvPr id="8" name="Straight Arrow Connector 7"/>
+          <p:cNvCxnSpPr>
+            <a:stCxn id="4" idx="0"/>
+            <a:endCxn id="6" idx="2"/>
+          </p:cNvCxnSpPr>
+          <p:nvPr/>
+        </p:nvCxnSpPr>
+        <p:spPr>
+          <a:xfrm flipV="1">
+            <a:off x="2099795" y="1749068"/>
+            <a:ext cx="888029" cy="570941"/>
+          </a:xfrm>
+          <a:prstGeom prst="straightConnector1">
+            <a:avLst/>
+          </a:prstGeom>
+          <a:ln w="19050">
+            <a:solidFill>
+              <a:srgbClr val="00B050"/>
+            </a:solidFill>
+            <a:tailEnd type="arrow"/>
+          </a:ln>
+        </p:spPr>
+        <p:style>
+          <a:lnRef idx="1">
+            <a:schemeClr val="accent1"/>
+          </a:lnRef>
+          <a:fillRef idx="0">
+            <a:schemeClr val="accent1"/>
+          </a:fillRef>
+          <a:effectRef idx="0">
+            <a:schemeClr val="accent1"/>
+          </a:effectRef>
+          <a:fontRef idx="minor">
+            <a:schemeClr val="tx1"/>
+          </a:fontRef>
+        </p:style>
+      </p:cxnSp>
+      <p:cxnSp>
+        <p:nvCxnSpPr>
+          <p:cNvPr id="9" name="Straight Arrow Connector 8"/>
+          <p:cNvCxnSpPr>
+            <a:stCxn id="4" idx="0"/>
+            <a:endCxn id="5" idx="2"/>
+          </p:cNvCxnSpPr>
+          <p:nvPr/>
+        </p:nvCxnSpPr>
+        <p:spPr>
+          <a:xfrm flipH="1" flipV="1">
+            <a:off x="1163691" y="1749068"/>
+            <a:ext cx="936104" cy="570941"/>
+          </a:xfrm>
+          <a:prstGeom prst="straightConnector1">
+            <a:avLst/>
+          </a:prstGeom>
+          <a:ln w="19050">
+            <a:solidFill>
+              <a:srgbClr val="00B050"/>
+            </a:solidFill>
+            <a:tailEnd type="arrow"/>
+          </a:ln>
+        </p:spPr>
+        <p:style>
+          <a:lnRef idx="1">
+            <a:schemeClr val="accent1"/>
+          </a:lnRef>
+          <a:fillRef idx="0">
+            <a:schemeClr val="accent1"/>
+          </a:fillRef>
+          <a:effectRef idx="0">
+            <a:schemeClr val="accent1"/>
+          </a:effectRef>
+          <a:fontRef idx="minor">
+            <a:schemeClr val="tx1"/>
+          </a:fontRef>
+        </p:style>
+      </p:cxnSp>
+      <p:cxnSp>
+        <p:nvCxnSpPr>
+          <p:cNvPr id="12" name="Straight Arrow Connector 11"/>
+          <p:cNvCxnSpPr>
+            <a:stCxn id="3" idx="0"/>
+            <a:endCxn id="4" idx="2"/>
+          </p:cNvCxnSpPr>
+          <p:nvPr/>
+        </p:nvCxnSpPr>
+        <p:spPr>
+          <a:xfrm flipV="1">
+            <a:off x="2092256" y="2680049"/>
+            <a:ext cx="7539" cy="691080"/>
+          </a:xfrm>
+          <a:prstGeom prst="straightConnector1">
+            <a:avLst/>
+          </a:prstGeom>
+          <a:ln w="19050">
+            <a:solidFill>
+              <a:srgbClr val="00B050"/>
+            </a:solidFill>
+            <a:tailEnd type="arrow"/>
+          </a:ln>
+        </p:spPr>
+        <p:style>
+          <a:lnRef idx="1">
+            <a:schemeClr val="accent1"/>
+          </a:lnRef>
+          <a:fillRef idx="0">
+            <a:schemeClr val="accent1"/>
+          </a:fillRef>
+          <a:effectRef idx="0">
+            <a:schemeClr val="accent1"/>
+          </a:effectRef>
+          <a:fontRef idx="minor">
+            <a:schemeClr val="tx1"/>
+          </a:fontRef>
+        </p:style>
+      </p:cxnSp>
+      <p:cxnSp>
+        <p:nvCxnSpPr>
+          <p:cNvPr id="15" name="Straight Arrow Connector 14"/>
+          <p:cNvCxnSpPr>
+            <a:stCxn id="2" idx="0"/>
+            <a:endCxn id="3" idx="2"/>
+          </p:cNvCxnSpPr>
+          <p:nvPr/>
+        </p:nvCxnSpPr>
+        <p:spPr>
+          <a:xfrm flipV="1">
+            <a:off x="2092256" y="3731169"/>
+            <a:ext cx="0" cy="648072"/>
+          </a:xfrm>
+          <a:prstGeom prst="straightConnector1">
+            <a:avLst/>
+          </a:prstGeom>
+          <a:ln w="19050">
+            <a:solidFill>
+              <a:srgbClr val="00B050"/>
+            </a:solidFill>
+            <a:tailEnd type="arrow"/>
+          </a:ln>
+        </p:spPr>
+        <p:style>
+          <a:lnRef idx="1">
+            <a:schemeClr val="accent1"/>
+          </a:lnRef>
+          <a:fillRef idx="0">
+            <a:schemeClr val="accent1"/>
+          </a:fillRef>
+          <a:effectRef idx="0">
+            <a:schemeClr val="accent1"/>
+          </a:effectRef>
+          <a:fontRef idx="minor">
+            <a:schemeClr val="tx1"/>
+          </a:fontRef>
+        </p:style>
+      </p:cxnSp>
+      <p:cxnSp>
+        <p:nvCxnSpPr>
+          <p:cNvPr id="19" name="Straight Arrow Connector 18"/>
+          <p:cNvCxnSpPr>
+            <a:stCxn id="21" idx="2"/>
+            <a:endCxn id="20" idx="0"/>
+          </p:cNvCxnSpPr>
+          <p:nvPr/>
+        </p:nvCxnSpPr>
+        <p:spPr>
+          <a:xfrm>
+            <a:off x="4716016" y="2500029"/>
+            <a:ext cx="1658189" cy="1879212"/>
+          </a:xfrm>
+          <a:prstGeom prst="straightConnector1">
+            <a:avLst/>
+          </a:prstGeom>
+          <a:ln w="19050">
+            <a:solidFill>
+              <a:srgbClr val="C00000"/>
+            </a:solidFill>
+            <a:tailEnd type="arrow"/>
+          </a:ln>
+        </p:spPr>
+        <p:style>
+          <a:lnRef idx="1">
+            <a:schemeClr val="accent1"/>
+          </a:lnRef>
+          <a:fillRef idx="0">
+            <a:schemeClr val="accent1"/>
+          </a:fillRef>
+          <a:effectRef idx="0">
+            <a:schemeClr val="accent1"/>
+          </a:effectRef>
+          <a:fontRef idx="minor">
+            <a:schemeClr val="tx1"/>
+          </a:fontRef>
+        </p:style>
+      </p:cxnSp>
+      <p:sp>
+        <p:nvSpPr>
+          <p:cNvPr id="20" name="Rounded Rectangle 19"/>
+          <p:cNvSpPr/>
+          <p:nvPr/>
+        </p:nvSpPr>
+        <p:spPr>
+          <a:xfrm>
+            <a:off x="5798141" y="4379241"/>
+            <a:ext cx="1152128" cy="360040"/>
+          </a:xfrm>
+          <a:prstGeom prst="roundRect">
+            <a:avLst/>
+          </a:prstGeom>
+          <a:noFill/>
+          <a:ln>
+            <a:solidFill>
+              <a:schemeClr val="tx1"/>
+            </a:solidFill>
+            <a:prstDash val="lgDash"/>
+          </a:ln>
+        </p:spPr>
+        <p:style>
+          <a:lnRef idx="2">
+            <a:schemeClr val="accent1">
+              <a:shade val="50000"/>
+            </a:schemeClr>
+          </a:lnRef>
+          <a:fillRef idx="1">
+            <a:schemeClr val="accent1"/>
+          </a:fillRef>
+          <a:effectRef idx="0">
+            <a:schemeClr val="accent1"/>
+          </a:effectRef>
+          <a:fontRef idx="minor">
+            <a:schemeClr val="lt1"/>
+          </a:fontRef>
+        </p:style>
+        <p:txBody>
+          <a:bodyPr rtlCol="0" anchor="ctr"/>
+          <a:lstStyle/>
+          <a:p>
+            <a:pPr algn="ctr"/>
+            <a:r>
+              <a:rPr lang="en-US" dirty="0" smtClean="0">
+                <a:solidFill>
+                  <a:schemeClr val="tx1"/>
+                </a:solidFill>
+              </a:rPr>
+              <a:t>Execution</a:t>
+            </a:r>
+            <a:endParaRPr lang="it-CH" dirty="0">
+              <a:solidFill>
+                <a:schemeClr val="tx1"/>
+              </a:solidFill>
+            </a:endParaRPr>
+          </a:p>
+        </p:txBody>
+      </p:sp>
+      <p:sp>
+        <p:nvSpPr>
+          <p:cNvPr id="21" name="Rounded Rectangle 20"/>
+          <p:cNvSpPr/>
+          <p:nvPr/>
+        </p:nvSpPr>
+        <p:spPr>
+          <a:xfrm>
+            <a:off x="4139952" y="2139989"/>
+            <a:ext cx="1152128" cy="360040"/>
+          </a:xfrm>
+          <a:prstGeom prst="roundRect">
+            <a:avLst/>
+          </a:prstGeom>
+          <a:noFill/>
+          <a:ln>
+            <a:solidFill>
+              <a:schemeClr val="tx1"/>
+            </a:solidFill>
+            <a:prstDash val="lgDash"/>
+          </a:ln>
+        </p:spPr>
+        <p:style>
+          <a:lnRef idx="2">
+            <a:schemeClr val="accent1">
+              <a:shade val="50000"/>
+            </a:schemeClr>
+          </a:lnRef>
+          <a:fillRef idx="1">
+            <a:schemeClr val="accent1"/>
+          </a:fillRef>
+          <a:effectRef idx="0">
+            <a:schemeClr val="accent1"/>
+          </a:effectRef>
+          <a:fontRef idx="minor">
+            <a:schemeClr val="lt1"/>
+          </a:fontRef>
+        </p:style>
+        <p:txBody>
+          <a:bodyPr rtlCol="0" anchor="ctr"/>
+          <a:lstStyle/>
+          <a:p>
+            <a:pPr algn="ctr"/>
+            <a:r>
+              <a:rPr lang="en-US" dirty="0" smtClean="0">
+                <a:solidFill>
+                  <a:schemeClr val="tx1"/>
+                </a:solidFill>
+              </a:rPr>
+              <a:t>Upward</a:t>
+            </a:r>
+            <a:endParaRPr lang="it-CH" dirty="0">
+              <a:solidFill>
+                <a:schemeClr val="tx1"/>
+              </a:solidFill>
+            </a:endParaRPr>
+          </a:p>
+        </p:txBody>
+      </p:sp>
+      <p:sp>
+        <p:nvSpPr>
+          <p:cNvPr id="22" name="Rounded Rectangle 21"/>
+          <p:cNvSpPr/>
+          <p:nvPr/>
+        </p:nvSpPr>
+        <p:spPr>
+          <a:xfrm>
+            <a:off x="5726133" y="2139989"/>
+            <a:ext cx="1296144" cy="360040"/>
+          </a:xfrm>
+          <a:prstGeom prst="roundRect">
+            <a:avLst/>
+          </a:prstGeom>
+          <a:noFill/>
+          <a:ln>
+            <a:solidFill>
+              <a:schemeClr val="tx1"/>
+            </a:solidFill>
+            <a:prstDash val="lgDash"/>
+          </a:ln>
+        </p:spPr>
+        <p:style>
+          <a:lnRef idx="2">
+            <a:schemeClr val="accent1">
+              <a:shade val="50000"/>
+            </a:schemeClr>
+          </a:lnRef>
+          <a:fillRef idx="1">
+            <a:schemeClr val="accent1"/>
+          </a:fillRef>
+          <a:effectRef idx="0">
+            <a:schemeClr val="accent1"/>
+          </a:effectRef>
+          <a:fontRef idx="minor">
+            <a:schemeClr val="lt1"/>
+          </a:fontRef>
+        </p:style>
+        <p:txBody>
+          <a:bodyPr rtlCol="0" anchor="ctr"/>
+          <a:lstStyle/>
+          <a:p>
+            <a:pPr algn="ctr"/>
+            <a:r>
+              <a:rPr lang="en-US" dirty="0" smtClean="0">
+                <a:solidFill>
+                  <a:schemeClr val="tx1"/>
+                </a:solidFill>
+              </a:rPr>
+              <a:t>Downward</a:t>
+            </a:r>
+            <a:endParaRPr lang="it-CH" dirty="0">
+              <a:solidFill>
+                <a:schemeClr val="tx1"/>
+              </a:solidFill>
+            </a:endParaRPr>
+          </a:p>
+        </p:txBody>
+      </p:sp>
+      <p:sp>
+        <p:nvSpPr>
+          <p:cNvPr id="23" name="Rounded Rectangle 22"/>
+          <p:cNvSpPr/>
+          <p:nvPr/>
+        </p:nvSpPr>
+        <p:spPr>
+          <a:xfrm>
+            <a:off x="7473591" y="2139989"/>
+            <a:ext cx="1152128" cy="360040"/>
+          </a:xfrm>
+          <a:prstGeom prst="roundRect">
+            <a:avLst/>
+          </a:prstGeom>
+          <a:noFill/>
+          <a:ln>
+            <a:solidFill>
+              <a:schemeClr val="tx1"/>
+            </a:solidFill>
+            <a:prstDash val="lgDash"/>
+          </a:ln>
+        </p:spPr>
+        <p:style>
+          <a:lnRef idx="2">
+            <a:schemeClr val="accent1">
+              <a:shade val="50000"/>
+            </a:schemeClr>
+          </a:lnRef>
+          <a:fillRef idx="1">
+            <a:schemeClr val="accent1"/>
+          </a:fillRef>
+          <a:effectRef idx="0">
+            <a:schemeClr val="accent1"/>
+          </a:effectRef>
+          <a:fontRef idx="minor">
+            <a:schemeClr val="lt1"/>
+          </a:fontRef>
+        </p:style>
+        <p:txBody>
+          <a:bodyPr rtlCol="0" anchor="ctr"/>
+          <a:lstStyle/>
+          <a:p>
+            <a:pPr algn="ctr"/>
+            <a:r>
+              <a:rPr lang="en-US" dirty="0" smtClean="0">
+                <a:solidFill>
+                  <a:schemeClr val="tx1"/>
+                </a:solidFill>
+              </a:rPr>
+              <a:t>Parallel</a:t>
+            </a:r>
+            <a:endParaRPr lang="it-CH" dirty="0">
+              <a:solidFill>
+                <a:schemeClr val="tx1"/>
+              </a:solidFill>
+            </a:endParaRPr>
+          </a:p>
+        </p:txBody>
+      </p:sp>
+      <p:cxnSp>
+        <p:nvCxnSpPr>
+          <p:cNvPr id="24" name="Straight Arrow Connector 23"/>
+          <p:cNvCxnSpPr>
+            <a:stCxn id="22" idx="2"/>
+            <a:endCxn id="20" idx="0"/>
+          </p:cNvCxnSpPr>
+          <p:nvPr/>
+        </p:nvCxnSpPr>
+        <p:spPr>
+          <a:xfrm>
+            <a:off x="6374205" y="2500029"/>
+            <a:ext cx="0" cy="1879212"/>
+          </a:xfrm>
+          <a:prstGeom prst="straightConnector1">
+            <a:avLst/>
+          </a:prstGeom>
+          <a:ln w="19050">
+            <a:solidFill>
+              <a:srgbClr val="C00000"/>
+            </a:solidFill>
+            <a:tailEnd type="arrow"/>
+          </a:ln>
+        </p:spPr>
+        <p:style>
+          <a:lnRef idx="1">
+            <a:schemeClr val="accent1"/>
+          </a:lnRef>
+          <a:fillRef idx="0">
+            <a:schemeClr val="accent1"/>
+          </a:fillRef>
+          <a:effectRef idx="0">
+            <a:schemeClr val="accent1"/>
+          </a:effectRef>
+          <a:fontRef idx="minor">
+            <a:schemeClr val="tx1"/>
+          </a:fontRef>
+        </p:style>
+      </p:cxnSp>
+      <p:cxnSp>
+        <p:nvCxnSpPr>
+          <p:cNvPr id="25" name="Straight Arrow Connector 24"/>
+          <p:cNvCxnSpPr>
+            <a:stCxn id="23" idx="2"/>
+            <a:endCxn id="20" idx="0"/>
+          </p:cNvCxnSpPr>
+          <p:nvPr/>
+        </p:nvCxnSpPr>
+        <p:spPr>
+          <a:xfrm flipH="1">
+            <a:off x="6374205" y="2500029"/>
+            <a:ext cx="1675450" cy="1879212"/>
+          </a:xfrm>
+          <a:prstGeom prst="straightConnector1">
+            <a:avLst/>
+          </a:prstGeom>
+          <a:ln w="19050">
+            <a:solidFill>
+              <a:srgbClr val="C00000"/>
+            </a:solidFill>
+            <a:tailEnd type="arrow"/>
+          </a:ln>
+        </p:spPr>
+        <p:style>
+          <a:lnRef idx="1">
+            <a:schemeClr val="accent1"/>
+          </a:lnRef>
+          <a:fillRef idx="0">
+            <a:schemeClr val="accent1"/>
+          </a:fillRef>
+          <a:effectRef idx="0">
+            <a:schemeClr val="accent1"/>
+          </a:effectRef>
+          <a:fontRef idx="minor">
+            <a:schemeClr val="tx1"/>
+          </a:fontRef>
+        </p:style>
+      </p:cxnSp>
+    </p:spTree>
+    <p:extLst>
+      <p:ext uri="{BB962C8B-B14F-4D97-AF65-F5344CB8AC3E}">
+        <p14:creationId xmlns:p14="http://schemas.microsoft.com/office/powerpoint/2010/main" val="1859482016"/>
+      </p:ext>
+    </p:extLst>
+  </p:cSld>
+  <p:clrMapOvr>
+    <a:masterClrMapping/>
+  </p:clrMapOvr>
+</p:sld>
+</file>
+
+<file path=ppt/slides/slide5.xml><?xml version="1.0" encoding="utf-8"?>
+<p:sld xmlns:a="http://schemas.openxmlformats.org/drawingml/2006/main" xmlns:r="http://schemas.openxmlformats.org/officeDocument/2006/relationships" xmlns:p="http://schemas.openxmlformats.org/presentationml/2006/main">
+  <p:cSld>
+    <p:spTree>
+      <p:nvGrpSpPr>
+        <p:cNvPr id="1" name=""/>
+        <p:cNvGrpSpPr/>
+        <p:nvPr/>
+      </p:nvGrpSpPr>
+      <p:grpSpPr>
+        <a:xfrm>
+          <a:off x="0" y="0"/>
+          <a:ext cx="0" cy="0"/>
+          <a:chOff x="0" y="0"/>
+          <a:chExt cx="0" cy="0"/>
+        </a:xfrm>
+      </p:grpSpPr>
+      <p:sp>
+        <p:nvSpPr>
+          <p:cNvPr id="2" name="Rounded Rectangle 1"/>
+          <p:cNvSpPr/>
+          <p:nvPr/>
+        </p:nvSpPr>
+        <p:spPr>
+          <a:xfrm>
+            <a:off x="5508104" y="5671721"/>
+            <a:ext cx="2448272" cy="360040"/>
+          </a:xfrm>
+          <a:prstGeom prst="roundRect">
+            <a:avLst/>
+          </a:prstGeom>
+          <a:noFill/>
+          <a:ln>
+            <a:solidFill>
+              <a:schemeClr val="tx1"/>
+            </a:solidFill>
+            <a:prstDash val="lgDash"/>
+          </a:ln>
+        </p:spPr>
+        <p:style>
+          <a:lnRef idx="2">
+            <a:schemeClr val="accent1">
+              <a:shade val="50000"/>
+            </a:schemeClr>
+          </a:lnRef>
+          <a:fillRef idx="1">
+            <a:schemeClr val="accent1"/>
+          </a:fillRef>
+          <a:effectRef idx="0">
+            <a:schemeClr val="accent1"/>
+          </a:effectRef>
+          <a:fontRef idx="minor">
+            <a:schemeClr val="lt1"/>
+          </a:fontRef>
+        </p:style>
+        <p:txBody>
+          <a:bodyPr rtlCol="0" anchor="ctr"/>
+          <a:lstStyle/>
+          <a:p>
+            <a:pPr algn="ctr"/>
+            <a:r>
+              <a:rPr lang="en-US" dirty="0" err="1" smtClean="0">
+                <a:solidFill>
+                  <a:schemeClr val="tx1"/>
+                </a:solidFill>
+              </a:rPr>
+              <a:t>MultiStageStencil</a:t>
+            </a:r>
+            <a:r>
+              <a:rPr lang="en-US" dirty="0" smtClean="0">
+                <a:solidFill>
+                  <a:schemeClr val="tx1"/>
+                </a:solidFill>
+              </a:rPr>
+              <a:t> (MSS)</a:t>
+            </a:r>
+            <a:endParaRPr lang="it-CH" dirty="0">
+              <a:solidFill>
+                <a:schemeClr val="tx1"/>
+              </a:solidFill>
+            </a:endParaRPr>
+          </a:p>
+        </p:txBody>
+      </p:sp>
+      <p:sp>
+        <p:nvSpPr>
+          <p:cNvPr id="3" name="Rounded Rectangle 2"/>
+          <p:cNvSpPr/>
+          <p:nvPr/>
+        </p:nvSpPr>
+        <p:spPr>
+          <a:xfrm>
+            <a:off x="1367644" y="5671721"/>
+            <a:ext cx="2448272" cy="360040"/>
+          </a:xfrm>
+          <a:prstGeom prst="roundRect">
+            <a:avLst/>
+          </a:prstGeom>
+          <a:noFill/>
+          <a:ln>
+            <a:solidFill>
+              <a:schemeClr val="tx1"/>
+            </a:solidFill>
+            <a:prstDash val="lgDash"/>
+          </a:ln>
+        </p:spPr>
+        <p:style>
+          <a:lnRef idx="2">
+            <a:schemeClr val="accent1">
+              <a:shade val="50000"/>
+            </a:schemeClr>
+          </a:lnRef>
+          <a:fillRef idx="1">
+            <a:schemeClr val="accent1"/>
+          </a:fillRef>
+          <a:effectRef idx="0">
+            <a:schemeClr val="accent1"/>
+          </a:effectRef>
+          <a:fontRef idx="minor">
+            <a:schemeClr val="lt1"/>
+          </a:fontRef>
+        </p:style>
+        <p:txBody>
+          <a:bodyPr rtlCol="0" anchor="ctr"/>
+          <a:lstStyle/>
+          <a:p>
+            <a:pPr algn="ctr"/>
+            <a:r>
+              <a:rPr lang="en-US" dirty="0" err="1" smtClean="0">
+                <a:solidFill>
+                  <a:schemeClr val="tx1"/>
+                </a:solidFill>
+              </a:rPr>
+              <a:t>ElementaryStencil</a:t>
+            </a:r>
+            <a:r>
+              <a:rPr lang="en-US" dirty="0" smtClean="0">
+                <a:solidFill>
+                  <a:schemeClr val="tx1"/>
+                </a:solidFill>
+              </a:rPr>
+              <a:t> (ES)</a:t>
+            </a:r>
+            <a:endParaRPr lang="it-CH" dirty="0">
+              <a:solidFill>
+                <a:schemeClr val="tx1"/>
+              </a:solidFill>
+            </a:endParaRPr>
+          </a:p>
+        </p:txBody>
+      </p:sp>
+      <p:sp>
+        <p:nvSpPr>
+          <p:cNvPr id="4" name="Rounded Rectangle 3"/>
+          <p:cNvSpPr/>
+          <p:nvPr/>
+        </p:nvSpPr>
+        <p:spPr>
+          <a:xfrm>
+            <a:off x="971600" y="1916832"/>
+            <a:ext cx="3240360" cy="360040"/>
+          </a:xfrm>
+          <a:prstGeom prst="roundRect">
+            <a:avLst/>
+          </a:prstGeom>
+          <a:noFill/>
+          <a:ln>
+            <a:solidFill>
+              <a:schemeClr val="tx1"/>
+            </a:solidFill>
+            <a:prstDash val="lgDash"/>
+          </a:ln>
+        </p:spPr>
+        <p:style>
+          <a:lnRef idx="2">
+            <a:schemeClr val="accent1">
+              <a:shade val="50000"/>
+            </a:schemeClr>
+          </a:lnRef>
+          <a:fillRef idx="1">
+            <a:schemeClr val="accent1"/>
+          </a:fillRef>
+          <a:effectRef idx="0">
+            <a:schemeClr val="accent1"/>
+          </a:effectRef>
+          <a:fontRef idx="minor">
+            <a:schemeClr val="lt1"/>
+          </a:fontRef>
+        </p:style>
+        <p:txBody>
+          <a:bodyPr rtlCol="0" anchor="ctr"/>
+          <a:lstStyle/>
+          <a:p>
+            <a:pPr algn="ctr"/>
+            <a:r>
+              <a:rPr lang="en-US" dirty="0" err="1" smtClean="0">
+                <a:solidFill>
+                  <a:schemeClr val="tx1"/>
+                </a:solidFill>
+              </a:rPr>
+              <a:t>ElementaryStencilFunction</a:t>
+            </a:r>
+            <a:r>
+              <a:rPr lang="en-US" dirty="0" smtClean="0">
+                <a:solidFill>
+                  <a:schemeClr val="tx1"/>
+                </a:solidFill>
+              </a:rPr>
+              <a:t> (ESF)</a:t>
+            </a:r>
+            <a:endParaRPr lang="it-CH" dirty="0">
+              <a:solidFill>
+                <a:schemeClr val="tx1"/>
+              </a:solidFill>
+            </a:endParaRPr>
+          </a:p>
+        </p:txBody>
+      </p:sp>
+      <p:sp>
+        <p:nvSpPr>
+          <p:cNvPr id="5" name="Rounded Rectangle 4"/>
+          <p:cNvSpPr/>
+          <p:nvPr/>
+        </p:nvSpPr>
+        <p:spPr>
+          <a:xfrm>
+            <a:off x="6156176" y="1914806"/>
+            <a:ext cx="1152128" cy="360040"/>
+          </a:xfrm>
+          <a:prstGeom prst="roundRect">
+            <a:avLst/>
+          </a:prstGeom>
+          <a:noFill/>
+          <a:ln>
+            <a:solidFill>
+              <a:schemeClr val="tx1"/>
+            </a:solidFill>
+            <a:prstDash val="lgDash"/>
+          </a:ln>
+        </p:spPr>
+        <p:style>
+          <a:lnRef idx="2">
+            <a:schemeClr val="accent1">
+              <a:shade val="50000"/>
+            </a:schemeClr>
+          </a:lnRef>
+          <a:fillRef idx="1">
+            <a:schemeClr val="accent1"/>
+          </a:fillRef>
+          <a:effectRef idx="0">
+            <a:schemeClr val="accent1"/>
+          </a:effectRef>
+          <a:fontRef idx="minor">
+            <a:schemeClr val="lt1"/>
+          </a:fontRef>
+        </p:style>
+        <p:txBody>
+          <a:bodyPr rtlCol="0" anchor="ctr"/>
+          <a:lstStyle/>
+          <a:p>
+            <a:pPr algn="ctr"/>
+            <a:r>
+              <a:rPr lang="en-US" dirty="0" smtClean="0">
+                <a:solidFill>
+                  <a:schemeClr val="tx1"/>
+                </a:solidFill>
+              </a:rPr>
+              <a:t>Execution</a:t>
+            </a:r>
+            <a:endParaRPr lang="it-CH" dirty="0">
+              <a:solidFill>
+                <a:schemeClr val="tx1"/>
+              </a:solidFill>
+            </a:endParaRPr>
+          </a:p>
+        </p:txBody>
+      </p:sp>
+      <p:sp>
+        <p:nvSpPr>
+          <p:cNvPr id="6" name="Rounded Rectangle 5"/>
+          <p:cNvSpPr/>
+          <p:nvPr/>
+        </p:nvSpPr>
+        <p:spPr>
+          <a:xfrm>
+            <a:off x="971600" y="1050710"/>
+            <a:ext cx="1152128" cy="360040"/>
+          </a:xfrm>
+          <a:prstGeom prst="roundRect">
+            <a:avLst/>
+          </a:prstGeom>
+          <a:noFill/>
+          <a:ln>
+            <a:solidFill>
+              <a:schemeClr val="tx1"/>
+            </a:solidFill>
+            <a:prstDash val="lgDash"/>
+          </a:ln>
+        </p:spPr>
+        <p:style>
+          <a:lnRef idx="2">
+            <a:schemeClr val="accent1">
+              <a:shade val="50000"/>
+            </a:schemeClr>
+          </a:lnRef>
+          <a:fillRef idx="1">
+            <a:schemeClr val="accent1"/>
+          </a:fillRef>
+          <a:effectRef idx="0">
+            <a:schemeClr val="accent1"/>
+          </a:effectRef>
+          <a:fontRef idx="minor">
+            <a:schemeClr val="lt1"/>
+          </a:fontRef>
+        </p:style>
+        <p:txBody>
+          <a:bodyPr rtlCol="0" anchor="ctr"/>
+          <a:lstStyle/>
+          <a:p>
+            <a:pPr algn="ctr"/>
+            <a:r>
+              <a:rPr lang="en-US" dirty="0" smtClean="0">
+                <a:solidFill>
+                  <a:schemeClr val="tx1"/>
+                </a:solidFill>
+              </a:rPr>
               <a:t>Interval</a:t>
             </a:r>
             <a:endParaRPr lang="it-CH" dirty="0">
@@ -5441,8 +6268,8 @@
         </p:nvCxnSpPr>
         <p:spPr>
           <a:xfrm>
-            <a:off x="2591780" y="1410750"/>
-            <a:ext cx="0" cy="506082"/>
+            <a:off x="1547664" y="1410750"/>
+            <a:ext cx="1044116" cy="506082"/>
           </a:xfrm>
           <a:prstGeom prst="straightConnector1">
             <a:avLst/>
@@ -5753,6 +6580,105 @@
               <a:srgbClr val="00B050"/>
             </a:solidFill>
             <a:prstDash val="sysDash"/>
+            <a:headEnd type="triangle"/>
+            <a:tailEnd type="none"/>
+          </a:ln>
+        </p:spPr>
+        <p:style>
+          <a:lnRef idx="1">
+            <a:schemeClr val="accent1"/>
+          </a:lnRef>
+          <a:fillRef idx="0">
+            <a:schemeClr val="accent1"/>
+          </a:fillRef>
+          <a:effectRef idx="0">
+            <a:schemeClr val="accent1"/>
+          </a:effectRef>
+          <a:fontRef idx="minor">
+            <a:schemeClr val="tx1"/>
+          </a:fontRef>
+        </p:style>
+      </p:cxnSp>
+      <p:sp>
+        <p:nvSpPr>
+          <p:cNvPr id="15" name="Rounded Rectangle 14"/>
+          <p:cNvSpPr/>
+          <p:nvPr/>
+        </p:nvSpPr>
+        <p:spPr>
+          <a:xfrm>
+            <a:off x="2411760" y="1050710"/>
+            <a:ext cx="2016224" cy="360040"/>
+          </a:xfrm>
+          <a:prstGeom prst="roundRect">
+            <a:avLst/>
+          </a:prstGeom>
+          <a:noFill/>
+          <a:ln>
+            <a:solidFill>
+              <a:schemeClr val="tx1"/>
+            </a:solidFill>
+            <a:prstDash val="lgDash"/>
+          </a:ln>
+        </p:spPr>
+        <p:style>
+          <a:lnRef idx="2">
+            <a:schemeClr val="accent1">
+              <a:shade val="50000"/>
+            </a:schemeClr>
+          </a:lnRef>
+          <a:fillRef idx="1">
+            <a:schemeClr val="accent1"/>
+          </a:fillRef>
+          <a:effectRef idx="0">
+            <a:schemeClr val="accent1"/>
+          </a:effectRef>
+          <a:fontRef idx="minor">
+            <a:schemeClr val="lt1"/>
+          </a:fontRef>
+        </p:style>
+        <p:txBody>
+          <a:bodyPr rtlCol="0" anchor="ctr"/>
+          <a:lstStyle/>
+          <a:p>
+            <a:pPr algn="ctr"/>
+            <a:r>
+              <a:rPr lang="en-US" dirty="0" err="1" smtClean="0">
+                <a:solidFill>
+                  <a:schemeClr val="tx1"/>
+                </a:solidFill>
+              </a:rPr>
+              <a:t>StencilOperatorArg</a:t>
+            </a:r>
+            <a:endParaRPr lang="it-CH" dirty="0">
+              <a:solidFill>
+                <a:schemeClr val="tx1"/>
+              </a:solidFill>
+            </a:endParaRPr>
+          </a:p>
+        </p:txBody>
+      </p:sp>
+      <p:cxnSp>
+        <p:nvCxnSpPr>
+          <p:cNvPr id="18" name="Straight Arrow Connector 17"/>
+          <p:cNvCxnSpPr>
+            <a:stCxn id="15" idx="2"/>
+            <a:endCxn id="4" idx="0"/>
+          </p:cNvCxnSpPr>
+          <p:nvPr/>
+        </p:nvCxnSpPr>
+        <p:spPr>
+          <a:xfrm flipH="1">
+            <a:off x="2591780" y="1410750"/>
+            <a:ext cx="828092" cy="506082"/>
+          </a:xfrm>
+          <a:prstGeom prst="straightConnector1">
+            <a:avLst/>
+          </a:prstGeom>
+          <a:ln w="19050">
+            <a:solidFill>
+              <a:srgbClr val="00B050"/>
+            </a:solidFill>
             <a:headEnd type="triangle"/>
             <a:tailEnd type="none"/>
           </a:ln>
@@ -5785,7 +6711,7 @@
 </p:sld>
 </file>
 
-<file path=ppt/slides/slide5.xml><?xml version="1.0" encoding="utf-8"?>
+<file path=ppt/slides/slide6.xml><?xml version="1.0" encoding="utf-8"?>
 <p:sld xmlns:a="http://schemas.openxmlformats.org/drawingml/2006/main" xmlns:r="http://schemas.openxmlformats.org/officeDocument/2006/relationships" xmlns:p="http://schemas.openxmlformats.org/presentationml/2006/main">
   <p:cSld>
     <p:spTree>

</xml_diff>

<commit_message>
added concepts for the storage
</commit_message>
<xml_diff>
--- a/docs/diagrams/gridtoolsconcepts.pptx
+++ b/docs/diagrams/gridtoolsconcepts.pptx
@@ -7,10 +7,11 @@
   <p:sldIdLst>
     <p:sldId id="261" r:id="rId2"/>
     <p:sldId id="257" r:id="rId3"/>
-    <p:sldId id="263" r:id="rId4"/>
-    <p:sldId id="259" r:id="rId5"/>
-    <p:sldId id="262" r:id="rId6"/>
-    <p:sldId id="258" r:id="rId7"/>
+    <p:sldId id="264" r:id="rId4"/>
+    <p:sldId id="263" r:id="rId5"/>
+    <p:sldId id="259" r:id="rId6"/>
+    <p:sldId id="262" r:id="rId7"/>
+    <p:sldId id="258" r:id="rId8"/>
   </p:sldIdLst>
   <p:sldSz cx="9144000" cy="6858000" type="screen4x3"/>
   <p:notesSz cx="6858000" cy="9144000"/>
@@ -4280,6 +4281,457 @@
       </p:grpSpPr>
       <p:sp>
         <p:nvSpPr>
+          <p:cNvPr id="2" name="Rounded Rectangle 1"/>
+          <p:cNvSpPr/>
+          <p:nvPr/>
+        </p:nvSpPr>
+        <p:spPr>
+          <a:xfrm>
+            <a:off x="2662906" y="1847262"/>
+            <a:ext cx="2147002" cy="360040"/>
+          </a:xfrm>
+          <a:prstGeom prst="roundRect">
+            <a:avLst/>
+          </a:prstGeom>
+          <a:noFill/>
+          <a:ln>
+            <a:solidFill>
+              <a:schemeClr val="tx1"/>
+            </a:solidFill>
+            <a:prstDash val="lgDash"/>
+          </a:ln>
+        </p:spPr>
+        <p:style>
+          <a:lnRef idx="2">
+            <a:schemeClr val="accent1">
+              <a:shade val="50000"/>
+            </a:schemeClr>
+          </a:lnRef>
+          <a:fillRef idx="1">
+            <a:schemeClr val="accent1"/>
+          </a:fillRef>
+          <a:effectRef idx="0">
+            <a:schemeClr val="accent1"/>
+          </a:effectRef>
+          <a:fontRef idx="minor">
+            <a:schemeClr val="lt1"/>
+          </a:fontRef>
+        </p:style>
+        <p:txBody>
+          <a:bodyPr rtlCol="0" anchor="ctr"/>
+          <a:lstStyle/>
+          <a:p>
+            <a:pPr algn="ctr"/>
+            <a:r>
+              <a:rPr lang="en-US" dirty="0" err="1" smtClean="0">
+                <a:solidFill>
+                  <a:schemeClr val="tx1"/>
+                </a:solidFill>
+              </a:rPr>
+              <a:t>NeighborListStorage</a:t>
+            </a:r>
+            <a:endParaRPr lang="it-CH" dirty="0">
+              <a:solidFill>
+                <a:schemeClr val="tx1"/>
+              </a:solidFill>
+            </a:endParaRPr>
+          </a:p>
+        </p:txBody>
+      </p:sp>
+      <p:sp>
+        <p:nvSpPr>
+          <p:cNvPr id="3" name="Rounded Rectangle 2"/>
+          <p:cNvSpPr/>
+          <p:nvPr/>
+        </p:nvSpPr>
+        <p:spPr>
+          <a:xfrm>
+            <a:off x="2411760" y="3381951"/>
+            <a:ext cx="2649294" cy="360040"/>
+          </a:xfrm>
+          <a:prstGeom prst="roundRect">
+            <a:avLst/>
+          </a:prstGeom>
+          <a:noFill/>
+          <a:ln>
+            <a:solidFill>
+              <a:schemeClr val="tx1"/>
+            </a:solidFill>
+            <a:prstDash val="lgDash"/>
+          </a:ln>
+        </p:spPr>
+        <p:style>
+          <a:lnRef idx="2">
+            <a:schemeClr val="accent1">
+              <a:shade val="50000"/>
+            </a:schemeClr>
+          </a:lnRef>
+          <a:fillRef idx="1">
+            <a:schemeClr val="accent1"/>
+          </a:fillRef>
+          <a:effectRef idx="0">
+            <a:schemeClr val="accent1"/>
+          </a:effectRef>
+          <a:fontRef idx="minor">
+            <a:schemeClr val="lt1"/>
+          </a:fontRef>
+        </p:style>
+        <p:txBody>
+          <a:bodyPr rtlCol="0" anchor="ctr"/>
+          <a:lstStyle/>
+          <a:p>
+            <a:pPr algn="ctr"/>
+            <a:r>
+              <a:rPr lang="en-US" dirty="0" err="1" smtClean="0">
+                <a:solidFill>
+                  <a:schemeClr val="tx1"/>
+                </a:solidFill>
+              </a:rPr>
+              <a:t>RandomAccessNeighbors</a:t>
+            </a:r>
+            <a:endParaRPr lang="it-CH" dirty="0">
+              <a:solidFill>
+                <a:schemeClr val="tx1"/>
+              </a:solidFill>
+            </a:endParaRPr>
+          </a:p>
+        </p:txBody>
+      </p:sp>
+      <p:sp>
+        <p:nvSpPr>
+          <p:cNvPr id="4" name="Rounded Rectangle 3"/>
+          <p:cNvSpPr/>
+          <p:nvPr/>
+        </p:nvSpPr>
+        <p:spPr>
+          <a:xfrm>
+            <a:off x="2411760" y="4916640"/>
+            <a:ext cx="2649294" cy="360040"/>
+          </a:xfrm>
+          <a:prstGeom prst="roundRect">
+            <a:avLst/>
+          </a:prstGeom>
+          <a:noFill/>
+          <a:ln>
+            <a:solidFill>
+              <a:schemeClr val="tx1"/>
+            </a:solidFill>
+            <a:prstDash val="lgDash"/>
+          </a:ln>
+        </p:spPr>
+        <p:style>
+          <a:lnRef idx="2">
+            <a:schemeClr val="accent1">
+              <a:shade val="50000"/>
+            </a:schemeClr>
+          </a:lnRef>
+          <a:fillRef idx="1">
+            <a:schemeClr val="accent1"/>
+          </a:fillRef>
+          <a:effectRef idx="0">
+            <a:schemeClr val="accent1"/>
+          </a:effectRef>
+          <a:fontRef idx="minor">
+            <a:schemeClr val="lt1"/>
+          </a:fontRef>
+        </p:style>
+        <p:txBody>
+          <a:bodyPr rtlCol="0" anchor="ctr"/>
+          <a:lstStyle/>
+          <a:p>
+            <a:pPr algn="ctr"/>
+            <a:r>
+              <a:rPr lang="en-US" dirty="0" err="1" smtClean="0">
+                <a:solidFill>
+                  <a:schemeClr val="tx1"/>
+                </a:solidFill>
+              </a:rPr>
+              <a:t>CartesianNeighbors</a:t>
+            </a:r>
+            <a:endParaRPr lang="it-CH" dirty="0">
+              <a:solidFill>
+                <a:schemeClr val="tx1"/>
+              </a:solidFill>
+            </a:endParaRPr>
+          </a:p>
+        </p:txBody>
+      </p:sp>
+      <p:sp>
+        <p:nvSpPr>
+          <p:cNvPr id="5" name="TextBox 4"/>
+          <p:cNvSpPr txBox="1"/>
+          <p:nvPr/>
+        </p:nvSpPr>
+        <p:spPr>
+          <a:xfrm>
+            <a:off x="4535114" y="1268760"/>
+            <a:ext cx="2535208" cy="707886"/>
+          </a:xfrm>
+          <a:prstGeom prst="rect">
+            <a:avLst/>
+          </a:prstGeom>
+          <a:solidFill>
+            <a:schemeClr val="accent3">
+              <a:lumMod val="20000"/>
+              <a:lumOff val="80000"/>
+              <a:alpha val="92000"/>
+            </a:schemeClr>
+          </a:solidFill>
+          <a:ln>
+            <a:solidFill>
+              <a:schemeClr val="accent3">
+                <a:lumMod val="75000"/>
+              </a:schemeClr>
+            </a:solidFill>
+          </a:ln>
+        </p:spPr>
+        <p:txBody>
+          <a:bodyPr wrap="square" rtlCol="0">
+            <a:spAutoFit/>
+          </a:bodyPr>
+          <a:lstStyle/>
+          <a:p>
+            <a:r>
+              <a:rPr lang="en-US" sz="1000" dirty="0" smtClean="0">
+                <a:solidFill>
+                  <a:srgbClr val="FF0000"/>
+                </a:solidFill>
+                <a:latin typeface="Consolas" panose="020B0609020204030204" pitchFamily="49" charset="0"/>
+                <a:ea typeface="Tahoma" panose="020B0604030504040204" pitchFamily="34" charset="0"/>
+                <a:cs typeface="Consolas" panose="020B0609020204030204" pitchFamily="49" charset="0"/>
+              </a:rPr>
+              <a:t>Only way to access data is through scanning neighbor lists (the iteration can be limited, such as: the first 4 neighbors)</a:t>
+            </a:r>
+          </a:p>
+        </p:txBody>
+      </p:sp>
+      <p:cxnSp>
+        <p:nvCxnSpPr>
+          <p:cNvPr id="8" name="Straight Arrow Connector 7"/>
+          <p:cNvCxnSpPr>
+            <a:stCxn id="3" idx="0"/>
+            <a:endCxn id="2" idx="2"/>
+          </p:cNvCxnSpPr>
+          <p:nvPr/>
+        </p:nvCxnSpPr>
+        <p:spPr>
+          <a:xfrm flipV="1">
+            <a:off x="3736407" y="2207302"/>
+            <a:ext cx="0" cy="1174649"/>
+          </a:xfrm>
+          <a:prstGeom prst="straightConnector1">
+            <a:avLst/>
+          </a:prstGeom>
+          <a:ln w="19050">
+            <a:solidFill>
+              <a:schemeClr val="tx1"/>
+            </a:solidFill>
+            <a:tailEnd type="arrow"/>
+          </a:ln>
+        </p:spPr>
+        <p:style>
+          <a:lnRef idx="1">
+            <a:schemeClr val="accent1"/>
+          </a:lnRef>
+          <a:fillRef idx="0">
+            <a:schemeClr val="accent1"/>
+          </a:fillRef>
+          <a:effectRef idx="0">
+            <a:schemeClr val="accent1"/>
+          </a:effectRef>
+          <a:fontRef idx="minor">
+            <a:schemeClr val="tx1"/>
+          </a:fontRef>
+        </p:style>
+      </p:cxnSp>
+      <p:cxnSp>
+        <p:nvCxnSpPr>
+          <p:cNvPr id="11" name="Straight Arrow Connector 10"/>
+          <p:cNvCxnSpPr>
+            <a:stCxn id="4" idx="0"/>
+            <a:endCxn id="3" idx="2"/>
+          </p:cNvCxnSpPr>
+          <p:nvPr/>
+        </p:nvCxnSpPr>
+        <p:spPr>
+          <a:xfrm flipV="1">
+            <a:off x="3736407" y="3741991"/>
+            <a:ext cx="0" cy="1174649"/>
+          </a:xfrm>
+          <a:prstGeom prst="straightConnector1">
+            <a:avLst/>
+          </a:prstGeom>
+          <a:ln w="19050">
+            <a:solidFill>
+              <a:schemeClr val="tx1"/>
+            </a:solidFill>
+            <a:tailEnd type="arrow"/>
+          </a:ln>
+        </p:spPr>
+        <p:style>
+          <a:lnRef idx="1">
+            <a:schemeClr val="accent1"/>
+          </a:lnRef>
+          <a:fillRef idx="0">
+            <a:schemeClr val="accent1"/>
+          </a:fillRef>
+          <a:effectRef idx="0">
+            <a:schemeClr val="accent1"/>
+          </a:effectRef>
+          <a:fontRef idx="minor">
+            <a:schemeClr val="tx1"/>
+          </a:fontRef>
+        </p:style>
+      </p:cxnSp>
+      <p:sp>
+        <p:nvSpPr>
+          <p:cNvPr id="14" name="TextBox 13"/>
+          <p:cNvSpPr txBox="1"/>
+          <p:nvPr/>
+        </p:nvSpPr>
+        <p:spPr>
+          <a:xfrm>
+            <a:off x="4535114" y="3044432"/>
+            <a:ext cx="2535208" cy="400110"/>
+          </a:xfrm>
+          <a:prstGeom prst="rect">
+            <a:avLst/>
+          </a:prstGeom>
+          <a:solidFill>
+            <a:schemeClr val="accent3">
+              <a:lumMod val="20000"/>
+              <a:lumOff val="80000"/>
+              <a:alpha val="92000"/>
+            </a:schemeClr>
+          </a:solidFill>
+          <a:ln>
+            <a:solidFill>
+              <a:schemeClr val="accent3">
+                <a:lumMod val="75000"/>
+              </a:schemeClr>
+            </a:solidFill>
+          </a:ln>
+        </p:spPr>
+        <p:txBody>
+          <a:bodyPr wrap="square" rtlCol="0">
+            <a:spAutoFit/>
+          </a:bodyPr>
+          <a:lstStyle/>
+          <a:p>
+            <a:r>
+              <a:rPr lang="en-US" sz="1000" dirty="0" smtClean="0">
+                <a:solidFill>
+                  <a:srgbClr val="FF0000"/>
+                </a:solidFill>
+                <a:latin typeface="Consolas" panose="020B0609020204030204" pitchFamily="49" charset="0"/>
+                <a:ea typeface="Tahoma" panose="020B0604030504040204" pitchFamily="34" charset="0"/>
+                <a:cs typeface="Consolas" panose="020B0609020204030204" pitchFamily="49" charset="0"/>
+              </a:rPr>
+              <a:t>Neighbors can also be accessed by indicating the neighbor index</a:t>
+            </a:r>
+          </a:p>
+        </p:txBody>
+      </p:sp>
+      <p:sp>
+        <p:nvSpPr>
+          <p:cNvPr id="15" name="TextBox 14"/>
+          <p:cNvSpPr txBox="1"/>
+          <p:nvPr/>
+        </p:nvSpPr>
+        <p:spPr>
+          <a:xfrm>
+            <a:off x="4535114" y="4484592"/>
+            <a:ext cx="2535208" cy="553998"/>
+          </a:xfrm>
+          <a:prstGeom prst="rect">
+            <a:avLst/>
+          </a:prstGeom>
+          <a:solidFill>
+            <a:schemeClr val="accent3">
+              <a:lumMod val="20000"/>
+              <a:lumOff val="80000"/>
+              <a:alpha val="92000"/>
+            </a:schemeClr>
+          </a:solidFill>
+          <a:ln>
+            <a:solidFill>
+              <a:schemeClr val="accent3">
+                <a:lumMod val="75000"/>
+              </a:schemeClr>
+            </a:solidFill>
+          </a:ln>
+        </p:spPr>
+        <p:txBody>
+          <a:bodyPr wrap="square" rtlCol="0">
+            <a:spAutoFit/>
+          </a:bodyPr>
+          <a:lstStyle/>
+          <a:p>
+            <a:r>
+              <a:rPr lang="en-US" sz="1000" dirty="0" smtClean="0">
+                <a:solidFill>
+                  <a:srgbClr val="FF0000"/>
+                </a:solidFill>
+                <a:latin typeface="Consolas" panose="020B0609020204030204" pitchFamily="49" charset="0"/>
+                <a:ea typeface="Tahoma" panose="020B0604030504040204" pitchFamily="34" charset="0"/>
+                <a:cs typeface="Consolas" panose="020B0609020204030204" pitchFamily="49" charset="0"/>
+              </a:rPr>
+              <a:t>Neighbors can also be accessed by </a:t>
+            </a:r>
+            <a:r>
+              <a:rPr lang="en-US" sz="1000" dirty="0" smtClean="0">
+                <a:solidFill>
+                  <a:srgbClr val="FF0000"/>
+                </a:solidFill>
+                <a:latin typeface="Consolas" panose="020B0609020204030204" pitchFamily="49" charset="0"/>
+                <a:ea typeface="Tahoma" panose="020B0604030504040204" pitchFamily="34" charset="0"/>
+                <a:cs typeface="Consolas" panose="020B0609020204030204" pitchFamily="49" charset="0"/>
+              </a:rPr>
+              <a:t>indicating the relative (integral) coordinates to them</a:t>
+            </a:r>
+            <a:endParaRPr lang="en-US" sz="1000" dirty="0" smtClean="0">
+              <a:solidFill>
+                <a:srgbClr val="FF0000"/>
+              </a:solidFill>
+              <a:latin typeface="Consolas" panose="020B0609020204030204" pitchFamily="49" charset="0"/>
+              <a:ea typeface="Tahoma" panose="020B0604030504040204" pitchFamily="34" charset="0"/>
+              <a:cs typeface="Consolas" panose="020B0609020204030204" pitchFamily="49" charset="0"/>
+            </a:endParaRPr>
+          </a:p>
+        </p:txBody>
+      </p:sp>
+    </p:spTree>
+    <p:extLst>
+      <p:ext uri="{BB962C8B-B14F-4D97-AF65-F5344CB8AC3E}">
+        <p14:creationId xmlns:p14="http://schemas.microsoft.com/office/powerpoint/2010/main" val="2261045539"/>
+      </p:ext>
+    </p:extLst>
+  </p:cSld>
+  <p:clrMapOvr>
+    <a:masterClrMapping/>
+  </p:clrMapOvr>
+</p:sld>
+</file>
+
+<file path=ppt/slides/slide4.xml><?xml version="1.0" encoding="utf-8"?>
+<p:sld xmlns:a="http://schemas.openxmlformats.org/drawingml/2006/main" xmlns:r="http://schemas.openxmlformats.org/officeDocument/2006/relationships" xmlns:p="http://schemas.openxmlformats.org/presentationml/2006/main">
+  <p:cSld>
+    <p:spTree>
+      <p:nvGrpSpPr>
+        <p:cNvPr id="1" name=""/>
+        <p:cNvGrpSpPr/>
+        <p:nvPr/>
+      </p:nvGrpSpPr>
+      <p:grpSpPr>
+        <a:xfrm>
+          <a:off x="0" y="0"/>
+          <a:ext cx="0" cy="0"/>
+          <a:chOff x="0" y="0"/>
+          <a:chExt cx="0" cy="0"/>
+        </a:xfrm>
+      </p:grpSpPr>
+      <p:sp>
+        <p:nvSpPr>
           <p:cNvPr id="3" name="Rounded Rectangle 2"/>
           <p:cNvSpPr/>
           <p:nvPr/>
@@ -5087,7 +5539,7 @@
 </p:sld>
 </file>
 
-<file path=ppt/slides/slide4.xml><?xml version="1.0" encoding="utf-8"?>
+<file path=ppt/slides/slide5.xml><?xml version="1.0" encoding="utf-8"?>
 <p:sld xmlns:a="http://schemas.openxmlformats.org/drawingml/2006/main" xmlns:r="http://schemas.openxmlformats.org/officeDocument/2006/relationships" xmlns:p="http://schemas.openxmlformats.org/presentationml/2006/main">
   <p:cSld>
     <p:spTree>
@@ -5921,7 +6373,7 @@
 </p:sld>
 </file>
 
-<file path=ppt/slides/slide5.xml><?xml version="1.0" encoding="utf-8"?>
+<file path=ppt/slides/slide6.xml><?xml version="1.0" encoding="utf-8"?>
 <p:sld xmlns:a="http://schemas.openxmlformats.org/drawingml/2006/main" xmlns:r="http://schemas.openxmlformats.org/officeDocument/2006/relationships" xmlns:p="http://schemas.openxmlformats.org/presentationml/2006/main">
   <p:cSld>
     <p:spTree>
@@ -6711,7 +7163,7 @@
 </p:sld>
 </file>
 
-<file path=ppt/slides/slide6.xml><?xml version="1.0" encoding="utf-8"?>
+<file path=ppt/slides/slide7.xml><?xml version="1.0" encoding="utf-8"?>
 <p:sld xmlns:a="http://schemas.openxmlformats.org/drawingml/2006/main" xmlns:r="http://schemas.openxmlformats.org/officeDocument/2006/relationships" xmlns:p="http://schemas.openxmlformats.org/presentationml/2006/main">
   <p:cSld>
     <p:spTree>

</xml_diff>

<commit_message>
updates to diagrams to match the other-structures discussion on the wiki
</commit_message>
<xml_diff>
--- a/docs/diagrams/gridtoolsconcepts.pptx
+++ b/docs/diagrams/gridtoolsconcepts.pptx
@@ -6,8 +6,8 @@
   </p:sldMasterIdLst>
   <p:sldIdLst>
     <p:sldId id="261" r:id="rId2"/>
-    <p:sldId id="257" r:id="rId3"/>
-    <p:sldId id="264" r:id="rId4"/>
+    <p:sldId id="264" r:id="rId3"/>
+    <p:sldId id="257" r:id="rId4"/>
     <p:sldId id="263" r:id="rId5"/>
     <p:sldId id="259" r:id="rId6"/>
     <p:sldId id="262" r:id="rId7"/>
@@ -294,7 +294,7 @@
           <a:p>
             <a:fld id="{ADE2F5C7-357B-4C57-BDC7-84B22E64388C}" type="datetimeFigureOut">
               <a:rPr lang="it-CH" smtClean="0"/>
-              <a:t>29.09.2014</a:t>
+              <a:t>13.10.2014</a:t>
             </a:fld>
             <a:endParaRPr lang="it-CH"/>
           </a:p>
@@ -464,7 +464,7 @@
           <a:p>
             <a:fld id="{ADE2F5C7-357B-4C57-BDC7-84B22E64388C}" type="datetimeFigureOut">
               <a:rPr lang="it-CH" smtClean="0"/>
-              <a:t>29.09.2014</a:t>
+              <a:t>13.10.2014</a:t>
             </a:fld>
             <a:endParaRPr lang="it-CH"/>
           </a:p>
@@ -644,7 +644,7 @@
           <a:p>
             <a:fld id="{ADE2F5C7-357B-4C57-BDC7-84B22E64388C}" type="datetimeFigureOut">
               <a:rPr lang="it-CH" smtClean="0"/>
-              <a:t>29.09.2014</a:t>
+              <a:t>13.10.2014</a:t>
             </a:fld>
             <a:endParaRPr lang="it-CH"/>
           </a:p>
@@ -814,7 +814,7 @@
           <a:p>
             <a:fld id="{ADE2F5C7-357B-4C57-BDC7-84B22E64388C}" type="datetimeFigureOut">
               <a:rPr lang="it-CH" smtClean="0"/>
-              <a:t>29.09.2014</a:t>
+              <a:t>13.10.2014</a:t>
             </a:fld>
             <a:endParaRPr lang="it-CH"/>
           </a:p>
@@ -1060,7 +1060,7 @@
           <a:p>
             <a:fld id="{ADE2F5C7-357B-4C57-BDC7-84B22E64388C}" type="datetimeFigureOut">
               <a:rPr lang="it-CH" smtClean="0"/>
-              <a:t>29.09.2014</a:t>
+              <a:t>13.10.2014</a:t>
             </a:fld>
             <a:endParaRPr lang="it-CH"/>
           </a:p>
@@ -1348,7 +1348,7 @@
           <a:p>
             <a:fld id="{ADE2F5C7-357B-4C57-BDC7-84B22E64388C}" type="datetimeFigureOut">
               <a:rPr lang="it-CH" smtClean="0"/>
-              <a:t>29.09.2014</a:t>
+              <a:t>13.10.2014</a:t>
             </a:fld>
             <a:endParaRPr lang="it-CH"/>
           </a:p>
@@ -1770,7 +1770,7 @@
           <a:p>
             <a:fld id="{ADE2F5C7-357B-4C57-BDC7-84B22E64388C}" type="datetimeFigureOut">
               <a:rPr lang="it-CH" smtClean="0"/>
-              <a:t>29.09.2014</a:t>
+              <a:t>13.10.2014</a:t>
             </a:fld>
             <a:endParaRPr lang="it-CH"/>
           </a:p>
@@ -1888,7 +1888,7 @@
           <a:p>
             <a:fld id="{ADE2F5C7-357B-4C57-BDC7-84B22E64388C}" type="datetimeFigureOut">
               <a:rPr lang="it-CH" smtClean="0"/>
-              <a:t>29.09.2014</a:t>
+              <a:t>13.10.2014</a:t>
             </a:fld>
             <a:endParaRPr lang="it-CH"/>
           </a:p>
@@ -1983,7 +1983,7 @@
           <a:p>
             <a:fld id="{ADE2F5C7-357B-4C57-BDC7-84B22E64388C}" type="datetimeFigureOut">
               <a:rPr lang="it-CH" smtClean="0"/>
-              <a:t>29.09.2014</a:t>
+              <a:t>13.10.2014</a:t>
             </a:fld>
             <a:endParaRPr lang="it-CH"/>
           </a:p>
@@ -2260,7 +2260,7 @@
           <a:p>
             <a:fld id="{ADE2F5C7-357B-4C57-BDC7-84B22E64388C}" type="datetimeFigureOut">
               <a:rPr lang="it-CH" smtClean="0"/>
-              <a:t>29.09.2014</a:t>
+              <a:t>13.10.2014</a:t>
             </a:fld>
             <a:endParaRPr lang="it-CH"/>
           </a:p>
@@ -2513,7 +2513,7 @@
           <a:p>
             <a:fld id="{ADE2F5C7-357B-4C57-BDC7-84B22E64388C}" type="datetimeFigureOut">
               <a:rPr lang="it-CH" smtClean="0"/>
-              <a:t>29.09.2014</a:t>
+              <a:t>13.10.2014</a:t>
             </a:fld>
             <a:endParaRPr lang="it-CH"/>
           </a:p>
@@ -2726,7 +2726,7 @@
           <a:p>
             <a:fld id="{ADE2F5C7-357B-4C57-BDC7-84B22E64388C}" type="datetimeFigureOut">
               <a:rPr lang="it-CH" smtClean="0"/>
-              <a:t>29.09.2014</a:t>
+              <a:t>13.10.2014</a:t>
             </a:fld>
             <a:endParaRPr lang="it-CH"/>
           </a:p>
@@ -3399,14 +3399,122 @@
       </p:grpSpPr>
       <p:sp>
         <p:nvSpPr>
-          <p:cNvPr id="7" name="Rounded Rectangle 6"/>
+          <p:cNvPr id="38" name="Right Arrow 37"/>
           <p:cNvSpPr/>
           <p:nvPr/>
         </p:nvSpPr>
         <p:spPr>
           <a:xfrm>
-            <a:off x="1547664" y="4941168"/>
-            <a:ext cx="2016224" cy="360040"/>
+            <a:off x="755576" y="3772510"/>
+            <a:ext cx="2664296" cy="432048"/>
+          </a:xfrm>
+          <a:prstGeom prst="rightArrow">
+            <a:avLst/>
+          </a:prstGeom>
+          <a:solidFill>
+            <a:schemeClr val="accent2"/>
+          </a:solidFill>
+          <a:ln>
+            <a:noFill/>
+          </a:ln>
+        </p:spPr>
+        <p:style>
+          <a:lnRef idx="2">
+            <a:schemeClr val="accent1">
+              <a:shade val="50000"/>
+            </a:schemeClr>
+          </a:lnRef>
+          <a:fillRef idx="1">
+            <a:schemeClr val="accent1"/>
+          </a:fillRef>
+          <a:effectRef idx="0">
+            <a:schemeClr val="accent1"/>
+          </a:effectRef>
+          <a:fontRef idx="minor">
+            <a:schemeClr val="lt1"/>
+          </a:fontRef>
+        </p:style>
+        <p:txBody>
+          <a:bodyPr rtlCol="0" anchor="ctr"/>
+          <a:lstStyle/>
+          <a:p>
+            <a:pPr algn="ctr"/>
+            <a:r>
+              <a:rPr lang="en-US" sz="1600" dirty="0" smtClean="0">
+                <a:latin typeface="Arial Rounded MT Bold" panose="020F0704030504030204" pitchFamily="34" charset="0"/>
+              </a:rPr>
+              <a:t>Increasing Complexity</a:t>
+            </a:r>
+            <a:endParaRPr lang="it-CH" sz="1600" dirty="0">
+              <a:latin typeface="Arial Rounded MT Bold" panose="020F0704030504030204" pitchFamily="34" charset="0"/>
+            </a:endParaRPr>
+          </a:p>
+        </p:txBody>
+      </p:sp>
+      <p:sp>
+        <p:nvSpPr>
+          <p:cNvPr id="39" name="Right Arrow 38"/>
+          <p:cNvSpPr/>
+          <p:nvPr/>
+        </p:nvSpPr>
+        <p:spPr>
+          <a:xfrm>
+            <a:off x="5882309" y="3772510"/>
+            <a:ext cx="2664296" cy="432048"/>
+          </a:xfrm>
+          <a:prstGeom prst="rightArrow">
+            <a:avLst/>
+          </a:prstGeom>
+          <a:solidFill>
+            <a:schemeClr val="accent2"/>
+          </a:solidFill>
+          <a:ln>
+            <a:noFill/>
+          </a:ln>
+        </p:spPr>
+        <p:style>
+          <a:lnRef idx="2">
+            <a:schemeClr val="accent1">
+              <a:shade val="50000"/>
+            </a:schemeClr>
+          </a:lnRef>
+          <a:fillRef idx="1">
+            <a:schemeClr val="accent1"/>
+          </a:fillRef>
+          <a:effectRef idx="0">
+            <a:schemeClr val="accent1"/>
+          </a:effectRef>
+          <a:fontRef idx="minor">
+            <a:schemeClr val="lt1"/>
+          </a:fontRef>
+        </p:style>
+        <p:txBody>
+          <a:bodyPr rtlCol="0" anchor="ctr"/>
+          <a:lstStyle/>
+          <a:p>
+            <a:pPr algn="ctr"/>
+            <a:r>
+              <a:rPr lang="en-US" sz="1600" dirty="0" smtClean="0">
+                <a:latin typeface="Arial Rounded MT Bold" panose="020F0704030504030204" pitchFamily="34" charset="0"/>
+              </a:rPr>
+              <a:t>Increasing Complexity</a:t>
+            </a:r>
+            <a:endParaRPr lang="it-CH" sz="1600" dirty="0">
+              <a:latin typeface="Arial Rounded MT Bold" panose="020F0704030504030204" pitchFamily="34" charset="0"/>
+            </a:endParaRPr>
+          </a:p>
+        </p:txBody>
+      </p:sp>
+      <p:sp>
+        <p:nvSpPr>
+          <p:cNvPr id="2" name="Rounded Rectangle 1"/>
+          <p:cNvSpPr/>
+          <p:nvPr/>
+        </p:nvSpPr>
+        <p:spPr>
+          <a:xfrm>
+            <a:off x="899592" y="1847262"/>
+            <a:ext cx="2147002" cy="360040"/>
           </a:xfrm>
           <a:prstGeom prst="roundRect">
             <a:avLst/>
@@ -3441,12 +3549,12 @@
           <a:p>
             <a:pPr algn="ctr"/>
             <a:r>
-              <a:rPr lang="en-US" dirty="0" smtClean="0">
+              <a:rPr lang="en-US" dirty="0" err="1" smtClean="0">
                 <a:solidFill>
                   <a:schemeClr val="tx1"/>
                 </a:solidFill>
               </a:rPr>
-              <a:t>Icosahedral</a:t>
+              <a:t>NeighborListStorage</a:t>
             </a:r>
             <a:endParaRPr lang="it-CH" dirty="0">
               <a:solidFill>
@@ -3458,14 +3566,14 @@
       </p:sp>
       <p:sp>
         <p:nvSpPr>
-          <p:cNvPr id="8" name="Rounded Rectangle 7"/>
+          <p:cNvPr id="3" name="Rounded Rectangle 2"/>
           <p:cNvSpPr/>
           <p:nvPr/>
         </p:nvSpPr>
         <p:spPr>
           <a:xfrm>
-            <a:off x="3710215" y="4941168"/>
-            <a:ext cx="2016224" cy="360040"/>
+            <a:off x="204417" y="3378927"/>
+            <a:ext cx="1691306" cy="360040"/>
           </a:xfrm>
           <a:prstGeom prst="roundRect">
             <a:avLst/>
@@ -3505,6 +3613,1001 @@
                   <a:schemeClr val="tx1"/>
                 </a:solidFill>
               </a:rPr>
+              <a:t>R_A_Neighbors</a:t>
+            </a:r>
+            <a:endParaRPr lang="it-CH" dirty="0">
+              <a:solidFill>
+                <a:schemeClr val="tx1"/>
+              </a:solidFill>
+            </a:endParaRPr>
+          </a:p>
+        </p:txBody>
+      </p:sp>
+      <p:sp>
+        <p:nvSpPr>
+          <p:cNvPr id="4" name="Rounded Rectangle 3"/>
+          <p:cNvSpPr/>
+          <p:nvPr/>
+        </p:nvSpPr>
+        <p:spPr>
+          <a:xfrm>
+            <a:off x="225538" y="4916640"/>
+            <a:ext cx="2649294" cy="360040"/>
+          </a:xfrm>
+          <a:prstGeom prst="roundRect">
+            <a:avLst/>
+          </a:prstGeom>
+          <a:noFill/>
+          <a:ln>
+            <a:solidFill>
+              <a:schemeClr val="tx1"/>
+            </a:solidFill>
+            <a:prstDash val="lgDash"/>
+          </a:ln>
+        </p:spPr>
+        <p:style>
+          <a:lnRef idx="2">
+            <a:schemeClr val="accent1">
+              <a:shade val="50000"/>
+            </a:schemeClr>
+          </a:lnRef>
+          <a:fillRef idx="1">
+            <a:schemeClr val="accent1"/>
+          </a:fillRef>
+          <a:effectRef idx="0">
+            <a:schemeClr val="accent1"/>
+          </a:effectRef>
+          <a:fontRef idx="minor">
+            <a:schemeClr val="lt1"/>
+          </a:fontRef>
+        </p:style>
+        <p:txBody>
+          <a:bodyPr rtlCol="0" anchor="ctr"/>
+          <a:lstStyle/>
+          <a:p>
+            <a:pPr algn="ctr"/>
+            <a:r>
+              <a:rPr lang="en-US" dirty="0" err="1" smtClean="0">
+                <a:solidFill>
+                  <a:schemeClr val="tx1"/>
+                </a:solidFill>
+              </a:rPr>
+              <a:t>CartesianNeighbors</a:t>
+            </a:r>
+            <a:endParaRPr lang="it-CH" dirty="0">
+              <a:solidFill>
+                <a:schemeClr val="tx1"/>
+              </a:solidFill>
+            </a:endParaRPr>
+          </a:p>
+        </p:txBody>
+      </p:sp>
+      <p:sp>
+        <p:nvSpPr>
+          <p:cNvPr id="5" name="TextBox 4"/>
+          <p:cNvSpPr txBox="1"/>
+          <p:nvPr/>
+        </p:nvSpPr>
+        <p:spPr>
+          <a:xfrm>
+            <a:off x="2771800" y="1268760"/>
+            <a:ext cx="2607290" cy="707886"/>
+          </a:xfrm>
+          <a:prstGeom prst="rect">
+            <a:avLst/>
+          </a:prstGeom>
+          <a:solidFill>
+            <a:schemeClr val="accent3">
+              <a:lumMod val="20000"/>
+              <a:lumOff val="80000"/>
+              <a:alpha val="92000"/>
+            </a:schemeClr>
+          </a:solidFill>
+          <a:ln>
+            <a:solidFill>
+              <a:schemeClr val="accent3">
+                <a:lumMod val="75000"/>
+              </a:schemeClr>
+            </a:solidFill>
+          </a:ln>
+        </p:spPr>
+        <p:txBody>
+          <a:bodyPr wrap="square" rtlCol="0">
+            <a:spAutoFit/>
+          </a:bodyPr>
+          <a:lstStyle/>
+          <a:p>
+            <a:r>
+              <a:rPr lang="en-US" sz="1000" dirty="0" smtClean="0">
+                <a:solidFill>
+                  <a:srgbClr val="FF0000"/>
+                </a:solidFill>
+                <a:latin typeface="Consolas" panose="020B0609020204030204" pitchFamily="49" charset="0"/>
+                <a:ea typeface="Tahoma" panose="020B0604030504040204" pitchFamily="34" charset="0"/>
+                <a:cs typeface="Consolas" panose="020B0609020204030204" pitchFamily="49" charset="0"/>
+              </a:rPr>
+              <a:t>Only way to access data is through scanning neighbor lists (the iteration can be limited, such as: the first 4 neighbors)</a:t>
+            </a:r>
+          </a:p>
+        </p:txBody>
+      </p:sp>
+      <p:cxnSp>
+        <p:nvCxnSpPr>
+          <p:cNvPr id="8" name="Straight Arrow Connector 7"/>
+          <p:cNvCxnSpPr>
+            <a:stCxn id="3" idx="0"/>
+            <a:endCxn id="2" idx="2"/>
+          </p:cNvCxnSpPr>
+          <p:nvPr/>
+        </p:nvCxnSpPr>
+        <p:spPr>
+          <a:xfrm flipV="1">
+            <a:off x="1050070" y="2207302"/>
+            <a:ext cx="923023" cy="1171625"/>
+          </a:xfrm>
+          <a:prstGeom prst="straightConnector1">
+            <a:avLst/>
+          </a:prstGeom>
+          <a:ln w="19050">
+            <a:solidFill>
+              <a:schemeClr val="tx1"/>
+            </a:solidFill>
+            <a:tailEnd type="arrow"/>
+          </a:ln>
+        </p:spPr>
+        <p:style>
+          <a:lnRef idx="1">
+            <a:schemeClr val="accent1"/>
+          </a:lnRef>
+          <a:fillRef idx="0">
+            <a:schemeClr val="accent1"/>
+          </a:fillRef>
+          <a:effectRef idx="0">
+            <a:schemeClr val="accent1"/>
+          </a:effectRef>
+          <a:fontRef idx="minor">
+            <a:schemeClr val="tx1"/>
+          </a:fontRef>
+        </p:style>
+      </p:cxnSp>
+      <p:cxnSp>
+        <p:nvCxnSpPr>
+          <p:cNvPr id="11" name="Straight Arrow Connector 10"/>
+          <p:cNvCxnSpPr>
+            <a:stCxn id="4" idx="0"/>
+            <a:endCxn id="3" idx="2"/>
+          </p:cNvCxnSpPr>
+          <p:nvPr/>
+        </p:nvCxnSpPr>
+        <p:spPr>
+          <a:xfrm flipH="1" flipV="1">
+            <a:off x="1050070" y="3738967"/>
+            <a:ext cx="500115" cy="1177673"/>
+          </a:xfrm>
+          <a:prstGeom prst="straightConnector1">
+            <a:avLst/>
+          </a:prstGeom>
+          <a:ln w="19050">
+            <a:solidFill>
+              <a:schemeClr val="tx1"/>
+            </a:solidFill>
+            <a:tailEnd type="arrow"/>
+          </a:ln>
+        </p:spPr>
+        <p:style>
+          <a:lnRef idx="1">
+            <a:schemeClr val="accent1"/>
+          </a:lnRef>
+          <a:fillRef idx="0">
+            <a:schemeClr val="accent1"/>
+          </a:fillRef>
+          <a:effectRef idx="0">
+            <a:schemeClr val="accent1"/>
+          </a:effectRef>
+          <a:fontRef idx="minor">
+            <a:schemeClr val="tx1"/>
+          </a:fontRef>
+        </p:style>
+      </p:cxnSp>
+      <p:sp>
+        <p:nvSpPr>
+          <p:cNvPr id="14" name="TextBox 13"/>
+          <p:cNvSpPr txBox="1"/>
+          <p:nvPr/>
+        </p:nvSpPr>
+        <p:spPr>
+          <a:xfrm>
+            <a:off x="2771800" y="3044432"/>
+            <a:ext cx="2535208" cy="400110"/>
+          </a:xfrm>
+          <a:prstGeom prst="rect">
+            <a:avLst/>
+          </a:prstGeom>
+          <a:solidFill>
+            <a:schemeClr val="accent3">
+              <a:lumMod val="20000"/>
+              <a:lumOff val="80000"/>
+              <a:alpha val="92000"/>
+            </a:schemeClr>
+          </a:solidFill>
+          <a:ln>
+            <a:solidFill>
+              <a:schemeClr val="accent3">
+                <a:lumMod val="75000"/>
+              </a:schemeClr>
+            </a:solidFill>
+          </a:ln>
+        </p:spPr>
+        <p:txBody>
+          <a:bodyPr wrap="square" rtlCol="0">
+            <a:spAutoFit/>
+          </a:bodyPr>
+          <a:lstStyle/>
+          <a:p>
+            <a:r>
+              <a:rPr lang="en-US" sz="1000" dirty="0" smtClean="0">
+                <a:solidFill>
+                  <a:srgbClr val="FF0000"/>
+                </a:solidFill>
+                <a:latin typeface="Consolas" panose="020B0609020204030204" pitchFamily="49" charset="0"/>
+                <a:ea typeface="Tahoma" panose="020B0604030504040204" pitchFamily="34" charset="0"/>
+                <a:cs typeface="Consolas" panose="020B0609020204030204" pitchFamily="49" charset="0"/>
+              </a:rPr>
+              <a:t>Neighbors can also be accessed by indicating the neighbor index</a:t>
+            </a:r>
+          </a:p>
+        </p:txBody>
+      </p:sp>
+      <p:sp>
+        <p:nvSpPr>
+          <p:cNvPr id="15" name="TextBox 14"/>
+          <p:cNvSpPr txBox="1"/>
+          <p:nvPr/>
+        </p:nvSpPr>
+        <p:spPr>
+          <a:xfrm>
+            <a:off x="1883428" y="4478960"/>
+            <a:ext cx="2535208" cy="553998"/>
+          </a:xfrm>
+          <a:prstGeom prst="rect">
+            <a:avLst/>
+          </a:prstGeom>
+          <a:solidFill>
+            <a:schemeClr val="accent3">
+              <a:lumMod val="20000"/>
+              <a:lumOff val="80000"/>
+              <a:alpha val="92000"/>
+            </a:schemeClr>
+          </a:solidFill>
+          <a:ln>
+            <a:solidFill>
+              <a:schemeClr val="accent3">
+                <a:lumMod val="75000"/>
+              </a:schemeClr>
+            </a:solidFill>
+          </a:ln>
+        </p:spPr>
+        <p:txBody>
+          <a:bodyPr wrap="square" rtlCol="0">
+            <a:spAutoFit/>
+          </a:bodyPr>
+          <a:lstStyle/>
+          <a:p>
+            <a:r>
+              <a:rPr lang="en-US" sz="1000" dirty="0" smtClean="0">
+                <a:solidFill>
+                  <a:srgbClr val="FF0000"/>
+                </a:solidFill>
+                <a:latin typeface="Consolas" panose="020B0609020204030204" pitchFamily="49" charset="0"/>
+                <a:ea typeface="Tahoma" panose="020B0604030504040204" pitchFamily="34" charset="0"/>
+                <a:cs typeface="Consolas" panose="020B0609020204030204" pitchFamily="49" charset="0"/>
+              </a:rPr>
+              <a:t>Neighbors can also be accessed by indicating the relative (integral) coordinates to them</a:t>
+            </a:r>
+          </a:p>
+        </p:txBody>
+      </p:sp>
+      <p:sp>
+        <p:nvSpPr>
+          <p:cNvPr id="10" name="Rounded Rectangle 9"/>
+          <p:cNvSpPr/>
+          <p:nvPr/>
+        </p:nvSpPr>
+        <p:spPr>
+          <a:xfrm>
+            <a:off x="5641178" y="1844824"/>
+            <a:ext cx="2830196" cy="360040"/>
+          </a:xfrm>
+          <a:prstGeom prst="roundRect">
+            <a:avLst/>
+          </a:prstGeom>
+          <a:noFill/>
+          <a:ln>
+            <a:solidFill>
+              <a:schemeClr val="tx1"/>
+            </a:solidFill>
+            <a:prstDash val="lgDash"/>
+          </a:ln>
+        </p:spPr>
+        <p:style>
+          <a:lnRef idx="2">
+            <a:schemeClr val="accent1">
+              <a:shade val="50000"/>
+            </a:schemeClr>
+          </a:lnRef>
+          <a:fillRef idx="1">
+            <a:schemeClr val="accent1"/>
+          </a:fillRef>
+          <a:effectRef idx="0">
+            <a:schemeClr val="accent1"/>
+          </a:effectRef>
+          <a:fontRef idx="minor">
+            <a:schemeClr val="lt1"/>
+          </a:fontRef>
+        </p:style>
+        <p:txBody>
+          <a:bodyPr rtlCol="0" anchor="ctr"/>
+          <a:lstStyle/>
+          <a:p>
+            <a:pPr algn="ctr"/>
+            <a:r>
+              <a:rPr lang="en-US" dirty="0" err="1" smtClean="0">
+                <a:solidFill>
+                  <a:schemeClr val="tx1"/>
+                </a:solidFill>
+              </a:rPr>
+              <a:t>NeighborListInterface</a:t>
+            </a:r>
+            <a:endParaRPr lang="it-CH" dirty="0">
+              <a:solidFill>
+                <a:schemeClr val="tx1"/>
+              </a:solidFill>
+            </a:endParaRPr>
+          </a:p>
+        </p:txBody>
+      </p:sp>
+      <p:sp>
+        <p:nvSpPr>
+          <p:cNvPr id="12" name="Rounded Rectangle 11"/>
+          <p:cNvSpPr/>
+          <p:nvPr/>
+        </p:nvSpPr>
+        <p:spPr>
+          <a:xfrm>
+            <a:off x="5398730" y="3434084"/>
+            <a:ext cx="1576675" cy="360040"/>
+          </a:xfrm>
+          <a:prstGeom prst="roundRect">
+            <a:avLst/>
+          </a:prstGeom>
+          <a:noFill/>
+          <a:ln>
+            <a:solidFill>
+              <a:schemeClr val="tx1"/>
+            </a:solidFill>
+            <a:prstDash val="lgDash"/>
+          </a:ln>
+        </p:spPr>
+        <p:style>
+          <a:lnRef idx="2">
+            <a:schemeClr val="accent1">
+              <a:shade val="50000"/>
+            </a:schemeClr>
+          </a:lnRef>
+          <a:fillRef idx="1">
+            <a:schemeClr val="accent1"/>
+          </a:fillRef>
+          <a:effectRef idx="0">
+            <a:schemeClr val="accent1"/>
+          </a:effectRef>
+          <a:fontRef idx="minor">
+            <a:schemeClr val="lt1"/>
+          </a:fontRef>
+        </p:style>
+        <p:txBody>
+          <a:bodyPr rtlCol="0" anchor="ctr"/>
+          <a:lstStyle/>
+          <a:p>
+            <a:pPr algn="ctr"/>
+            <a:r>
+              <a:rPr lang="en-US" dirty="0" err="1" smtClean="0">
+                <a:solidFill>
+                  <a:schemeClr val="tx1"/>
+                </a:solidFill>
+              </a:rPr>
+              <a:t>R_A_Interface</a:t>
+            </a:r>
+            <a:endParaRPr lang="it-CH" dirty="0">
+              <a:solidFill>
+                <a:schemeClr val="tx1"/>
+              </a:solidFill>
+            </a:endParaRPr>
+          </a:p>
+        </p:txBody>
+      </p:sp>
+      <p:sp>
+        <p:nvSpPr>
+          <p:cNvPr id="13" name="Rounded Rectangle 12"/>
+          <p:cNvSpPr/>
+          <p:nvPr/>
+        </p:nvSpPr>
+        <p:spPr>
+          <a:xfrm>
+            <a:off x="5145508" y="4916640"/>
+            <a:ext cx="2952328" cy="360040"/>
+          </a:xfrm>
+          <a:prstGeom prst="roundRect">
+            <a:avLst/>
+          </a:prstGeom>
+          <a:noFill/>
+          <a:ln>
+            <a:solidFill>
+              <a:schemeClr val="tx1"/>
+            </a:solidFill>
+            <a:prstDash val="lgDash"/>
+          </a:ln>
+        </p:spPr>
+        <p:style>
+          <a:lnRef idx="2">
+            <a:schemeClr val="accent1">
+              <a:shade val="50000"/>
+            </a:schemeClr>
+          </a:lnRef>
+          <a:fillRef idx="1">
+            <a:schemeClr val="accent1"/>
+          </a:fillRef>
+          <a:effectRef idx="0">
+            <a:schemeClr val="accent1"/>
+          </a:effectRef>
+          <a:fontRef idx="minor">
+            <a:schemeClr val="lt1"/>
+          </a:fontRef>
+        </p:style>
+        <p:txBody>
+          <a:bodyPr rtlCol="0" anchor="ctr"/>
+          <a:lstStyle/>
+          <a:p>
+            <a:pPr algn="ctr"/>
+            <a:r>
+              <a:rPr lang="en-US" dirty="0" err="1" smtClean="0">
+                <a:solidFill>
+                  <a:schemeClr val="tx1"/>
+                </a:solidFill>
+              </a:rPr>
+              <a:t>CartesianNeighborsInterface</a:t>
+            </a:r>
+            <a:endParaRPr lang="it-CH" dirty="0">
+              <a:solidFill>
+                <a:schemeClr val="tx1"/>
+              </a:solidFill>
+            </a:endParaRPr>
+          </a:p>
+        </p:txBody>
+      </p:sp>
+      <p:cxnSp>
+        <p:nvCxnSpPr>
+          <p:cNvPr id="16" name="Straight Arrow Connector 15"/>
+          <p:cNvCxnSpPr>
+            <a:stCxn id="12" idx="0"/>
+            <a:endCxn id="10" idx="2"/>
+          </p:cNvCxnSpPr>
+          <p:nvPr/>
+        </p:nvCxnSpPr>
+        <p:spPr>
+          <a:xfrm flipV="1">
+            <a:off x="6187068" y="2204864"/>
+            <a:ext cx="869208" cy="1229220"/>
+          </a:xfrm>
+          <a:prstGeom prst="straightConnector1">
+            <a:avLst/>
+          </a:prstGeom>
+          <a:ln w="19050">
+            <a:solidFill>
+              <a:schemeClr val="tx1"/>
+            </a:solidFill>
+            <a:tailEnd type="arrow"/>
+          </a:ln>
+        </p:spPr>
+        <p:style>
+          <a:lnRef idx="1">
+            <a:schemeClr val="accent1"/>
+          </a:lnRef>
+          <a:fillRef idx="0">
+            <a:schemeClr val="accent1"/>
+          </a:fillRef>
+          <a:effectRef idx="0">
+            <a:schemeClr val="accent1"/>
+          </a:effectRef>
+          <a:fontRef idx="minor">
+            <a:schemeClr val="tx1"/>
+          </a:fontRef>
+        </p:style>
+      </p:cxnSp>
+      <p:cxnSp>
+        <p:nvCxnSpPr>
+          <p:cNvPr id="17" name="Straight Arrow Connector 16"/>
+          <p:cNvCxnSpPr>
+            <a:stCxn id="13" idx="0"/>
+            <a:endCxn id="12" idx="2"/>
+          </p:cNvCxnSpPr>
+          <p:nvPr/>
+        </p:nvCxnSpPr>
+        <p:spPr>
+          <a:xfrm flipH="1" flipV="1">
+            <a:off x="6187068" y="3794124"/>
+            <a:ext cx="434604" cy="1122516"/>
+          </a:xfrm>
+          <a:prstGeom prst="straightConnector1">
+            <a:avLst/>
+          </a:prstGeom>
+          <a:ln w="19050">
+            <a:solidFill>
+              <a:schemeClr val="tx1"/>
+            </a:solidFill>
+            <a:tailEnd type="arrow"/>
+          </a:ln>
+        </p:spPr>
+        <p:style>
+          <a:lnRef idx="1">
+            <a:schemeClr val="accent1"/>
+          </a:lnRef>
+          <a:fillRef idx="0">
+            <a:schemeClr val="accent1"/>
+          </a:fillRef>
+          <a:effectRef idx="0">
+            <a:schemeClr val="accent1"/>
+          </a:effectRef>
+          <a:fontRef idx="minor">
+            <a:schemeClr val="tx1"/>
+          </a:fontRef>
+        </p:style>
+      </p:cxnSp>
+      <p:sp>
+        <p:nvSpPr>
+          <p:cNvPr id="25" name="Cloud 24"/>
+          <p:cNvSpPr/>
+          <p:nvPr/>
+        </p:nvSpPr>
+        <p:spPr>
+          <a:xfrm>
+            <a:off x="6012160" y="510238"/>
+            <a:ext cx="2880320" cy="1406594"/>
+          </a:xfrm>
+          <a:prstGeom prst="cloud">
+            <a:avLst/>
+          </a:prstGeom>
+        </p:spPr>
+        <p:style>
+          <a:lnRef idx="2">
+            <a:schemeClr val="accent1">
+              <a:shade val="50000"/>
+            </a:schemeClr>
+          </a:lnRef>
+          <a:fillRef idx="1">
+            <a:schemeClr val="accent1"/>
+          </a:fillRef>
+          <a:effectRef idx="0">
+            <a:schemeClr val="accent1"/>
+          </a:effectRef>
+          <a:fontRef idx="minor">
+            <a:schemeClr val="lt1"/>
+          </a:fontRef>
+        </p:style>
+        <p:txBody>
+          <a:bodyPr rtlCol="0" anchor="ctr"/>
+          <a:lstStyle/>
+          <a:p>
+            <a:pPr algn="ctr"/>
+            <a:r>
+              <a:rPr lang="en-US" dirty="0" smtClean="0"/>
+              <a:t>This is the class to go from </a:t>
+            </a:r>
+            <a:r>
+              <a:rPr lang="en-US" dirty="0" err="1" smtClean="0"/>
+              <a:t>functor</a:t>
+            </a:r>
+            <a:r>
+              <a:rPr lang="en-US" dirty="0" smtClean="0"/>
+              <a:t> arguments to actual data</a:t>
+            </a:r>
+            <a:endParaRPr lang="it-CH" dirty="0"/>
+          </a:p>
+        </p:txBody>
+      </p:sp>
+      <p:sp>
+        <p:nvSpPr>
+          <p:cNvPr id="30" name="Rounded Rectangle 29"/>
+          <p:cNvSpPr/>
+          <p:nvPr/>
+        </p:nvSpPr>
+        <p:spPr>
+          <a:xfrm>
+            <a:off x="2452087" y="3379513"/>
+            <a:ext cx="1691306" cy="360040"/>
+          </a:xfrm>
+          <a:prstGeom prst="roundRect">
+            <a:avLst/>
+          </a:prstGeom>
+          <a:noFill/>
+          <a:ln>
+            <a:solidFill>
+              <a:schemeClr val="tx1"/>
+            </a:solidFill>
+            <a:prstDash val="lgDash"/>
+          </a:ln>
+        </p:spPr>
+        <p:style>
+          <a:lnRef idx="2">
+            <a:schemeClr val="accent1">
+              <a:shade val="50000"/>
+            </a:schemeClr>
+          </a:lnRef>
+          <a:fillRef idx="1">
+            <a:schemeClr val="accent1"/>
+          </a:fillRef>
+          <a:effectRef idx="0">
+            <a:schemeClr val="accent1"/>
+          </a:effectRef>
+          <a:fontRef idx="minor">
+            <a:schemeClr val="lt1"/>
+          </a:fontRef>
+        </p:style>
+        <p:txBody>
+          <a:bodyPr rtlCol="0" anchor="ctr"/>
+          <a:lstStyle/>
+          <a:p>
+            <a:pPr algn="ctr"/>
+            <a:r>
+              <a:rPr lang="en-US" dirty="0" err="1" smtClean="0">
+                <a:solidFill>
+                  <a:schemeClr val="tx1"/>
+                </a:solidFill>
+              </a:rPr>
+              <a:t>R_A_Neighbors</a:t>
+            </a:r>
+            <a:endParaRPr lang="it-CH" dirty="0">
+              <a:solidFill>
+                <a:schemeClr val="tx1"/>
+              </a:solidFill>
+            </a:endParaRPr>
+          </a:p>
+        </p:txBody>
+      </p:sp>
+      <p:sp>
+        <p:nvSpPr>
+          <p:cNvPr id="37" name="Rounded Rectangle 36"/>
+          <p:cNvSpPr/>
+          <p:nvPr/>
+        </p:nvSpPr>
+        <p:spPr>
+          <a:xfrm>
+            <a:off x="7465381" y="3434084"/>
+            <a:ext cx="1576675" cy="360040"/>
+          </a:xfrm>
+          <a:prstGeom prst="roundRect">
+            <a:avLst/>
+          </a:prstGeom>
+          <a:noFill/>
+          <a:ln>
+            <a:solidFill>
+              <a:schemeClr val="tx1"/>
+            </a:solidFill>
+            <a:prstDash val="lgDash"/>
+          </a:ln>
+        </p:spPr>
+        <p:style>
+          <a:lnRef idx="2">
+            <a:schemeClr val="accent1">
+              <a:shade val="50000"/>
+            </a:schemeClr>
+          </a:lnRef>
+          <a:fillRef idx="1">
+            <a:schemeClr val="accent1"/>
+          </a:fillRef>
+          <a:effectRef idx="0">
+            <a:schemeClr val="accent1"/>
+          </a:effectRef>
+          <a:fontRef idx="minor">
+            <a:schemeClr val="lt1"/>
+          </a:fontRef>
+        </p:style>
+        <p:txBody>
+          <a:bodyPr rtlCol="0" anchor="ctr"/>
+          <a:lstStyle/>
+          <a:p>
+            <a:pPr algn="ctr"/>
+            <a:r>
+              <a:rPr lang="en-US" dirty="0" err="1" smtClean="0">
+                <a:solidFill>
+                  <a:schemeClr val="tx1"/>
+                </a:solidFill>
+              </a:rPr>
+              <a:t>R_A_Interface</a:t>
+            </a:r>
+            <a:endParaRPr lang="it-CH" dirty="0">
+              <a:solidFill>
+                <a:schemeClr val="tx1"/>
+              </a:solidFill>
+            </a:endParaRPr>
+          </a:p>
+        </p:txBody>
+      </p:sp>
+      <p:sp>
+        <p:nvSpPr>
+          <p:cNvPr id="40" name="TextBox 39"/>
+          <p:cNvSpPr txBox="1"/>
+          <p:nvPr/>
+        </p:nvSpPr>
+        <p:spPr>
+          <a:xfrm>
+            <a:off x="1973093" y="3189210"/>
+            <a:ext cx="433132" cy="523220"/>
+          </a:xfrm>
+          <a:prstGeom prst="rect">
+            <a:avLst/>
+          </a:prstGeom>
+          <a:noFill/>
+        </p:spPr>
+        <p:txBody>
+          <a:bodyPr wrap="none" rtlCol="0">
+            <a:spAutoFit/>
+          </a:bodyPr>
+          <a:lstStyle/>
+          <a:p>
+            <a:r>
+              <a:rPr lang="en-US" sz="2800" dirty="0" smtClean="0"/>
+              <a:t>…</a:t>
+            </a:r>
+            <a:endParaRPr lang="it-CH" sz="2800" dirty="0"/>
+          </a:p>
+        </p:txBody>
+      </p:sp>
+      <p:sp>
+        <p:nvSpPr>
+          <p:cNvPr id="41" name="TextBox 40"/>
+          <p:cNvSpPr txBox="1"/>
+          <p:nvPr/>
+        </p:nvSpPr>
+        <p:spPr>
+          <a:xfrm>
+            <a:off x="7019188" y="3193812"/>
+            <a:ext cx="433132" cy="523220"/>
+          </a:xfrm>
+          <a:prstGeom prst="rect">
+            <a:avLst/>
+          </a:prstGeom>
+          <a:noFill/>
+        </p:spPr>
+        <p:txBody>
+          <a:bodyPr wrap="none" rtlCol="0">
+            <a:spAutoFit/>
+          </a:bodyPr>
+          <a:lstStyle/>
+          <a:p>
+            <a:r>
+              <a:rPr lang="en-US" sz="2800" dirty="0" smtClean="0"/>
+              <a:t>…</a:t>
+            </a:r>
+            <a:endParaRPr lang="it-CH" sz="2800" dirty="0"/>
+          </a:p>
+        </p:txBody>
+      </p:sp>
+      <p:cxnSp>
+        <p:nvCxnSpPr>
+          <p:cNvPr id="42" name="Straight Arrow Connector 41"/>
+          <p:cNvCxnSpPr>
+            <a:stCxn id="30" idx="0"/>
+            <a:endCxn id="2" idx="2"/>
+          </p:cNvCxnSpPr>
+          <p:nvPr/>
+        </p:nvCxnSpPr>
+        <p:spPr>
+          <a:xfrm flipH="1" flipV="1">
+            <a:off x="1973093" y="2207302"/>
+            <a:ext cx="1324647" cy="1172211"/>
+          </a:xfrm>
+          <a:prstGeom prst="straightConnector1">
+            <a:avLst/>
+          </a:prstGeom>
+          <a:ln w="19050">
+            <a:solidFill>
+              <a:schemeClr val="tx1"/>
+            </a:solidFill>
+            <a:tailEnd type="arrow"/>
+          </a:ln>
+        </p:spPr>
+        <p:style>
+          <a:lnRef idx="1">
+            <a:schemeClr val="accent1"/>
+          </a:lnRef>
+          <a:fillRef idx="0">
+            <a:schemeClr val="accent1"/>
+          </a:fillRef>
+          <a:effectRef idx="0">
+            <a:schemeClr val="accent1"/>
+          </a:effectRef>
+          <a:fontRef idx="minor">
+            <a:schemeClr val="tx1"/>
+          </a:fontRef>
+        </p:style>
+      </p:cxnSp>
+      <p:cxnSp>
+        <p:nvCxnSpPr>
+          <p:cNvPr id="45" name="Straight Arrow Connector 44"/>
+          <p:cNvCxnSpPr>
+            <a:stCxn id="37" idx="0"/>
+            <a:endCxn id="10" idx="2"/>
+          </p:cNvCxnSpPr>
+          <p:nvPr/>
+        </p:nvCxnSpPr>
+        <p:spPr>
+          <a:xfrm flipH="1" flipV="1">
+            <a:off x="7056276" y="2204864"/>
+            <a:ext cx="1197443" cy="1229220"/>
+          </a:xfrm>
+          <a:prstGeom prst="straightConnector1">
+            <a:avLst/>
+          </a:prstGeom>
+          <a:ln w="19050">
+            <a:solidFill>
+              <a:schemeClr val="tx1"/>
+            </a:solidFill>
+            <a:tailEnd type="arrow"/>
+          </a:ln>
+        </p:spPr>
+        <p:style>
+          <a:lnRef idx="1">
+            <a:schemeClr val="accent1"/>
+          </a:lnRef>
+          <a:fillRef idx="0">
+            <a:schemeClr val="accent1"/>
+          </a:fillRef>
+          <a:effectRef idx="0">
+            <a:schemeClr val="accent1"/>
+          </a:effectRef>
+          <a:fontRef idx="minor">
+            <a:schemeClr val="tx1"/>
+          </a:fontRef>
+        </p:style>
+      </p:cxnSp>
+    </p:spTree>
+    <p:extLst>
+      <p:ext uri="{BB962C8B-B14F-4D97-AF65-F5344CB8AC3E}">
+        <p14:creationId xmlns:p14="http://schemas.microsoft.com/office/powerpoint/2010/main" val="2261045539"/>
+      </p:ext>
+    </p:extLst>
+  </p:cSld>
+  <p:clrMapOvr>
+    <a:masterClrMapping/>
+  </p:clrMapOvr>
+</p:sld>
+</file>
+
+<file path=ppt/slides/slide3.xml><?xml version="1.0" encoding="utf-8"?>
+<p:sld xmlns:a="http://schemas.openxmlformats.org/drawingml/2006/main" xmlns:r="http://schemas.openxmlformats.org/officeDocument/2006/relationships" xmlns:p="http://schemas.openxmlformats.org/presentationml/2006/main">
+  <p:cSld>
+    <p:spTree>
+      <p:nvGrpSpPr>
+        <p:cNvPr id="1" name=""/>
+        <p:cNvGrpSpPr/>
+        <p:nvPr/>
+      </p:nvGrpSpPr>
+      <p:grpSpPr>
+        <a:xfrm>
+          <a:off x="0" y="0"/>
+          <a:ext cx="0" cy="0"/>
+          <a:chOff x="0" y="0"/>
+          <a:chExt cx="0" cy="0"/>
+        </a:xfrm>
+      </p:grpSpPr>
+      <p:sp>
+        <p:nvSpPr>
+          <p:cNvPr id="7" name="Rounded Rectangle 6"/>
+          <p:cNvSpPr/>
+          <p:nvPr/>
+        </p:nvSpPr>
+        <p:spPr>
+          <a:xfrm>
+            <a:off x="251520" y="5307264"/>
+            <a:ext cx="2016224" cy="360040"/>
+          </a:xfrm>
+          <a:prstGeom prst="roundRect">
+            <a:avLst/>
+          </a:prstGeom>
+          <a:noFill/>
+          <a:ln>
+            <a:solidFill>
+              <a:schemeClr val="tx1"/>
+            </a:solidFill>
+            <a:prstDash val="lgDash"/>
+          </a:ln>
+        </p:spPr>
+        <p:style>
+          <a:lnRef idx="2">
+            <a:schemeClr val="accent1">
+              <a:shade val="50000"/>
+            </a:schemeClr>
+          </a:lnRef>
+          <a:fillRef idx="1">
+            <a:schemeClr val="accent1"/>
+          </a:fillRef>
+          <a:effectRef idx="0">
+            <a:schemeClr val="accent1"/>
+          </a:effectRef>
+          <a:fontRef idx="minor">
+            <a:schemeClr val="lt1"/>
+          </a:fontRef>
+        </p:style>
+        <p:txBody>
+          <a:bodyPr rtlCol="0" anchor="ctr"/>
+          <a:lstStyle/>
+          <a:p>
+            <a:pPr algn="ctr"/>
+            <a:r>
+              <a:rPr lang="en-US" dirty="0" smtClean="0">
+                <a:solidFill>
+                  <a:schemeClr val="tx1"/>
+                </a:solidFill>
+              </a:rPr>
+              <a:t>Icosahedral</a:t>
+            </a:r>
+            <a:endParaRPr lang="it-CH" dirty="0">
+              <a:solidFill>
+                <a:schemeClr val="tx1"/>
+              </a:solidFill>
+            </a:endParaRPr>
+          </a:p>
+        </p:txBody>
+      </p:sp>
+      <p:sp>
+        <p:nvSpPr>
+          <p:cNvPr id="8" name="Rounded Rectangle 7"/>
+          <p:cNvSpPr/>
+          <p:nvPr/>
+        </p:nvSpPr>
+        <p:spPr>
+          <a:xfrm>
+            <a:off x="3011772" y="5307264"/>
+            <a:ext cx="2016224" cy="360040"/>
+          </a:xfrm>
+          <a:prstGeom prst="roundRect">
+            <a:avLst/>
+          </a:prstGeom>
+          <a:noFill/>
+          <a:ln>
+            <a:solidFill>
+              <a:schemeClr val="tx1"/>
+            </a:solidFill>
+            <a:prstDash val="lgDash"/>
+          </a:ln>
+        </p:spPr>
+        <p:style>
+          <a:lnRef idx="2">
+            <a:schemeClr val="accent1">
+              <a:shade val="50000"/>
+            </a:schemeClr>
+          </a:lnRef>
+          <a:fillRef idx="1">
+            <a:schemeClr val="accent1"/>
+          </a:fillRef>
+          <a:effectRef idx="0">
+            <a:schemeClr val="accent1"/>
+          </a:effectRef>
+          <a:fontRef idx="minor">
+            <a:schemeClr val="lt1"/>
+          </a:fontRef>
+        </p:style>
+        <p:txBody>
+          <a:bodyPr rtlCol="0" anchor="ctr"/>
+          <a:lstStyle/>
+          <a:p>
+            <a:pPr algn="ctr"/>
+            <a:r>
+              <a:rPr lang="en-US" dirty="0" err="1" smtClean="0">
+                <a:solidFill>
+                  <a:schemeClr val="tx1"/>
+                </a:solidFill>
+              </a:rPr>
               <a:t>CubicSphere</a:t>
             </a:r>
             <a:endParaRPr lang="it-CH" dirty="0">
@@ -3523,7 +4626,7 @@
         </p:nvGrpSpPr>
         <p:grpSpPr>
           <a:xfrm>
-            <a:off x="4359050" y="3402868"/>
+            <a:off x="4932040" y="2725967"/>
             <a:ext cx="3311605" cy="638200"/>
             <a:chOff x="4860032" y="2502768"/>
             <a:chExt cx="3311605" cy="638200"/>
@@ -3657,8 +4760,8 @@
         </p:nvCxnSpPr>
         <p:spPr>
           <a:xfrm flipV="1">
-            <a:off x="3568511" y="2924655"/>
-            <a:ext cx="1221824" cy="936393"/>
+            <a:off x="3314171" y="2409106"/>
+            <a:ext cx="1548172" cy="595021"/>
           </a:xfrm>
           <a:prstGeom prst="straightConnector1">
             <a:avLst/>
@@ -3696,8 +4799,8 @@
         </p:nvCxnSpPr>
         <p:spPr>
           <a:xfrm flipH="1" flipV="1">
-            <a:off x="4790335" y="2924655"/>
-            <a:ext cx="1872208" cy="756373"/>
+            <a:off x="4862343" y="2409106"/>
+            <a:ext cx="2373190" cy="595021"/>
           </a:xfrm>
           <a:prstGeom prst="straightConnector1">
             <a:avLst/>
@@ -3729,14 +4832,14 @@
           <p:cNvPr id="17" name="Straight Arrow Connector 16"/>
           <p:cNvCxnSpPr>
             <a:stCxn id="7" idx="0"/>
-            <a:endCxn id="6" idx="2"/>
+            <a:endCxn id="25" idx="2"/>
           </p:cNvCxnSpPr>
           <p:nvPr/>
         </p:nvCxnSpPr>
         <p:spPr>
           <a:xfrm flipV="1">
-            <a:off x="2555776" y="4221088"/>
-            <a:ext cx="1012735" cy="720080"/>
+            <a:off x="1259632" y="4408501"/>
+            <a:ext cx="1372775" cy="898763"/>
           </a:xfrm>
           <a:prstGeom prst="straightConnector1">
             <a:avLst/>
@@ -3768,14 +4871,14 @@
           <p:cNvPr id="19" name="Straight Arrow Connector 18"/>
           <p:cNvCxnSpPr>
             <a:stCxn id="8" idx="0"/>
-            <a:endCxn id="6" idx="2"/>
+            <a:endCxn id="25" idx="2"/>
           </p:cNvCxnSpPr>
           <p:nvPr/>
         </p:nvCxnSpPr>
         <p:spPr>
           <a:xfrm flipH="1" flipV="1">
-            <a:off x="3568511" y="4221088"/>
-            <a:ext cx="1149816" cy="720080"/>
+            <a:off x="2632407" y="4408501"/>
+            <a:ext cx="1387477" cy="898763"/>
           </a:xfrm>
           <a:prstGeom prst="straightConnector1">
             <a:avLst/>
@@ -3810,7 +4913,7 @@
         </p:nvGrpSpPr>
         <p:grpSpPr>
           <a:xfrm>
-            <a:off x="1043608" y="3429000"/>
+            <a:off x="789268" y="2572079"/>
             <a:ext cx="3533015" cy="792088"/>
             <a:chOff x="830291" y="2348880"/>
             <a:chExt cx="3533015" cy="792088"/>
@@ -3963,7 +5066,7 @@
         </p:nvGrpSpPr>
         <p:grpSpPr>
           <a:xfrm>
-            <a:off x="3782223" y="2036749"/>
+            <a:off x="3854231" y="1521200"/>
             <a:ext cx="3888432" cy="887906"/>
             <a:chOff x="4139952" y="466283"/>
             <a:chExt cx="3888432" cy="887906"/>
@@ -4102,7 +5205,7 @@
         </p:nvSpPr>
         <p:spPr>
           <a:xfrm>
-            <a:off x="2595482" y="5231522"/>
+            <a:off x="1691680" y="5586101"/>
             <a:ext cx="2097940" cy="861774"/>
           </a:xfrm>
           <a:prstGeom prst="rect">
@@ -4221,8 +5324,200 @@
         </p:nvCxnSpPr>
         <p:spPr>
           <a:xfrm flipV="1">
-            <a:off x="4790335" y="1365692"/>
-            <a:ext cx="1149817" cy="1198923"/>
+            <a:off x="4862343" y="1365692"/>
+            <a:ext cx="1077809" cy="683374"/>
+          </a:xfrm>
+          <a:prstGeom prst="straightConnector1">
+            <a:avLst/>
+          </a:prstGeom>
+          <a:ln w="19050">
+            <a:solidFill>
+              <a:schemeClr val="tx1"/>
+            </a:solidFill>
+            <a:tailEnd type="arrow"/>
+          </a:ln>
+        </p:spPr>
+        <p:style>
+          <a:lnRef idx="1">
+            <a:schemeClr val="accent1"/>
+          </a:lnRef>
+          <a:fillRef idx="0">
+            <a:schemeClr val="accent1"/>
+          </a:fillRef>
+          <a:effectRef idx="0">
+            <a:schemeClr val="accent1"/>
+          </a:effectRef>
+          <a:fontRef idx="minor">
+            <a:schemeClr val="tx1"/>
+          </a:fontRef>
+        </p:style>
+      </p:cxnSp>
+      <p:grpSp>
+        <p:nvGrpSpPr>
+          <p:cNvPr id="24" name="Group 23"/>
+          <p:cNvGrpSpPr/>
+          <p:nvPr/>
+        </p:nvGrpSpPr>
+        <p:grpSpPr>
+          <a:xfrm>
+            <a:off x="107504" y="3616413"/>
+            <a:ext cx="3533015" cy="792088"/>
+            <a:chOff x="830291" y="2348880"/>
+            <a:chExt cx="3533015" cy="792088"/>
+          </a:xfrm>
+        </p:grpSpPr>
+        <p:sp>
+          <p:nvSpPr>
+            <p:cNvPr id="25" name="Rounded Rectangle 24"/>
+            <p:cNvSpPr/>
+            <p:nvPr/>
+          </p:nvSpPr>
+          <p:spPr>
+            <a:xfrm>
+              <a:off x="2347082" y="2780928"/>
+              <a:ext cx="2016224" cy="360040"/>
+            </a:xfrm>
+            <a:prstGeom prst="roundRect">
+              <a:avLst/>
+            </a:prstGeom>
+            <a:noFill/>
+            <a:ln>
+              <a:solidFill>
+                <a:schemeClr val="tx1"/>
+              </a:solidFill>
+              <a:prstDash val="lgDash"/>
+            </a:ln>
+          </p:spPr>
+          <p:style>
+            <a:lnRef idx="2">
+              <a:schemeClr val="accent1">
+                <a:shade val="50000"/>
+              </a:schemeClr>
+            </a:lnRef>
+            <a:fillRef idx="1">
+              <a:schemeClr val="accent1"/>
+            </a:fillRef>
+            <a:effectRef idx="0">
+              <a:schemeClr val="accent1"/>
+            </a:effectRef>
+            <a:fontRef idx="minor">
+              <a:schemeClr val="lt1"/>
+            </a:fontRef>
+          </p:style>
+          <p:txBody>
+            <a:bodyPr rtlCol="0" anchor="ctr"/>
+            <a:lstStyle/>
+            <a:p>
+              <a:pPr algn="ctr"/>
+              <a:r>
+                <a:rPr lang="en-US" dirty="0" err="1" smtClean="0">
+                  <a:solidFill>
+                    <a:schemeClr val="tx1"/>
+                  </a:solidFill>
+                </a:rPr>
+                <a:t>R_A_NeighborList</a:t>
+              </a:r>
+              <a:endParaRPr lang="it-CH" dirty="0">
+                <a:solidFill>
+                  <a:schemeClr val="tx1"/>
+                </a:solidFill>
+              </a:endParaRPr>
+            </a:p>
+          </p:txBody>
+        </p:sp>
+        <p:sp>
+          <p:nvSpPr>
+            <p:cNvPr id="26" name="TextBox 25"/>
+            <p:cNvSpPr txBox="1"/>
+            <p:nvPr/>
+          </p:nvSpPr>
+          <p:spPr>
+            <a:xfrm>
+              <a:off x="830291" y="2348880"/>
+              <a:ext cx="1836204" cy="553998"/>
+            </a:xfrm>
+            <a:prstGeom prst="rect">
+              <a:avLst/>
+            </a:prstGeom>
+            <a:solidFill>
+              <a:schemeClr val="accent3">
+                <a:lumMod val="20000"/>
+                <a:lumOff val="80000"/>
+                <a:alpha val="92000"/>
+              </a:schemeClr>
+            </a:solidFill>
+            <a:ln>
+              <a:solidFill>
+                <a:schemeClr val="accent3">
+                  <a:lumMod val="75000"/>
+                </a:schemeClr>
+              </a:solidFill>
+            </a:ln>
+          </p:spPr>
+          <p:txBody>
+            <a:bodyPr wrap="square" rtlCol="0">
+              <a:spAutoFit/>
+            </a:bodyPr>
+            <a:lstStyle/>
+            <a:p>
+              <a:r>
+                <a:rPr lang="en-US" sz="1000" dirty="0" smtClean="0">
+                  <a:solidFill>
+                    <a:srgbClr val="FF0000"/>
+                  </a:solidFill>
+                  <a:latin typeface="Consolas" panose="020B0609020204030204" pitchFamily="49" charset="0"/>
+                  <a:ea typeface="Tahoma" panose="020B0604030504040204" pitchFamily="34" charset="0"/>
+                  <a:cs typeface="Consolas" panose="020B0609020204030204" pitchFamily="49" charset="0"/>
+                </a:rPr>
+                <a:t>Cells are accessed by a </a:t>
+              </a:r>
+              <a:r>
+                <a:rPr lang="en-US" sz="1000" dirty="0" err="1" smtClean="0">
+                  <a:solidFill>
+                    <a:srgbClr val="FF0000"/>
+                  </a:solidFill>
+                  <a:latin typeface="Consolas" panose="020B0609020204030204" pitchFamily="49" charset="0"/>
+                  <a:ea typeface="Tahoma" panose="020B0604030504040204" pitchFamily="34" charset="0"/>
+                  <a:cs typeface="Consolas" panose="020B0609020204030204" pitchFamily="49" charset="0"/>
+                </a:rPr>
+                <a:t>for_each</a:t>
+              </a:r>
+              <a:r>
+                <a:rPr lang="en-US" sz="1000" dirty="0" smtClean="0">
+                  <a:solidFill>
+                    <a:srgbClr val="FF0000"/>
+                  </a:solidFill>
+                  <a:latin typeface="Consolas" panose="020B0609020204030204" pitchFamily="49" charset="0"/>
+                  <a:ea typeface="Tahoma" panose="020B0604030504040204" pitchFamily="34" charset="0"/>
+                  <a:cs typeface="Consolas" panose="020B0609020204030204" pitchFamily="49" charset="0"/>
+                </a:rPr>
+                <a:t> and neighbors through neighbor lists</a:t>
+              </a:r>
+              <a:endParaRPr lang="it-CH" sz="1000" dirty="0">
+                <a:solidFill>
+                  <a:srgbClr val="FF0000"/>
+                </a:solidFill>
+                <a:latin typeface="Consolas" panose="020B0609020204030204" pitchFamily="49" charset="0"/>
+                <a:ea typeface="Tahoma" panose="020B0604030504040204" pitchFamily="34" charset="0"/>
+                <a:cs typeface="Consolas" panose="020B0609020204030204" pitchFamily="49" charset="0"/>
+              </a:endParaRPr>
+            </a:p>
+          </p:txBody>
+        </p:sp>
+      </p:grpSp>
+      <p:cxnSp>
+        <p:nvCxnSpPr>
+          <p:cNvPr id="27" name="Straight Arrow Connector 26"/>
+          <p:cNvCxnSpPr>
+            <a:stCxn id="25" idx="0"/>
+            <a:endCxn id="6" idx="2"/>
+          </p:cNvCxnSpPr>
+          <p:nvPr/>
+        </p:nvCxnSpPr>
+        <p:spPr>
+          <a:xfrm flipV="1">
+            <a:off x="2632407" y="3364167"/>
+            <a:ext cx="681764" cy="684294"/>
           </a:xfrm>
           <a:prstGeom prst="straightConnector1">
             <a:avLst/>
@@ -4253,739 +5548,6 @@
     <p:extLst>
       <p:ext uri="{BB962C8B-B14F-4D97-AF65-F5344CB8AC3E}">
         <p14:creationId xmlns:p14="http://schemas.microsoft.com/office/powerpoint/2010/main" val="2738939541"/>
-      </p:ext>
-    </p:extLst>
-  </p:cSld>
-  <p:clrMapOvr>
-    <a:masterClrMapping/>
-  </p:clrMapOvr>
-</p:sld>
-</file>
-
-<file path=ppt/slides/slide3.xml><?xml version="1.0" encoding="utf-8"?>
-<p:sld xmlns:a="http://schemas.openxmlformats.org/drawingml/2006/main" xmlns:r="http://schemas.openxmlformats.org/officeDocument/2006/relationships" xmlns:p="http://schemas.openxmlformats.org/presentationml/2006/main">
-  <p:cSld>
-    <p:spTree>
-      <p:nvGrpSpPr>
-        <p:cNvPr id="1" name=""/>
-        <p:cNvGrpSpPr/>
-        <p:nvPr/>
-      </p:nvGrpSpPr>
-      <p:grpSpPr>
-        <a:xfrm>
-          <a:off x="0" y="0"/>
-          <a:ext cx="0" cy="0"/>
-          <a:chOff x="0" y="0"/>
-          <a:chExt cx="0" cy="0"/>
-        </a:xfrm>
-      </p:grpSpPr>
-      <p:sp>
-        <p:nvSpPr>
-          <p:cNvPr id="2" name="Rounded Rectangle 1"/>
-          <p:cNvSpPr/>
-          <p:nvPr/>
-        </p:nvSpPr>
-        <p:spPr>
-          <a:xfrm>
-            <a:off x="899592" y="1847262"/>
-            <a:ext cx="2147002" cy="360040"/>
-          </a:xfrm>
-          <a:prstGeom prst="roundRect">
-            <a:avLst/>
-          </a:prstGeom>
-          <a:noFill/>
-          <a:ln>
-            <a:solidFill>
-              <a:schemeClr val="tx1"/>
-            </a:solidFill>
-            <a:prstDash val="lgDash"/>
-          </a:ln>
-        </p:spPr>
-        <p:style>
-          <a:lnRef idx="2">
-            <a:schemeClr val="accent1">
-              <a:shade val="50000"/>
-            </a:schemeClr>
-          </a:lnRef>
-          <a:fillRef idx="1">
-            <a:schemeClr val="accent1"/>
-          </a:fillRef>
-          <a:effectRef idx="0">
-            <a:schemeClr val="accent1"/>
-          </a:effectRef>
-          <a:fontRef idx="minor">
-            <a:schemeClr val="lt1"/>
-          </a:fontRef>
-        </p:style>
-        <p:txBody>
-          <a:bodyPr rtlCol="0" anchor="ctr"/>
-          <a:lstStyle/>
-          <a:p>
-            <a:pPr algn="ctr"/>
-            <a:r>
-              <a:rPr lang="en-US" dirty="0" err="1" smtClean="0">
-                <a:solidFill>
-                  <a:schemeClr val="tx1"/>
-                </a:solidFill>
-              </a:rPr>
-              <a:t>NeighborListStorage</a:t>
-            </a:r>
-            <a:endParaRPr lang="it-CH" dirty="0">
-              <a:solidFill>
-                <a:schemeClr val="tx1"/>
-              </a:solidFill>
-            </a:endParaRPr>
-          </a:p>
-        </p:txBody>
-      </p:sp>
-      <p:sp>
-        <p:nvSpPr>
-          <p:cNvPr id="3" name="Rounded Rectangle 2"/>
-          <p:cNvSpPr/>
-          <p:nvPr/>
-        </p:nvSpPr>
-        <p:spPr>
-          <a:xfrm>
-            <a:off x="648446" y="3381951"/>
-            <a:ext cx="2649294" cy="360040"/>
-          </a:xfrm>
-          <a:prstGeom prst="roundRect">
-            <a:avLst/>
-          </a:prstGeom>
-          <a:noFill/>
-          <a:ln>
-            <a:solidFill>
-              <a:schemeClr val="tx1"/>
-            </a:solidFill>
-            <a:prstDash val="lgDash"/>
-          </a:ln>
-        </p:spPr>
-        <p:style>
-          <a:lnRef idx="2">
-            <a:schemeClr val="accent1">
-              <a:shade val="50000"/>
-            </a:schemeClr>
-          </a:lnRef>
-          <a:fillRef idx="1">
-            <a:schemeClr val="accent1"/>
-          </a:fillRef>
-          <a:effectRef idx="0">
-            <a:schemeClr val="accent1"/>
-          </a:effectRef>
-          <a:fontRef idx="minor">
-            <a:schemeClr val="lt1"/>
-          </a:fontRef>
-        </p:style>
-        <p:txBody>
-          <a:bodyPr rtlCol="0" anchor="ctr"/>
-          <a:lstStyle/>
-          <a:p>
-            <a:pPr algn="ctr"/>
-            <a:r>
-              <a:rPr lang="en-US" dirty="0" err="1" smtClean="0">
-                <a:solidFill>
-                  <a:schemeClr val="tx1"/>
-                </a:solidFill>
-              </a:rPr>
-              <a:t>RandomAccessNeighbors</a:t>
-            </a:r>
-            <a:endParaRPr lang="it-CH" dirty="0">
-              <a:solidFill>
-                <a:schemeClr val="tx1"/>
-              </a:solidFill>
-            </a:endParaRPr>
-          </a:p>
-        </p:txBody>
-      </p:sp>
-      <p:sp>
-        <p:nvSpPr>
-          <p:cNvPr id="4" name="Rounded Rectangle 3"/>
-          <p:cNvSpPr/>
-          <p:nvPr/>
-        </p:nvSpPr>
-        <p:spPr>
-          <a:xfrm>
-            <a:off x="648446" y="4916640"/>
-            <a:ext cx="2649294" cy="360040"/>
-          </a:xfrm>
-          <a:prstGeom prst="roundRect">
-            <a:avLst/>
-          </a:prstGeom>
-          <a:noFill/>
-          <a:ln>
-            <a:solidFill>
-              <a:schemeClr val="tx1"/>
-            </a:solidFill>
-            <a:prstDash val="lgDash"/>
-          </a:ln>
-        </p:spPr>
-        <p:style>
-          <a:lnRef idx="2">
-            <a:schemeClr val="accent1">
-              <a:shade val="50000"/>
-            </a:schemeClr>
-          </a:lnRef>
-          <a:fillRef idx="1">
-            <a:schemeClr val="accent1"/>
-          </a:fillRef>
-          <a:effectRef idx="0">
-            <a:schemeClr val="accent1"/>
-          </a:effectRef>
-          <a:fontRef idx="minor">
-            <a:schemeClr val="lt1"/>
-          </a:fontRef>
-        </p:style>
-        <p:txBody>
-          <a:bodyPr rtlCol="0" anchor="ctr"/>
-          <a:lstStyle/>
-          <a:p>
-            <a:pPr algn="ctr"/>
-            <a:r>
-              <a:rPr lang="en-US" dirty="0" err="1" smtClean="0">
-                <a:solidFill>
-                  <a:schemeClr val="tx1"/>
-                </a:solidFill>
-              </a:rPr>
-              <a:t>CartesianNeighbors</a:t>
-            </a:r>
-            <a:endParaRPr lang="it-CH" dirty="0">
-              <a:solidFill>
-                <a:schemeClr val="tx1"/>
-              </a:solidFill>
-            </a:endParaRPr>
-          </a:p>
-        </p:txBody>
-      </p:sp>
-      <p:sp>
-        <p:nvSpPr>
-          <p:cNvPr id="5" name="TextBox 4"/>
-          <p:cNvSpPr txBox="1"/>
-          <p:nvPr/>
-        </p:nvSpPr>
-        <p:spPr>
-          <a:xfrm>
-            <a:off x="2771800" y="1268760"/>
-            <a:ext cx="2607290" cy="707886"/>
-          </a:xfrm>
-          <a:prstGeom prst="rect">
-            <a:avLst/>
-          </a:prstGeom>
-          <a:solidFill>
-            <a:schemeClr val="accent3">
-              <a:lumMod val="20000"/>
-              <a:lumOff val="80000"/>
-              <a:alpha val="92000"/>
-            </a:schemeClr>
-          </a:solidFill>
-          <a:ln>
-            <a:solidFill>
-              <a:schemeClr val="accent3">
-                <a:lumMod val="75000"/>
-              </a:schemeClr>
-            </a:solidFill>
-          </a:ln>
-        </p:spPr>
-        <p:txBody>
-          <a:bodyPr wrap="square" rtlCol="0">
-            <a:spAutoFit/>
-          </a:bodyPr>
-          <a:lstStyle/>
-          <a:p>
-            <a:r>
-              <a:rPr lang="en-US" sz="1000" dirty="0" smtClean="0">
-                <a:solidFill>
-                  <a:srgbClr val="FF0000"/>
-                </a:solidFill>
-                <a:latin typeface="Consolas" panose="020B0609020204030204" pitchFamily="49" charset="0"/>
-                <a:ea typeface="Tahoma" panose="020B0604030504040204" pitchFamily="34" charset="0"/>
-                <a:cs typeface="Consolas" panose="020B0609020204030204" pitchFamily="49" charset="0"/>
-              </a:rPr>
-              <a:t>Only way to access data is through scanning neighbor lists (the iteration can be limited, such as: the first 4 neighbors)</a:t>
-            </a:r>
-          </a:p>
-        </p:txBody>
-      </p:sp>
-      <p:cxnSp>
-        <p:nvCxnSpPr>
-          <p:cNvPr id="8" name="Straight Arrow Connector 7"/>
-          <p:cNvCxnSpPr>
-            <a:stCxn id="3" idx="0"/>
-            <a:endCxn id="2" idx="2"/>
-          </p:cNvCxnSpPr>
-          <p:nvPr/>
-        </p:nvCxnSpPr>
-        <p:spPr>
-          <a:xfrm flipV="1">
-            <a:off x="1973093" y="2207302"/>
-            <a:ext cx="0" cy="1174649"/>
-          </a:xfrm>
-          <a:prstGeom prst="straightConnector1">
-            <a:avLst/>
-          </a:prstGeom>
-          <a:ln w="19050">
-            <a:solidFill>
-              <a:schemeClr val="tx1"/>
-            </a:solidFill>
-            <a:tailEnd type="arrow"/>
-          </a:ln>
-        </p:spPr>
-        <p:style>
-          <a:lnRef idx="1">
-            <a:schemeClr val="accent1"/>
-          </a:lnRef>
-          <a:fillRef idx="0">
-            <a:schemeClr val="accent1"/>
-          </a:fillRef>
-          <a:effectRef idx="0">
-            <a:schemeClr val="accent1"/>
-          </a:effectRef>
-          <a:fontRef idx="minor">
-            <a:schemeClr val="tx1"/>
-          </a:fontRef>
-        </p:style>
-      </p:cxnSp>
-      <p:cxnSp>
-        <p:nvCxnSpPr>
-          <p:cNvPr id="11" name="Straight Arrow Connector 10"/>
-          <p:cNvCxnSpPr>
-            <a:stCxn id="4" idx="0"/>
-            <a:endCxn id="3" idx="2"/>
-          </p:cNvCxnSpPr>
-          <p:nvPr/>
-        </p:nvCxnSpPr>
-        <p:spPr>
-          <a:xfrm flipV="1">
-            <a:off x="1973093" y="3741991"/>
-            <a:ext cx="0" cy="1174649"/>
-          </a:xfrm>
-          <a:prstGeom prst="straightConnector1">
-            <a:avLst/>
-          </a:prstGeom>
-          <a:ln w="19050">
-            <a:solidFill>
-              <a:schemeClr val="tx1"/>
-            </a:solidFill>
-            <a:tailEnd type="arrow"/>
-          </a:ln>
-        </p:spPr>
-        <p:style>
-          <a:lnRef idx="1">
-            <a:schemeClr val="accent1"/>
-          </a:lnRef>
-          <a:fillRef idx="0">
-            <a:schemeClr val="accent1"/>
-          </a:fillRef>
-          <a:effectRef idx="0">
-            <a:schemeClr val="accent1"/>
-          </a:effectRef>
-          <a:fontRef idx="minor">
-            <a:schemeClr val="tx1"/>
-          </a:fontRef>
-        </p:style>
-      </p:cxnSp>
-      <p:sp>
-        <p:nvSpPr>
-          <p:cNvPr id="14" name="TextBox 13"/>
-          <p:cNvSpPr txBox="1"/>
-          <p:nvPr/>
-        </p:nvSpPr>
-        <p:spPr>
-          <a:xfrm>
-            <a:off x="2771800" y="3044432"/>
-            <a:ext cx="2535208" cy="400110"/>
-          </a:xfrm>
-          <a:prstGeom prst="rect">
-            <a:avLst/>
-          </a:prstGeom>
-          <a:solidFill>
-            <a:schemeClr val="accent3">
-              <a:lumMod val="20000"/>
-              <a:lumOff val="80000"/>
-              <a:alpha val="92000"/>
-            </a:schemeClr>
-          </a:solidFill>
-          <a:ln>
-            <a:solidFill>
-              <a:schemeClr val="accent3">
-                <a:lumMod val="75000"/>
-              </a:schemeClr>
-            </a:solidFill>
-          </a:ln>
-        </p:spPr>
-        <p:txBody>
-          <a:bodyPr wrap="square" rtlCol="0">
-            <a:spAutoFit/>
-          </a:bodyPr>
-          <a:lstStyle/>
-          <a:p>
-            <a:r>
-              <a:rPr lang="en-US" sz="1000" dirty="0" smtClean="0">
-                <a:solidFill>
-                  <a:srgbClr val="FF0000"/>
-                </a:solidFill>
-                <a:latin typeface="Consolas" panose="020B0609020204030204" pitchFamily="49" charset="0"/>
-                <a:ea typeface="Tahoma" panose="020B0604030504040204" pitchFamily="34" charset="0"/>
-                <a:cs typeface="Consolas" panose="020B0609020204030204" pitchFamily="49" charset="0"/>
-              </a:rPr>
-              <a:t>Neighbors can also be accessed by indicating the neighbor index</a:t>
-            </a:r>
-          </a:p>
-        </p:txBody>
-      </p:sp>
-      <p:sp>
-        <p:nvSpPr>
-          <p:cNvPr id="15" name="TextBox 14"/>
-          <p:cNvSpPr txBox="1"/>
-          <p:nvPr/>
-        </p:nvSpPr>
-        <p:spPr>
-          <a:xfrm>
-            <a:off x="2771800" y="4484592"/>
-            <a:ext cx="2535208" cy="553998"/>
-          </a:xfrm>
-          <a:prstGeom prst="rect">
-            <a:avLst/>
-          </a:prstGeom>
-          <a:solidFill>
-            <a:schemeClr val="accent3">
-              <a:lumMod val="20000"/>
-              <a:lumOff val="80000"/>
-              <a:alpha val="92000"/>
-            </a:schemeClr>
-          </a:solidFill>
-          <a:ln>
-            <a:solidFill>
-              <a:schemeClr val="accent3">
-                <a:lumMod val="75000"/>
-              </a:schemeClr>
-            </a:solidFill>
-          </a:ln>
-        </p:spPr>
-        <p:txBody>
-          <a:bodyPr wrap="square" rtlCol="0">
-            <a:spAutoFit/>
-          </a:bodyPr>
-          <a:lstStyle/>
-          <a:p>
-            <a:r>
-              <a:rPr lang="en-US" sz="1000" dirty="0" smtClean="0">
-                <a:solidFill>
-                  <a:srgbClr val="FF0000"/>
-                </a:solidFill>
-                <a:latin typeface="Consolas" panose="020B0609020204030204" pitchFamily="49" charset="0"/>
-                <a:ea typeface="Tahoma" panose="020B0604030504040204" pitchFamily="34" charset="0"/>
-                <a:cs typeface="Consolas" panose="020B0609020204030204" pitchFamily="49" charset="0"/>
-              </a:rPr>
-              <a:t>Neighbors can also be accessed by indicating the relative (integral) coordinates to them</a:t>
-            </a:r>
-          </a:p>
-        </p:txBody>
-      </p:sp>
-      <p:sp>
-        <p:nvSpPr>
-          <p:cNvPr id="10" name="Rounded Rectangle 9"/>
-          <p:cNvSpPr/>
-          <p:nvPr/>
-        </p:nvSpPr>
-        <p:spPr>
-          <a:xfrm>
-            <a:off x="5641178" y="1844824"/>
-            <a:ext cx="2830196" cy="360040"/>
-          </a:xfrm>
-          <a:prstGeom prst="roundRect">
-            <a:avLst/>
-          </a:prstGeom>
-          <a:noFill/>
-          <a:ln>
-            <a:solidFill>
-              <a:schemeClr val="tx1"/>
-            </a:solidFill>
-            <a:prstDash val="lgDash"/>
-          </a:ln>
-        </p:spPr>
-        <p:style>
-          <a:lnRef idx="2">
-            <a:schemeClr val="accent1">
-              <a:shade val="50000"/>
-            </a:schemeClr>
-          </a:lnRef>
-          <a:fillRef idx="1">
-            <a:schemeClr val="accent1"/>
-          </a:fillRef>
-          <a:effectRef idx="0">
-            <a:schemeClr val="accent1"/>
-          </a:effectRef>
-          <a:fontRef idx="minor">
-            <a:schemeClr val="lt1"/>
-          </a:fontRef>
-        </p:style>
-        <p:txBody>
-          <a:bodyPr rtlCol="0" anchor="ctr"/>
-          <a:lstStyle/>
-          <a:p>
-            <a:pPr algn="ctr"/>
-            <a:r>
-              <a:rPr lang="en-US" dirty="0" err="1" smtClean="0">
-                <a:solidFill>
-                  <a:schemeClr val="tx1"/>
-                </a:solidFill>
-              </a:rPr>
-              <a:t>NeighborListInterface</a:t>
-            </a:r>
-            <a:endParaRPr lang="it-CH" dirty="0">
-              <a:solidFill>
-                <a:schemeClr val="tx1"/>
-              </a:solidFill>
-            </a:endParaRPr>
-          </a:p>
-        </p:txBody>
-      </p:sp>
-      <p:sp>
-        <p:nvSpPr>
-          <p:cNvPr id="12" name="Rounded Rectangle 11"/>
-          <p:cNvSpPr/>
-          <p:nvPr/>
-        </p:nvSpPr>
-        <p:spPr>
-          <a:xfrm>
-            <a:off x="5731629" y="3379513"/>
-            <a:ext cx="2649294" cy="360040"/>
-          </a:xfrm>
-          <a:prstGeom prst="roundRect">
-            <a:avLst/>
-          </a:prstGeom>
-          <a:noFill/>
-          <a:ln>
-            <a:solidFill>
-              <a:schemeClr val="tx1"/>
-            </a:solidFill>
-            <a:prstDash val="lgDash"/>
-          </a:ln>
-        </p:spPr>
-        <p:style>
-          <a:lnRef idx="2">
-            <a:schemeClr val="accent1">
-              <a:shade val="50000"/>
-            </a:schemeClr>
-          </a:lnRef>
-          <a:fillRef idx="1">
-            <a:schemeClr val="accent1"/>
-          </a:fillRef>
-          <a:effectRef idx="0">
-            <a:schemeClr val="accent1"/>
-          </a:effectRef>
-          <a:fontRef idx="minor">
-            <a:schemeClr val="lt1"/>
-          </a:fontRef>
-        </p:style>
-        <p:txBody>
-          <a:bodyPr rtlCol="0" anchor="ctr"/>
-          <a:lstStyle/>
-          <a:p>
-            <a:pPr algn="ctr"/>
-            <a:r>
-              <a:rPr lang="en-US" dirty="0" err="1" smtClean="0">
-                <a:solidFill>
-                  <a:schemeClr val="tx1"/>
-                </a:solidFill>
-              </a:rPr>
-              <a:t>RandomAccessInterface</a:t>
-            </a:r>
-            <a:endParaRPr lang="it-CH" dirty="0">
-              <a:solidFill>
-                <a:schemeClr val="tx1"/>
-              </a:solidFill>
-            </a:endParaRPr>
-          </a:p>
-        </p:txBody>
-      </p:sp>
-      <p:sp>
-        <p:nvSpPr>
-          <p:cNvPr id="13" name="Rounded Rectangle 12"/>
-          <p:cNvSpPr/>
-          <p:nvPr/>
-        </p:nvSpPr>
-        <p:spPr>
-          <a:xfrm>
-            <a:off x="5580112" y="4916640"/>
-            <a:ext cx="2952328" cy="360040"/>
-          </a:xfrm>
-          <a:prstGeom prst="roundRect">
-            <a:avLst/>
-          </a:prstGeom>
-          <a:noFill/>
-          <a:ln>
-            <a:solidFill>
-              <a:schemeClr val="tx1"/>
-            </a:solidFill>
-            <a:prstDash val="lgDash"/>
-          </a:ln>
-        </p:spPr>
-        <p:style>
-          <a:lnRef idx="2">
-            <a:schemeClr val="accent1">
-              <a:shade val="50000"/>
-            </a:schemeClr>
-          </a:lnRef>
-          <a:fillRef idx="1">
-            <a:schemeClr val="accent1"/>
-          </a:fillRef>
-          <a:effectRef idx="0">
-            <a:schemeClr val="accent1"/>
-          </a:effectRef>
-          <a:fontRef idx="minor">
-            <a:schemeClr val="lt1"/>
-          </a:fontRef>
-        </p:style>
-        <p:txBody>
-          <a:bodyPr rtlCol="0" anchor="ctr"/>
-          <a:lstStyle/>
-          <a:p>
-            <a:pPr algn="ctr"/>
-            <a:r>
-              <a:rPr lang="en-US" dirty="0" err="1" smtClean="0">
-                <a:solidFill>
-                  <a:schemeClr val="tx1"/>
-                </a:solidFill>
-              </a:rPr>
-              <a:t>CartesianNeighborsInterface</a:t>
-            </a:r>
-            <a:endParaRPr lang="it-CH" dirty="0">
-              <a:solidFill>
-                <a:schemeClr val="tx1"/>
-              </a:solidFill>
-            </a:endParaRPr>
-          </a:p>
-        </p:txBody>
-      </p:sp>
-      <p:cxnSp>
-        <p:nvCxnSpPr>
-          <p:cNvPr id="16" name="Straight Arrow Connector 15"/>
-          <p:cNvCxnSpPr/>
-          <p:nvPr/>
-        </p:nvCxnSpPr>
-        <p:spPr>
-          <a:xfrm flipV="1">
-            <a:off x="7056276" y="2204864"/>
-            <a:ext cx="0" cy="1174649"/>
-          </a:xfrm>
-          <a:prstGeom prst="straightConnector1">
-            <a:avLst/>
-          </a:prstGeom>
-          <a:ln w="19050">
-            <a:solidFill>
-              <a:schemeClr val="tx1"/>
-            </a:solidFill>
-            <a:tailEnd type="arrow"/>
-          </a:ln>
-        </p:spPr>
-        <p:style>
-          <a:lnRef idx="1">
-            <a:schemeClr val="accent1"/>
-          </a:lnRef>
-          <a:fillRef idx="0">
-            <a:schemeClr val="accent1"/>
-          </a:fillRef>
-          <a:effectRef idx="0">
-            <a:schemeClr val="accent1"/>
-          </a:effectRef>
-          <a:fontRef idx="minor">
-            <a:schemeClr val="tx1"/>
-          </a:fontRef>
-        </p:style>
-      </p:cxnSp>
-      <p:cxnSp>
-        <p:nvCxnSpPr>
-          <p:cNvPr id="17" name="Straight Arrow Connector 16"/>
-          <p:cNvCxnSpPr/>
-          <p:nvPr/>
-        </p:nvCxnSpPr>
-        <p:spPr>
-          <a:xfrm flipV="1">
-            <a:off x="7056276" y="3739553"/>
-            <a:ext cx="0" cy="1177087"/>
-          </a:xfrm>
-          <a:prstGeom prst="straightConnector1">
-            <a:avLst/>
-          </a:prstGeom>
-          <a:ln w="19050">
-            <a:solidFill>
-              <a:schemeClr val="tx1"/>
-            </a:solidFill>
-            <a:tailEnd type="arrow"/>
-          </a:ln>
-        </p:spPr>
-        <p:style>
-          <a:lnRef idx="1">
-            <a:schemeClr val="accent1"/>
-          </a:lnRef>
-          <a:fillRef idx="0">
-            <a:schemeClr val="accent1"/>
-          </a:fillRef>
-          <a:effectRef idx="0">
-            <a:schemeClr val="accent1"/>
-          </a:effectRef>
-          <a:fontRef idx="minor">
-            <a:schemeClr val="tx1"/>
-          </a:fontRef>
-        </p:style>
-      </p:cxnSp>
-      <p:sp>
-        <p:nvSpPr>
-          <p:cNvPr id="25" name="Cloud 24"/>
-          <p:cNvSpPr/>
-          <p:nvPr/>
-        </p:nvSpPr>
-        <p:spPr>
-          <a:xfrm>
-            <a:off x="6012160" y="510238"/>
-            <a:ext cx="2880320" cy="1406594"/>
-          </a:xfrm>
-          <a:prstGeom prst="cloud">
-            <a:avLst/>
-          </a:prstGeom>
-        </p:spPr>
-        <p:style>
-          <a:lnRef idx="2">
-            <a:schemeClr val="accent1">
-              <a:shade val="50000"/>
-            </a:schemeClr>
-          </a:lnRef>
-          <a:fillRef idx="1">
-            <a:schemeClr val="accent1"/>
-          </a:fillRef>
-          <a:effectRef idx="0">
-            <a:schemeClr val="accent1"/>
-          </a:effectRef>
-          <a:fontRef idx="minor">
-            <a:schemeClr val="lt1"/>
-          </a:fontRef>
-        </p:style>
-        <p:txBody>
-          <a:bodyPr rtlCol="0" anchor="ctr"/>
-          <a:lstStyle/>
-          <a:p>
-            <a:pPr algn="ctr"/>
-            <a:r>
-              <a:rPr lang="en-US" dirty="0" smtClean="0"/>
-              <a:t>This is the class to go from </a:t>
-            </a:r>
-            <a:r>
-              <a:rPr lang="en-US" dirty="0" err="1" smtClean="0"/>
-              <a:t>functor</a:t>
-            </a:r>
-            <a:r>
-              <a:rPr lang="en-US" dirty="0" smtClean="0"/>
-              <a:t> arguments to actual data</a:t>
-            </a:r>
-            <a:endParaRPr lang="it-CH" dirty="0"/>
-          </a:p>
-        </p:txBody>
-      </p:sp>
-    </p:spTree>
-    <p:extLst>
-      <p:ext uri="{BB962C8B-B14F-4D97-AF65-F5344CB8AC3E}">
-        <p14:creationId xmlns:p14="http://schemas.microsoft.com/office/powerpoint/2010/main" val="2261045539"/>
       </p:ext>
     </p:extLst>
   </p:cSld>

</xml_diff>